<commit_message>
Agregue el Diagrama de Comunicacion
</commit_message>
<xml_diff>
--- a/Para Presentacion final.pptx
+++ b/Para Presentacion final.pptx
@@ -122,6 +122,22 @@
       </a:defRPr>
     </a:lvl9pPr>
   </p:defaultTextStyle>
+  <p:extLst>
+    <p:ext uri="{EFAFB233-063F-42B5-8137-9DF3F51BA10A}">
+      <p15:sldGuideLst xmlns:p15="http://schemas.microsoft.com/office/powerpoint/2012/main">
+        <p15:guide id="1" orient="horz" pos="2160">
+          <p15:clr>
+            <a:srgbClr val="A4A3A4"/>
+          </p15:clr>
+        </p15:guide>
+        <p15:guide id="2" pos="2880">
+          <p15:clr>
+            <a:srgbClr val="A4A3A4"/>
+          </p15:clr>
+        </p15:guide>
+      </p15:sldGuideLst>
+    </p:ext>
+  </p:extLst>
 </p:presentation>
 </file>
 
@@ -306,7 +322,7 @@
           <a:p>
             <a:fld id="{15236BF2-5D97-4A23-B897-87C18D793EA7}" type="datetimeFigureOut">
               <a:rPr lang="es-ES" smtClean="0"/>
-              <a:t>05/08/2016</a:t>
+              <a:t>19/08/2016</a:t>
             </a:fld>
             <a:endParaRPr lang="es-ES"/>
           </a:p>
@@ -476,7 +492,7 @@
           <a:p>
             <a:fld id="{15236BF2-5D97-4A23-B897-87C18D793EA7}" type="datetimeFigureOut">
               <a:rPr lang="es-ES" smtClean="0"/>
-              <a:t>05/08/2016</a:t>
+              <a:t>19/08/2016</a:t>
             </a:fld>
             <a:endParaRPr lang="es-ES"/>
           </a:p>
@@ -656,7 +672,7 @@
           <a:p>
             <a:fld id="{15236BF2-5D97-4A23-B897-87C18D793EA7}" type="datetimeFigureOut">
               <a:rPr lang="es-ES" smtClean="0"/>
-              <a:t>05/08/2016</a:t>
+              <a:t>19/08/2016</a:t>
             </a:fld>
             <a:endParaRPr lang="es-ES"/>
           </a:p>
@@ -826,7 +842,7 @@
           <a:p>
             <a:fld id="{15236BF2-5D97-4A23-B897-87C18D793EA7}" type="datetimeFigureOut">
               <a:rPr lang="es-ES" smtClean="0"/>
-              <a:t>05/08/2016</a:t>
+              <a:t>19/08/2016</a:t>
             </a:fld>
             <a:endParaRPr lang="es-ES"/>
           </a:p>
@@ -1072,7 +1088,7 @@
           <a:p>
             <a:fld id="{15236BF2-5D97-4A23-B897-87C18D793EA7}" type="datetimeFigureOut">
               <a:rPr lang="es-ES" smtClean="0"/>
-              <a:t>05/08/2016</a:t>
+              <a:t>19/08/2016</a:t>
             </a:fld>
             <a:endParaRPr lang="es-ES"/>
           </a:p>
@@ -1360,7 +1376,7 @@
           <a:p>
             <a:fld id="{15236BF2-5D97-4A23-B897-87C18D793EA7}" type="datetimeFigureOut">
               <a:rPr lang="es-ES" smtClean="0"/>
-              <a:t>05/08/2016</a:t>
+              <a:t>19/08/2016</a:t>
             </a:fld>
             <a:endParaRPr lang="es-ES"/>
           </a:p>
@@ -1782,7 +1798,7 @@
           <a:p>
             <a:fld id="{15236BF2-5D97-4A23-B897-87C18D793EA7}" type="datetimeFigureOut">
               <a:rPr lang="es-ES" smtClean="0"/>
-              <a:t>05/08/2016</a:t>
+              <a:t>19/08/2016</a:t>
             </a:fld>
             <a:endParaRPr lang="es-ES"/>
           </a:p>
@@ -1900,7 +1916,7 @@
           <a:p>
             <a:fld id="{15236BF2-5D97-4A23-B897-87C18D793EA7}" type="datetimeFigureOut">
               <a:rPr lang="es-ES" smtClean="0"/>
-              <a:t>05/08/2016</a:t>
+              <a:t>19/08/2016</a:t>
             </a:fld>
             <a:endParaRPr lang="es-ES"/>
           </a:p>
@@ -1995,7 +2011,7 @@
           <a:p>
             <a:fld id="{15236BF2-5D97-4A23-B897-87C18D793EA7}" type="datetimeFigureOut">
               <a:rPr lang="es-ES" smtClean="0"/>
-              <a:t>05/08/2016</a:t>
+              <a:t>19/08/2016</a:t>
             </a:fld>
             <a:endParaRPr lang="es-ES"/>
           </a:p>
@@ -2272,7 +2288,7 @@
           <a:p>
             <a:fld id="{15236BF2-5D97-4A23-B897-87C18D793EA7}" type="datetimeFigureOut">
               <a:rPr lang="es-ES" smtClean="0"/>
-              <a:t>05/08/2016</a:t>
+              <a:t>19/08/2016</a:t>
             </a:fld>
             <a:endParaRPr lang="es-ES"/>
           </a:p>
@@ -2525,7 +2541,7 @@
           <a:p>
             <a:fld id="{15236BF2-5D97-4A23-B897-87C18D793EA7}" type="datetimeFigureOut">
               <a:rPr lang="es-ES" smtClean="0"/>
-              <a:t>05/08/2016</a:t>
+              <a:t>19/08/2016</a:t>
             </a:fld>
             <a:endParaRPr lang="es-ES"/>
           </a:p>
@@ -2738,7 +2754,7 @@
           <a:p>
             <a:fld id="{15236BF2-5D97-4A23-B897-87C18D793EA7}" type="datetimeFigureOut">
               <a:rPr lang="es-ES" smtClean="0"/>
-              <a:t>05/08/2016</a:t>
+              <a:t>19/08/2016</a:t>
             </a:fld>
             <a:endParaRPr lang="es-ES"/>
           </a:p>
@@ -3905,35 +3921,31 @@
           </a:p>
         </p:txBody>
       </p:sp>
-      <p:sp>
-        <p:nvSpPr>
-          <p:cNvPr id="3" name="2 Marcador de contenido"/>
-          <p:cNvSpPr>
-            <a:spLocks noGrp="1"/>
-          </p:cNvSpPr>
+      <p:pic>
+        <p:nvPicPr>
+          <p:cNvPr id="6" name="Marcador de contenido 5"/>
+          <p:cNvPicPr>
+            <a:picLocks noGrp="1" noChangeAspect="1"/>
+          </p:cNvPicPr>
           <p:nvPr>
             <p:ph idx="1"/>
           </p:nvPr>
-        </p:nvSpPr>
-        <p:spPr/>
-        <p:txBody>
-          <a:bodyPr/>
-          <a:lstStyle/>
-          <a:p>
-            <a:r>
-              <a:rPr lang="es-ES" dirty="0" smtClean="0">
-                <a:solidFill>
-                  <a:srgbClr val="FF0000"/>
-                </a:solidFill>
-              </a:rPr>
-              <a:t>Haciendo Sebas</a:t>
-            </a:r>
-          </a:p>
-          <a:p>
-            <a:endParaRPr lang="es-ES" dirty="0"/>
-          </a:p>
-        </p:txBody>
-      </p:sp>
+        </p:nvPicPr>
+        <p:blipFill rotWithShape="1">
+          <a:blip r:embed="rId2"/>
+          <a:srcRect l="30321" t="16542" r="3485" b="40501"/>
+          <a:stretch/>
+        </p:blipFill>
+        <p:spPr>
+          <a:xfrm>
+            <a:off x="822250" y="1844824"/>
+            <a:ext cx="7499500" cy="2736304"/>
+          </a:xfrm>
+          <a:prstGeom prst="rect">
+            <a:avLst/>
+          </a:prstGeom>
+        </p:spPr>
+      </p:pic>
     </p:spTree>
     <p:extLst>
       <p:ext uri="{BB962C8B-B14F-4D97-AF65-F5344CB8AC3E}">
@@ -4716,11 +4728,7 @@
           <a:p>
             <a:r>
               <a:rPr lang="es-ES" dirty="0" smtClean="0"/>
-              <a:t>Tipo </a:t>
-            </a:r>
-            <a:r>
-              <a:rPr lang="es-ES" dirty="0" smtClean="0"/>
-              <a:t>de Proceso</a:t>
+              <a:t>Tipo de Proceso</a:t>
             </a:r>
             <a:br>
               <a:rPr lang="es-ES" dirty="0" smtClean="0"/>

</xml_diff>

<commit_message>
MODIFICACION FINAL DE PRESENTACION
</commit_message>
<xml_diff>
--- a/Para Presentacion final.pptx
+++ b/Para Presentacion final.pptx
@@ -13,17 +13,33 @@
     <p:sldId id="261" r:id="rId7"/>
     <p:sldId id="275" r:id="rId8"/>
     <p:sldId id="262" r:id="rId9"/>
-    <p:sldId id="263" r:id="rId10"/>
-    <p:sldId id="265" r:id="rId11"/>
-    <p:sldId id="266" r:id="rId12"/>
-    <p:sldId id="267" r:id="rId13"/>
-    <p:sldId id="268" r:id="rId14"/>
-    <p:sldId id="269" r:id="rId15"/>
-    <p:sldId id="270" r:id="rId16"/>
-    <p:sldId id="271" r:id="rId17"/>
-    <p:sldId id="274" r:id="rId18"/>
-    <p:sldId id="272" r:id="rId19"/>
-    <p:sldId id="273" r:id="rId20"/>
+    <p:sldId id="288" r:id="rId10"/>
+    <p:sldId id="289" r:id="rId11"/>
+    <p:sldId id="290" r:id="rId12"/>
+    <p:sldId id="287" r:id="rId13"/>
+    <p:sldId id="263" r:id="rId14"/>
+    <p:sldId id="276" r:id="rId15"/>
+    <p:sldId id="277" r:id="rId16"/>
+    <p:sldId id="278" r:id="rId17"/>
+    <p:sldId id="279" r:id="rId18"/>
+    <p:sldId id="280" r:id="rId19"/>
+    <p:sldId id="281" r:id="rId20"/>
+    <p:sldId id="282" r:id="rId21"/>
+    <p:sldId id="283" r:id="rId22"/>
+    <p:sldId id="284" r:id="rId23"/>
+    <p:sldId id="285" r:id="rId24"/>
+    <p:sldId id="265" r:id="rId25"/>
+    <p:sldId id="266" r:id="rId26"/>
+    <p:sldId id="267" r:id="rId27"/>
+    <p:sldId id="268" r:id="rId28"/>
+    <p:sldId id="269" r:id="rId29"/>
+    <p:sldId id="270" r:id="rId30"/>
+    <p:sldId id="271" r:id="rId31"/>
+    <p:sldId id="274" r:id="rId32"/>
+    <p:sldId id="272" r:id="rId33"/>
+    <p:sldId id="273" r:id="rId34"/>
+    <p:sldId id="286" r:id="rId35"/>
+    <p:sldId id="291" r:id="rId36"/>
   </p:sldIdLst>
   <p:sldSz cx="9144000" cy="6858000" type="screen4x3"/>
   <p:notesSz cx="6858000" cy="9144000"/>
@@ -124,7 +140,7 @@
   </p:defaultTextStyle>
   <p:extLst>
     <p:ext uri="{EFAFB233-063F-42B5-8137-9DF3F51BA10A}">
-      <p15:sldGuideLst xmlns:p15="http://schemas.microsoft.com/office/powerpoint/2012/main" xmlns="">
+      <p15:sldGuideLst xmlns="" xmlns:p15="http://schemas.microsoft.com/office/powerpoint/2012/main">
         <p15:guide id="1" orient="horz" pos="2160">
           <p15:clr>
             <a:srgbClr val="A4A3A4"/>
@@ -3905,10 +3921,18 @@
           <a:p>
             <a:pPr algn="ctr"/>
             <a:r>
-              <a:rPr lang="es-ES" sz="3600" dirty="0" smtClean="0"/>
-              <a:t>Universidad Autónoma Encarnación</a:t>
-            </a:r>
-            <a:endParaRPr lang="es-ES" sz="3600" dirty="0"/>
+              <a:rPr lang="es-ES" sz="3000" dirty="0" smtClean="0"/>
+              <a:t>Universidad Autónoma </a:t>
+            </a:r>
+            <a:r>
+              <a:rPr lang="es-ES" sz="3000" dirty="0" smtClean="0"/>
+              <a:t>de </a:t>
+            </a:r>
+            <a:r>
+              <a:rPr lang="es-ES" sz="3000" dirty="0" smtClean="0"/>
+              <a:t>Encarnación</a:t>
+            </a:r>
+            <a:endParaRPr lang="es-ES" sz="3000" dirty="0"/>
           </a:p>
         </p:txBody>
       </p:sp>
@@ -4078,74 +4102,6 @@
           </a:extLst>
         </p:spPr>
       </p:pic>
-      <p:sp>
-        <p:nvSpPr>
-          <p:cNvPr id="4" name="3 Rectángulo"/>
-          <p:cNvSpPr/>
-          <p:nvPr/>
-        </p:nvSpPr>
-        <p:spPr>
-          <a:xfrm>
-            <a:off x="9226550" y="2113072"/>
-            <a:ext cx="2286000" cy="1815882"/>
-          </a:xfrm>
-          <a:prstGeom prst="rect">
-            <a:avLst/>
-          </a:prstGeom>
-        </p:spPr>
-        <p:txBody>
-          <a:bodyPr>
-            <a:spAutoFit/>
-          </a:bodyPr>
-          <a:lstStyle/>
-          <a:p>
-            <a:pPr lvl="0" algn="r">
-              <a:spcBef>
-                <a:spcPct val="0"/>
-              </a:spcBef>
-            </a:pPr>
-            <a:r>
-              <a:rPr lang="es-ES" sz="5600" b="1" dirty="0" err="1">
-                <a:solidFill>
-                  <a:srgbClr val="0BD0D9">
-                    <a:tint val="90000"/>
-                    <a:satMod val="120000"/>
-                  </a:srgbClr>
-                </a:solidFill>
-                <a:effectLst>
-                  <a:outerShdw blurRad="38100" dist="25400" dir="5400000" algn="tl" rotWithShape="0">
-                    <a:srgbClr val="000000">
-                      <a:alpha val="43000"/>
-                    </a:srgbClr>
-                  </a:outerShdw>
-                </a:effectLst>
-                <a:latin typeface="Calibri"/>
-                <a:ea typeface="+mj-ea"/>
-                <a:cs typeface="+mj-cs"/>
-              </a:rPr>
-              <a:t>Encarncion</a:t>
-            </a:r>
-            <a:endParaRPr lang="es-ES" sz="5600" b="1" dirty="0">
-              <a:solidFill>
-                <a:srgbClr val="0BD0D9">
-                  <a:tint val="90000"/>
-                  <a:satMod val="120000"/>
-                </a:srgbClr>
-              </a:solidFill>
-              <a:effectLst>
-                <a:outerShdw blurRad="38100" dist="25400" dir="5400000" algn="tl" rotWithShape="0">
-                  <a:srgbClr val="000000">
-                    <a:alpha val="43000"/>
-                  </a:srgbClr>
-                </a:outerShdw>
-              </a:effectLst>
-              <a:latin typeface="Calibri"/>
-              <a:ea typeface="+mj-ea"/>
-              <a:cs typeface="+mj-cs"/>
-            </a:endParaRPr>
-          </a:p>
-        </p:txBody>
-      </p:sp>
       <p:sp>
         <p:nvSpPr>
           <p:cNvPr id="7" name="2 Subtítulo"/>
@@ -4590,7 +4546,65 @@
       </p:grpSpPr>
       <p:sp>
         <p:nvSpPr>
-          <p:cNvPr id="2" name="1 Título"/>
+          <p:cNvPr id="3" name="2 Marcador de contenido"/>
+          <p:cNvSpPr>
+            <a:spLocks noGrp="1"/>
+          </p:cNvSpPr>
+          <p:nvPr>
+            <p:ph idx="1"/>
+          </p:nvPr>
+        </p:nvSpPr>
+        <p:spPr/>
+        <p:txBody>
+          <a:bodyPr>
+            <a:normAutofit fontScale="70000" lnSpcReduction="20000"/>
+          </a:bodyPr>
+          <a:lstStyle/>
+          <a:p>
+            <a:pPr marL="0" indent="0" algn="ctr">
+              <a:buNone/>
+            </a:pPr>
+            <a:r>
+              <a:rPr lang="es-ES" b="1" dirty="0"/>
+              <a:t>Descripción Escrita del modelado del Sistema</a:t>
+            </a:r>
+          </a:p>
+          <a:p>
+            <a:pPr marL="0" indent="0" algn="ctr">
+              <a:buNone/>
+            </a:pPr>
+            <a:r>
+              <a:rPr lang="es-ES" dirty="0"/>
+              <a:t>El cliente desde su navegador ingresa a la aplicación “</a:t>
+            </a:r>
+            <a:r>
+              <a:rPr lang="es-ES" dirty="0" err="1"/>
+              <a:t>DeliverYApp</a:t>
+            </a:r>
+            <a:r>
+              <a:rPr lang="es-ES" dirty="0"/>
+              <a:t>”, primeramente se debe registrar (</a:t>
+            </a:r>
+            <a:r>
+              <a:rPr lang="es-ES" dirty="0" err="1"/>
+              <a:t>Loguearse</a:t>
+            </a:r>
+            <a:r>
+              <a:rPr lang="es-ES" dirty="0"/>
+              <a:t>) con los datos requeridos por el sistema, luego de eso podrá ver un mensaje de bienvenida y una lista de restaurantes en el cual tendrá la opción de elegir uno de ellos, una vez seleccionado el restaurante se desplegará una interfaz con las opciones del menú donde el cliente por medio de imágenes con sus respectivas descripciones optara por su plato de preferencia. Realizado esto aparecerán los datos personales con la lista de pedido que ha hecho el cliente con sus respectivos precios y el monto total a abonar. Si el cliente está de acuerdo, presiona el botón para confirmar su pedido y se  mostrará un mensaje de envío correcto. Luego, la recepcionista recibe el pedido y lo verifica (si los datos son coherentes y correctos), en caso de que no se cumplan los requisitos el sistema notificara al cliente que su pedido fue rechazado y que  lo intente nuevamente, al confirmar que el pedido cumple los requisitos, se notificará al cliente que su pedido fue aceptado, este ingresara a la cocina con estado pendiente, culminado el menú solicitado, pasa al cajero  y cambia el estado a enviado imprimiendo un ticket con los datos del cliente necesarios para el envío, al retornar el repartidor rinde cuenta de los pedidos entregados el cajero ingresa el pago actualizando el estado ha cobrado. </a:t>
+            </a:r>
+          </a:p>
+          <a:p>
+            <a:pPr marL="0" indent="0">
+              <a:buNone/>
+            </a:pPr>
+            <a:endParaRPr lang="es-ES" dirty="0"/>
+          </a:p>
+        </p:txBody>
+      </p:sp>
+      <p:sp>
+        <p:nvSpPr>
+          <p:cNvPr id="4" name="1 Título"/>
           <p:cNvSpPr>
             <a:spLocks noGrp="1"/>
           </p:cNvSpPr>
@@ -4598,72 +4612,21 @@
             <p:ph type="title"/>
           </p:nvPr>
         </p:nvSpPr>
-        <p:spPr/>
+        <p:spPr>
+          <a:xfrm>
+            <a:off x="457200" y="704088"/>
+            <a:ext cx="8229600" cy="1143000"/>
+          </a:xfrm>
+        </p:spPr>
         <p:txBody>
           <a:bodyPr/>
           <a:lstStyle/>
           <a:p>
+            <a:pPr algn="ctr"/>
             <a:r>
               <a:rPr lang="es-ES" dirty="0" smtClean="0"/>
-              <a:t>Herramientas colaborativas</a:t>
-            </a:r>
-            <a:endParaRPr lang="es-ES" dirty="0"/>
-          </a:p>
-        </p:txBody>
-      </p:sp>
-      <p:sp>
-        <p:nvSpPr>
-          <p:cNvPr id="3" name="2 Marcador de contenido"/>
-          <p:cNvSpPr>
-            <a:spLocks noGrp="1"/>
-          </p:cNvSpPr>
-          <p:nvPr>
-            <p:ph idx="1"/>
-          </p:nvPr>
-        </p:nvSpPr>
-        <p:spPr/>
-        <p:txBody>
-          <a:bodyPr/>
-          <a:lstStyle/>
-          <a:p>
-            <a:r>
-              <a:rPr lang="es-ES" dirty="0"/>
-              <a:t>Durante el proceso de gestión de configuración se </a:t>
-            </a:r>
-            <a:r>
-              <a:rPr lang="es-ES" dirty="0" smtClean="0"/>
-              <a:t>utilizo </a:t>
-            </a:r>
-            <a:r>
-              <a:rPr lang="es-ES" dirty="0"/>
-              <a:t>la herramienta </a:t>
-            </a:r>
-            <a:r>
-              <a:rPr lang="es-ES" dirty="0" err="1"/>
-              <a:t>Github</a:t>
-            </a:r>
-            <a:r>
-              <a:rPr lang="es-ES" dirty="0"/>
-              <a:t> para el  control de versiones del proyecto. Esta gestión se </a:t>
-            </a:r>
-            <a:r>
-              <a:rPr lang="es-ES" dirty="0" smtClean="0"/>
-              <a:t>hizo </a:t>
-            </a:r>
-            <a:r>
-              <a:rPr lang="es-ES" dirty="0"/>
-              <a:t>mediante la herramienta </a:t>
-            </a:r>
-            <a:r>
-              <a:rPr lang="es-ES" dirty="0" err="1"/>
-              <a:t>Zenhub</a:t>
-            </a:r>
-            <a:r>
-              <a:rPr lang="es-ES" dirty="0"/>
-              <a:t> para los documentos y  Sublime para el código fuente.</a:t>
-            </a:r>
-          </a:p>
-          <a:p>
+              <a:t>Modelado de Requerimiento</a:t>
+            </a:r>
             <a:endParaRPr lang="es-ES" dirty="0"/>
           </a:p>
         </p:txBody>
@@ -4671,7 +4634,7 @@
     </p:spTree>
     <p:extLst>
       <p:ext uri="{BB962C8B-B14F-4D97-AF65-F5344CB8AC3E}">
-        <p14:creationId xmlns:p14="http://schemas.microsoft.com/office/powerpoint/2010/main" val="716299305"/>
+        <p14:creationId xmlns:p14="http://schemas.microsoft.com/office/powerpoint/2010/main" val="126946295"/>
       </p:ext>
     </p:extLst>
   </p:cSld>
@@ -4698,52 +4661,50 @@
           <a:chExt cx="0" cy="0"/>
         </a:xfrm>
       </p:grpSpPr>
-      <p:sp>
-        <p:nvSpPr>
-          <p:cNvPr id="2" name="1 Título"/>
-          <p:cNvSpPr>
-            <a:spLocks noGrp="1"/>
-          </p:cNvSpPr>
-          <p:nvPr>
-            <p:ph type="title"/>
-          </p:nvPr>
-        </p:nvSpPr>
-        <p:spPr/>
-        <p:txBody>
-          <a:bodyPr/>
-          <a:lstStyle/>
-          <a:p>
-            <a:r>
-              <a:rPr lang="es-ES" dirty="0" smtClean="0"/>
-              <a:t>Entorno de desarrollo</a:t>
-            </a:r>
-            <a:endParaRPr lang="es-ES" dirty="0"/>
-          </a:p>
-        </p:txBody>
-      </p:sp>
-      <p:sp>
-        <p:nvSpPr>
-          <p:cNvPr id="3" name="2 Marcador de contenido"/>
-          <p:cNvSpPr>
-            <a:spLocks noGrp="1"/>
-          </p:cNvSpPr>
+      <p:pic>
+        <p:nvPicPr>
+          <p:cNvPr id="4" name="3 Marcador de contenido" descr="C:\Users\Usuario\Documents\Facu2016\Ing. de Software\Diagramas\CU_Sistema.png"/>
+          <p:cNvPicPr>
+            <a:picLocks noGrp="1"/>
+          </p:cNvPicPr>
           <p:nvPr>
             <p:ph idx="1"/>
           </p:nvPr>
-        </p:nvSpPr>
-        <p:spPr/>
-        <p:txBody>
-          <a:bodyPr/>
-          <a:lstStyle/>
-          <a:p>
-            <a:endParaRPr lang="es-ES" dirty="0"/>
-          </a:p>
-        </p:txBody>
-      </p:sp>
+        </p:nvPicPr>
+        <p:blipFill rotWithShape="1">
+          <a:blip r:embed="rId2">
+            <a:extLst>
+              <a:ext uri="{28A0092B-C50C-407E-A947-70E740481C1C}">
+                <a14:useLocalDpi xmlns:a14="http://schemas.microsoft.com/office/drawing/2010/main" val="0"/>
+              </a:ext>
+            </a:extLst>
+          </a:blip>
+          <a:srcRect b="20413"/>
+          <a:stretch/>
+        </p:blipFill>
+        <p:spPr bwMode="auto">
+          <a:xfrm>
+            <a:off x="971600" y="620688"/>
+            <a:ext cx="7272808" cy="5832648"/>
+          </a:xfrm>
+          <a:prstGeom prst="rect">
+            <a:avLst/>
+          </a:prstGeom>
+          <a:noFill/>
+          <a:ln>
+            <a:noFill/>
+          </a:ln>
+          <a:extLst>
+            <a:ext uri="{53640926-AAD7-44D8-BBD7-CCE9431645EC}">
+              <a14:shadowObscured xmlns:a14="http://schemas.microsoft.com/office/drawing/2010/main"/>
+            </a:ext>
+          </a:extLst>
+        </p:spPr>
+      </p:pic>
     </p:spTree>
     <p:extLst>
       <p:ext uri="{BB962C8B-B14F-4D97-AF65-F5344CB8AC3E}">
-        <p14:creationId xmlns:p14="http://schemas.microsoft.com/office/powerpoint/2010/main" val="775879315"/>
+        <p14:creationId xmlns:p14="http://schemas.microsoft.com/office/powerpoint/2010/main" val="3656664426"/>
       </p:ext>
     </p:extLst>
   </p:cSld>
@@ -4780,11 +4741,1253 @@
             <p:ph type="title"/>
           </p:nvPr>
         </p:nvSpPr>
+        <p:spPr>
+          <a:xfrm>
+            <a:off x="395536" y="2564904"/>
+            <a:ext cx="8229600" cy="1143000"/>
+          </a:xfrm>
+        </p:spPr>
+        <p:txBody>
+          <a:bodyPr/>
+          <a:lstStyle/>
+          <a:p>
+            <a:pPr algn="ctr"/>
+            <a:r>
+              <a:rPr lang="es-ES" dirty="0"/>
+              <a:t>Prototipos</a:t>
+            </a:r>
+          </a:p>
+        </p:txBody>
+      </p:sp>
+    </p:spTree>
+    <p:extLst>
+      <p:ext uri="{BB962C8B-B14F-4D97-AF65-F5344CB8AC3E}">
+        <p14:creationId xmlns:p14="http://schemas.microsoft.com/office/powerpoint/2010/main" val="3701943948"/>
+      </p:ext>
+    </p:extLst>
+  </p:cSld>
+  <p:clrMapOvr>
+    <a:masterClrMapping/>
+  </p:clrMapOvr>
+</p:sld>
+</file>
+
+<file path=ppt/slides/slide13.xml><?xml version="1.0" encoding="utf-8"?>
+<p:sld xmlns:a="http://schemas.openxmlformats.org/drawingml/2006/main" xmlns:r="http://schemas.openxmlformats.org/officeDocument/2006/relationships" xmlns:p="http://schemas.openxmlformats.org/presentationml/2006/main">
+  <p:cSld>
+    <p:spTree>
+      <p:nvGrpSpPr>
+        <p:cNvPr id="1" name=""/>
+        <p:cNvGrpSpPr/>
+        <p:nvPr/>
+      </p:nvGrpSpPr>
+      <p:grpSpPr>
+        <a:xfrm>
+          <a:off x="0" y="0"/>
+          <a:ext cx="0" cy="0"/>
+          <a:chOff x="0" y="0"/>
+          <a:chExt cx="0" cy="0"/>
+        </a:xfrm>
+      </p:grpSpPr>
+      <p:pic>
+        <p:nvPicPr>
+          <p:cNvPr id="4" name="3 Marcador de contenido" descr="C:\proyectoDeliberyApp\Propotipos de vistas\Login Admin.png"/>
+          <p:cNvPicPr>
+            <a:picLocks noGrp="1"/>
+          </p:cNvPicPr>
+          <p:nvPr>
+            <p:ph idx="1"/>
+          </p:nvPr>
+        </p:nvPicPr>
+        <p:blipFill>
+          <a:blip r:embed="rId2">
+            <a:extLst>
+              <a:ext uri="{28A0092B-C50C-407E-A947-70E740481C1C}">
+                <a14:useLocalDpi xmlns:a14="http://schemas.microsoft.com/office/drawing/2010/main" val="0"/>
+              </a:ext>
+            </a:extLst>
+          </a:blip>
+          <a:srcRect/>
+          <a:stretch>
+            <a:fillRect/>
+          </a:stretch>
+        </p:blipFill>
+        <p:spPr bwMode="auto">
+          <a:xfrm>
+            <a:off x="1381125" y="2105819"/>
+            <a:ext cx="6381750" cy="4048125"/>
+          </a:xfrm>
+          <a:prstGeom prst="rect">
+            <a:avLst/>
+          </a:prstGeom>
+          <a:noFill/>
+          <a:ln>
+            <a:noFill/>
+          </a:ln>
+        </p:spPr>
+      </p:pic>
+    </p:spTree>
+    <p:extLst>
+      <p:ext uri="{BB962C8B-B14F-4D97-AF65-F5344CB8AC3E}">
+        <p14:creationId xmlns:p14="http://schemas.microsoft.com/office/powerpoint/2010/main" val="470114740"/>
+      </p:ext>
+    </p:extLst>
+  </p:cSld>
+  <p:clrMapOvr>
+    <a:masterClrMapping/>
+  </p:clrMapOvr>
+</p:sld>
+</file>
+
+<file path=ppt/slides/slide14.xml><?xml version="1.0" encoding="utf-8"?>
+<p:sld xmlns:a="http://schemas.openxmlformats.org/drawingml/2006/main" xmlns:r="http://schemas.openxmlformats.org/officeDocument/2006/relationships" xmlns:p="http://schemas.openxmlformats.org/presentationml/2006/main">
+  <p:cSld>
+    <p:spTree>
+      <p:nvGrpSpPr>
+        <p:cNvPr id="1" name=""/>
+        <p:cNvGrpSpPr/>
+        <p:nvPr/>
+      </p:nvGrpSpPr>
+      <p:grpSpPr>
+        <a:xfrm>
+          <a:off x="0" y="0"/>
+          <a:ext cx="0" cy="0"/>
+          <a:chOff x="0" y="0"/>
+          <a:chExt cx="0" cy="0"/>
+        </a:xfrm>
+      </p:grpSpPr>
+      <p:pic>
+        <p:nvPicPr>
+          <p:cNvPr id="4" name="3 Marcador de contenido" descr="C:\proyectoDeliberyApp\Propotipos de vistas\Panel de control.png"/>
+          <p:cNvPicPr>
+            <a:picLocks noGrp="1"/>
+          </p:cNvPicPr>
+          <p:nvPr>
+            <p:ph idx="1"/>
+          </p:nvPr>
+        </p:nvPicPr>
+        <p:blipFill>
+          <a:blip r:embed="rId2">
+            <a:extLst>
+              <a:ext uri="{28A0092B-C50C-407E-A947-70E740481C1C}">
+                <a14:useLocalDpi xmlns:a14="http://schemas.microsoft.com/office/drawing/2010/main" val="0"/>
+              </a:ext>
+            </a:extLst>
+          </a:blip>
+          <a:srcRect/>
+          <a:stretch>
+            <a:fillRect/>
+          </a:stretch>
+        </p:blipFill>
+        <p:spPr bwMode="auto">
+          <a:xfrm>
+            <a:off x="1381125" y="2105819"/>
+            <a:ext cx="6381750" cy="4048125"/>
+          </a:xfrm>
+          <a:prstGeom prst="rect">
+            <a:avLst/>
+          </a:prstGeom>
+          <a:noFill/>
+          <a:ln>
+            <a:noFill/>
+          </a:ln>
+        </p:spPr>
+      </p:pic>
+    </p:spTree>
+    <p:extLst>
+      <p:ext uri="{BB962C8B-B14F-4D97-AF65-F5344CB8AC3E}">
+        <p14:creationId xmlns:p14="http://schemas.microsoft.com/office/powerpoint/2010/main" val="374828817"/>
+      </p:ext>
+    </p:extLst>
+  </p:cSld>
+  <p:clrMapOvr>
+    <a:masterClrMapping/>
+  </p:clrMapOvr>
+</p:sld>
+</file>
+
+<file path=ppt/slides/slide15.xml><?xml version="1.0" encoding="utf-8"?>
+<p:sld xmlns:a="http://schemas.openxmlformats.org/drawingml/2006/main" xmlns:r="http://schemas.openxmlformats.org/officeDocument/2006/relationships" xmlns:p="http://schemas.openxmlformats.org/presentationml/2006/main">
+  <p:cSld>
+    <p:spTree>
+      <p:nvGrpSpPr>
+        <p:cNvPr id="1" name=""/>
+        <p:cNvGrpSpPr/>
+        <p:nvPr/>
+      </p:nvGrpSpPr>
+      <p:grpSpPr>
+        <a:xfrm>
+          <a:off x="0" y="0"/>
+          <a:ext cx="0" cy="0"/>
+          <a:chOff x="0" y="0"/>
+          <a:chExt cx="0" cy="0"/>
+        </a:xfrm>
+      </p:grpSpPr>
+      <p:pic>
+        <p:nvPicPr>
+          <p:cNvPr id="4" name="3 Marcador de contenido" descr="C:\proyectoDeliberyApp\Propotipos de vistas\New Mockup 1.png"/>
+          <p:cNvPicPr>
+            <a:picLocks noGrp="1"/>
+          </p:cNvPicPr>
+          <p:nvPr>
+            <p:ph idx="1"/>
+          </p:nvPr>
+        </p:nvPicPr>
+        <p:blipFill>
+          <a:blip r:embed="rId2">
+            <a:extLst>
+              <a:ext uri="{28A0092B-C50C-407E-A947-70E740481C1C}">
+                <a14:useLocalDpi xmlns:a14="http://schemas.microsoft.com/office/drawing/2010/main" val="0"/>
+              </a:ext>
+            </a:extLst>
+          </a:blip>
+          <a:srcRect/>
+          <a:stretch>
+            <a:fillRect/>
+          </a:stretch>
+        </p:blipFill>
+        <p:spPr bwMode="auto">
+          <a:xfrm>
+            <a:off x="1381125" y="2105819"/>
+            <a:ext cx="6381750" cy="4048125"/>
+          </a:xfrm>
+          <a:prstGeom prst="rect">
+            <a:avLst/>
+          </a:prstGeom>
+          <a:noFill/>
+          <a:ln>
+            <a:noFill/>
+          </a:ln>
+        </p:spPr>
+      </p:pic>
+    </p:spTree>
+    <p:extLst>
+      <p:ext uri="{BB962C8B-B14F-4D97-AF65-F5344CB8AC3E}">
+        <p14:creationId xmlns:p14="http://schemas.microsoft.com/office/powerpoint/2010/main" val="731604007"/>
+      </p:ext>
+    </p:extLst>
+  </p:cSld>
+  <p:clrMapOvr>
+    <a:masterClrMapping/>
+  </p:clrMapOvr>
+</p:sld>
+</file>
+
+<file path=ppt/slides/slide16.xml><?xml version="1.0" encoding="utf-8"?>
+<p:sld xmlns:a="http://schemas.openxmlformats.org/drawingml/2006/main" xmlns:r="http://schemas.openxmlformats.org/officeDocument/2006/relationships" xmlns:p="http://schemas.openxmlformats.org/presentationml/2006/main">
+  <p:cSld>
+    <p:spTree>
+      <p:nvGrpSpPr>
+        <p:cNvPr id="1" name=""/>
+        <p:cNvGrpSpPr/>
+        <p:nvPr/>
+      </p:nvGrpSpPr>
+      <p:grpSpPr>
+        <a:xfrm>
+          <a:off x="0" y="0"/>
+          <a:ext cx="0" cy="0"/>
+          <a:chOff x="0" y="0"/>
+          <a:chExt cx="0" cy="0"/>
+        </a:xfrm>
+      </p:grpSpPr>
+      <p:pic>
+        <p:nvPicPr>
+          <p:cNvPr id="4" name="3 Marcador de contenido" descr="C:\proyectoDeliberyApp\Propotipos de vistas\Bienvenida.png"/>
+          <p:cNvPicPr>
+            <a:picLocks noGrp="1"/>
+          </p:cNvPicPr>
+          <p:nvPr>
+            <p:ph idx="1"/>
+          </p:nvPr>
+        </p:nvPicPr>
+        <p:blipFill>
+          <a:blip r:embed="rId2">
+            <a:extLst>
+              <a:ext uri="{28A0092B-C50C-407E-A947-70E740481C1C}">
+                <a14:useLocalDpi xmlns:a14="http://schemas.microsoft.com/office/drawing/2010/main" val="0"/>
+              </a:ext>
+            </a:extLst>
+          </a:blip>
+          <a:srcRect/>
+          <a:stretch>
+            <a:fillRect/>
+          </a:stretch>
+        </p:blipFill>
+        <p:spPr bwMode="auto">
+          <a:xfrm>
+            <a:off x="1381125" y="2067719"/>
+            <a:ext cx="6381750" cy="4124325"/>
+          </a:xfrm>
+          <a:prstGeom prst="rect">
+            <a:avLst/>
+          </a:prstGeom>
+          <a:noFill/>
+          <a:ln>
+            <a:noFill/>
+          </a:ln>
+        </p:spPr>
+      </p:pic>
+    </p:spTree>
+    <p:extLst>
+      <p:ext uri="{BB962C8B-B14F-4D97-AF65-F5344CB8AC3E}">
+        <p14:creationId xmlns:p14="http://schemas.microsoft.com/office/powerpoint/2010/main" val="1447868382"/>
+      </p:ext>
+    </p:extLst>
+  </p:cSld>
+  <p:clrMapOvr>
+    <a:masterClrMapping/>
+  </p:clrMapOvr>
+</p:sld>
+</file>
+
+<file path=ppt/slides/slide17.xml><?xml version="1.0" encoding="utf-8"?>
+<p:sld xmlns:a="http://schemas.openxmlformats.org/drawingml/2006/main" xmlns:r="http://schemas.openxmlformats.org/officeDocument/2006/relationships" xmlns:p="http://schemas.openxmlformats.org/presentationml/2006/main">
+  <p:cSld>
+    <p:spTree>
+      <p:nvGrpSpPr>
+        <p:cNvPr id="1" name=""/>
+        <p:cNvGrpSpPr/>
+        <p:nvPr/>
+      </p:nvGrpSpPr>
+      <p:grpSpPr>
+        <a:xfrm>
+          <a:off x="0" y="0"/>
+          <a:ext cx="0" cy="0"/>
+          <a:chOff x="0" y="0"/>
+          <a:chExt cx="0" cy="0"/>
+        </a:xfrm>
+      </p:grpSpPr>
+      <p:pic>
+        <p:nvPicPr>
+          <p:cNvPr id="4" name="3 Marcador de contenido" descr="C:\proyectoDeliberyApp\Propotipos de vistas\Registro Cliente.png"/>
+          <p:cNvPicPr>
+            <a:picLocks noGrp="1"/>
+          </p:cNvPicPr>
+          <p:nvPr>
+            <p:ph idx="1"/>
+          </p:nvPr>
+        </p:nvPicPr>
+        <p:blipFill>
+          <a:blip r:embed="rId2">
+            <a:extLst>
+              <a:ext uri="{28A0092B-C50C-407E-A947-70E740481C1C}">
+                <a14:useLocalDpi xmlns:a14="http://schemas.microsoft.com/office/drawing/2010/main" val="0"/>
+              </a:ext>
+            </a:extLst>
+          </a:blip>
+          <a:srcRect/>
+          <a:stretch>
+            <a:fillRect/>
+          </a:stretch>
+        </p:blipFill>
+        <p:spPr bwMode="auto">
+          <a:xfrm>
+            <a:off x="1381125" y="2105819"/>
+            <a:ext cx="6381750" cy="4048125"/>
+          </a:xfrm>
+          <a:prstGeom prst="rect">
+            <a:avLst/>
+          </a:prstGeom>
+          <a:noFill/>
+          <a:ln>
+            <a:noFill/>
+          </a:ln>
+        </p:spPr>
+      </p:pic>
+    </p:spTree>
+    <p:extLst>
+      <p:ext uri="{BB962C8B-B14F-4D97-AF65-F5344CB8AC3E}">
+        <p14:creationId xmlns:p14="http://schemas.microsoft.com/office/powerpoint/2010/main" val="1252314896"/>
+      </p:ext>
+    </p:extLst>
+  </p:cSld>
+  <p:clrMapOvr>
+    <a:masterClrMapping/>
+  </p:clrMapOvr>
+</p:sld>
+</file>
+
+<file path=ppt/slides/slide18.xml><?xml version="1.0" encoding="utf-8"?>
+<p:sld xmlns:a="http://schemas.openxmlformats.org/drawingml/2006/main" xmlns:r="http://schemas.openxmlformats.org/officeDocument/2006/relationships" xmlns:p="http://schemas.openxmlformats.org/presentationml/2006/main">
+  <p:cSld>
+    <p:spTree>
+      <p:nvGrpSpPr>
+        <p:cNvPr id="1" name=""/>
+        <p:cNvGrpSpPr/>
+        <p:nvPr/>
+      </p:nvGrpSpPr>
+      <p:grpSpPr>
+        <a:xfrm>
+          <a:off x="0" y="0"/>
+          <a:ext cx="0" cy="0"/>
+          <a:chOff x="0" y="0"/>
+          <a:chExt cx="0" cy="0"/>
+        </a:xfrm>
+      </p:grpSpPr>
+      <p:pic>
+        <p:nvPicPr>
+          <p:cNvPr id="4" name="3 Marcador de contenido" descr="C:\proyectoDeliberyApp\Propotipos de vistas\Selecion de Restautantes (Alternate 856m).png"/>
+          <p:cNvPicPr>
+            <a:picLocks noGrp="1"/>
+          </p:cNvPicPr>
+          <p:nvPr>
+            <p:ph idx="1"/>
+          </p:nvPr>
+        </p:nvPicPr>
+        <p:blipFill>
+          <a:blip r:embed="rId2">
+            <a:extLst>
+              <a:ext uri="{28A0092B-C50C-407E-A947-70E740481C1C}">
+                <a14:useLocalDpi xmlns:a14="http://schemas.microsoft.com/office/drawing/2010/main" val="0"/>
+              </a:ext>
+            </a:extLst>
+          </a:blip>
+          <a:srcRect/>
+          <a:stretch>
+            <a:fillRect/>
+          </a:stretch>
+        </p:blipFill>
+        <p:spPr bwMode="auto">
+          <a:xfrm>
+            <a:off x="1381125" y="2067719"/>
+            <a:ext cx="6381750" cy="4124325"/>
+          </a:xfrm>
+          <a:prstGeom prst="rect">
+            <a:avLst/>
+          </a:prstGeom>
+          <a:noFill/>
+          <a:ln>
+            <a:noFill/>
+          </a:ln>
+        </p:spPr>
+      </p:pic>
+    </p:spTree>
+    <p:extLst>
+      <p:ext uri="{BB962C8B-B14F-4D97-AF65-F5344CB8AC3E}">
+        <p14:creationId xmlns:p14="http://schemas.microsoft.com/office/powerpoint/2010/main" val="2849871865"/>
+      </p:ext>
+    </p:extLst>
+  </p:cSld>
+  <p:clrMapOvr>
+    <a:masterClrMapping/>
+  </p:clrMapOvr>
+</p:sld>
+</file>
+
+<file path=ppt/slides/slide19.xml><?xml version="1.0" encoding="utf-8"?>
+<p:sld xmlns:a="http://schemas.openxmlformats.org/drawingml/2006/main" xmlns:r="http://schemas.openxmlformats.org/officeDocument/2006/relationships" xmlns:p="http://schemas.openxmlformats.org/presentationml/2006/main">
+  <p:cSld>
+    <p:spTree>
+      <p:nvGrpSpPr>
+        <p:cNvPr id="1" name=""/>
+        <p:cNvGrpSpPr/>
+        <p:nvPr/>
+      </p:nvGrpSpPr>
+      <p:grpSpPr>
+        <a:xfrm>
+          <a:off x="0" y="0"/>
+          <a:ext cx="0" cy="0"/>
+          <a:chOff x="0" y="0"/>
+          <a:chExt cx="0" cy="0"/>
+        </a:xfrm>
+      </p:grpSpPr>
+      <p:pic>
+        <p:nvPicPr>
+          <p:cNvPr id="4" name="3 Marcador de contenido" descr="C:\proyectoDeliberyApp\Propotipos de vistas\Seleccion de menu.png"/>
+          <p:cNvPicPr>
+            <a:picLocks noGrp="1"/>
+          </p:cNvPicPr>
+          <p:nvPr>
+            <p:ph idx="1"/>
+          </p:nvPr>
+        </p:nvPicPr>
+        <p:blipFill>
+          <a:blip r:embed="rId2">
+            <a:extLst>
+              <a:ext uri="{28A0092B-C50C-407E-A947-70E740481C1C}">
+                <a14:useLocalDpi xmlns:a14="http://schemas.microsoft.com/office/drawing/2010/main" val="0"/>
+              </a:ext>
+            </a:extLst>
+          </a:blip>
+          <a:srcRect/>
+          <a:stretch>
+            <a:fillRect/>
+          </a:stretch>
+        </p:blipFill>
+        <p:spPr bwMode="auto">
+          <a:xfrm>
+            <a:off x="1381125" y="2105819"/>
+            <a:ext cx="6381750" cy="4048125"/>
+          </a:xfrm>
+          <a:prstGeom prst="rect">
+            <a:avLst/>
+          </a:prstGeom>
+          <a:noFill/>
+          <a:ln>
+            <a:noFill/>
+          </a:ln>
+        </p:spPr>
+      </p:pic>
+    </p:spTree>
+    <p:extLst>
+      <p:ext uri="{BB962C8B-B14F-4D97-AF65-F5344CB8AC3E}">
+        <p14:creationId xmlns:p14="http://schemas.microsoft.com/office/powerpoint/2010/main" val="2398759630"/>
+      </p:ext>
+    </p:extLst>
+  </p:cSld>
+  <p:clrMapOvr>
+    <a:masterClrMapping/>
+  </p:clrMapOvr>
+</p:sld>
+</file>
+
+<file path=ppt/slides/slide2.xml><?xml version="1.0" encoding="utf-8"?>
+<p:sld xmlns:a="http://schemas.openxmlformats.org/drawingml/2006/main" xmlns:r="http://schemas.openxmlformats.org/officeDocument/2006/relationships" xmlns:p="http://schemas.openxmlformats.org/presentationml/2006/main">
+  <p:cSld>
+    <p:spTree>
+      <p:nvGrpSpPr>
+        <p:cNvPr id="1" name=""/>
+        <p:cNvGrpSpPr/>
+        <p:nvPr/>
+      </p:nvGrpSpPr>
+      <p:grpSpPr>
+        <a:xfrm>
+          <a:off x="0" y="0"/>
+          <a:ext cx="0" cy="0"/>
+          <a:chOff x="0" y="0"/>
+          <a:chExt cx="0" cy="0"/>
+        </a:xfrm>
+      </p:grpSpPr>
+      <p:sp>
+        <p:nvSpPr>
+          <p:cNvPr id="2" name="1 Título"/>
+          <p:cNvSpPr>
+            <a:spLocks noGrp="1"/>
+          </p:cNvSpPr>
+          <p:nvPr>
+            <p:ph type="title"/>
+          </p:nvPr>
+        </p:nvSpPr>
         <p:spPr/>
         <p:txBody>
           <a:bodyPr/>
           <a:lstStyle/>
           <a:p>
+            <a:pPr algn="ctr"/>
+            <a:r>
+              <a:rPr lang="es-ES" dirty="0"/>
+              <a:t>O</a:t>
+            </a:r>
+            <a:r>
+              <a:rPr lang="es-ES" dirty="0" smtClean="0"/>
+              <a:t>bjetivos</a:t>
+            </a:r>
+            <a:endParaRPr lang="es-ES" dirty="0"/>
+          </a:p>
+        </p:txBody>
+      </p:sp>
+      <p:sp>
+        <p:nvSpPr>
+          <p:cNvPr id="3" name="2 Marcador de contenido"/>
+          <p:cNvSpPr>
+            <a:spLocks noGrp="1"/>
+          </p:cNvSpPr>
+          <p:nvPr>
+            <p:ph idx="1"/>
+          </p:nvPr>
+        </p:nvSpPr>
+        <p:spPr/>
+        <p:txBody>
+          <a:bodyPr>
+            <a:normAutofit/>
+          </a:bodyPr>
+          <a:lstStyle/>
+          <a:p>
+            <a:r>
+              <a:rPr lang="es-ES" dirty="0"/>
+              <a:t>Los objetivos del sistema son minimizar los problemas referentes a la gestión de pedidos de parte del cliente, optimizar la gestión de ventas del restaurante. </a:t>
+            </a:r>
+            <a:endParaRPr lang="es-ES" dirty="0" smtClean="0"/>
+          </a:p>
+          <a:p>
+            <a:r>
+              <a:rPr lang="es-ES" dirty="0"/>
+              <a:t>El beneficio con que cuenta el sistema es el de agilizar los pedidos de tal forma que no se pierda tiempo con las llamadas. </a:t>
+            </a:r>
+          </a:p>
+          <a:p>
+            <a:r>
+              <a:rPr lang="es-ES" dirty="0"/>
+              <a:t>La meta a alcanzar es mejorar el servicio de </a:t>
+            </a:r>
+            <a:r>
+              <a:rPr lang="es-ES" dirty="0" err="1"/>
+              <a:t>delivery</a:t>
+            </a:r>
+            <a:r>
+              <a:rPr lang="es-ES" dirty="0"/>
+              <a:t> y aumentar las ventas.</a:t>
+            </a:r>
+          </a:p>
+          <a:p>
+            <a:endParaRPr lang="es-ES" dirty="0"/>
+          </a:p>
+          <a:p>
+            <a:endParaRPr lang="es-ES" dirty="0"/>
+          </a:p>
+        </p:txBody>
+      </p:sp>
+    </p:spTree>
+    <p:extLst>
+      <p:ext uri="{BB962C8B-B14F-4D97-AF65-F5344CB8AC3E}">
+        <p14:creationId xmlns:p14="http://schemas.microsoft.com/office/powerpoint/2010/main" val="3246394978"/>
+      </p:ext>
+    </p:extLst>
+  </p:cSld>
+  <p:clrMapOvr>
+    <a:masterClrMapping/>
+  </p:clrMapOvr>
+</p:sld>
+</file>
+
+<file path=ppt/slides/slide20.xml><?xml version="1.0" encoding="utf-8"?>
+<p:sld xmlns:a="http://schemas.openxmlformats.org/drawingml/2006/main" xmlns:r="http://schemas.openxmlformats.org/officeDocument/2006/relationships" xmlns:p="http://schemas.openxmlformats.org/presentationml/2006/main">
+  <p:cSld>
+    <p:spTree>
+      <p:nvGrpSpPr>
+        <p:cNvPr id="1" name=""/>
+        <p:cNvGrpSpPr/>
+        <p:nvPr/>
+      </p:nvGrpSpPr>
+      <p:grpSpPr>
+        <a:xfrm>
+          <a:off x="0" y="0"/>
+          <a:ext cx="0" cy="0"/>
+          <a:chOff x="0" y="0"/>
+          <a:chExt cx="0" cy="0"/>
+        </a:xfrm>
+      </p:grpSpPr>
+      <p:pic>
+        <p:nvPicPr>
+          <p:cNvPr id="4" name="3 Marcador de contenido" descr="C:\proyectoDeliberyApp\Propotipos de vistas\Fin Pedido.png"/>
+          <p:cNvPicPr>
+            <a:picLocks noGrp="1"/>
+          </p:cNvPicPr>
+          <p:nvPr>
+            <p:ph idx="1"/>
+          </p:nvPr>
+        </p:nvPicPr>
+        <p:blipFill>
+          <a:blip r:embed="rId2">
+            <a:extLst>
+              <a:ext uri="{28A0092B-C50C-407E-A947-70E740481C1C}">
+                <a14:useLocalDpi xmlns:a14="http://schemas.microsoft.com/office/drawing/2010/main" val="0"/>
+              </a:ext>
+            </a:extLst>
+          </a:blip>
+          <a:srcRect/>
+          <a:stretch>
+            <a:fillRect/>
+          </a:stretch>
+        </p:blipFill>
+        <p:spPr bwMode="auto">
+          <a:xfrm>
+            <a:off x="1381125" y="2105819"/>
+            <a:ext cx="6381750" cy="4048125"/>
+          </a:xfrm>
+          <a:prstGeom prst="rect">
+            <a:avLst/>
+          </a:prstGeom>
+          <a:noFill/>
+          <a:ln>
+            <a:noFill/>
+          </a:ln>
+        </p:spPr>
+      </p:pic>
+    </p:spTree>
+    <p:extLst>
+      <p:ext uri="{BB962C8B-B14F-4D97-AF65-F5344CB8AC3E}">
+        <p14:creationId xmlns:p14="http://schemas.microsoft.com/office/powerpoint/2010/main" val="542597209"/>
+      </p:ext>
+    </p:extLst>
+  </p:cSld>
+  <p:clrMapOvr>
+    <a:masterClrMapping/>
+  </p:clrMapOvr>
+</p:sld>
+</file>
+
+<file path=ppt/slides/slide21.xml><?xml version="1.0" encoding="utf-8"?>
+<p:sld xmlns:a="http://schemas.openxmlformats.org/drawingml/2006/main" xmlns:r="http://schemas.openxmlformats.org/officeDocument/2006/relationships" xmlns:p="http://schemas.openxmlformats.org/presentationml/2006/main">
+  <p:cSld>
+    <p:spTree>
+      <p:nvGrpSpPr>
+        <p:cNvPr id="1" name=""/>
+        <p:cNvGrpSpPr/>
+        <p:nvPr/>
+      </p:nvGrpSpPr>
+      <p:grpSpPr>
+        <a:xfrm>
+          <a:off x="0" y="0"/>
+          <a:ext cx="0" cy="0"/>
+          <a:chOff x="0" y="0"/>
+          <a:chExt cx="0" cy="0"/>
+        </a:xfrm>
+      </p:grpSpPr>
+      <p:pic>
+        <p:nvPicPr>
+          <p:cNvPr id="4" name="3 Marcador de contenido" descr="C:\proyectoDeliberyApp\Propotipos de vistas\Recepcin de pedidos.png"/>
+          <p:cNvPicPr>
+            <a:picLocks noGrp="1"/>
+          </p:cNvPicPr>
+          <p:nvPr>
+            <p:ph idx="1"/>
+          </p:nvPr>
+        </p:nvPicPr>
+        <p:blipFill>
+          <a:blip r:embed="rId2">
+            <a:extLst>
+              <a:ext uri="{28A0092B-C50C-407E-A947-70E740481C1C}">
+                <a14:useLocalDpi xmlns:a14="http://schemas.microsoft.com/office/drawing/2010/main" val="0"/>
+              </a:ext>
+            </a:extLst>
+          </a:blip>
+          <a:srcRect/>
+          <a:stretch>
+            <a:fillRect/>
+          </a:stretch>
+        </p:blipFill>
+        <p:spPr bwMode="auto">
+          <a:xfrm>
+            <a:off x="1381125" y="2105819"/>
+            <a:ext cx="6381750" cy="4048125"/>
+          </a:xfrm>
+          <a:prstGeom prst="rect">
+            <a:avLst/>
+          </a:prstGeom>
+          <a:noFill/>
+          <a:ln>
+            <a:noFill/>
+          </a:ln>
+        </p:spPr>
+      </p:pic>
+    </p:spTree>
+    <p:extLst>
+      <p:ext uri="{BB962C8B-B14F-4D97-AF65-F5344CB8AC3E}">
+        <p14:creationId xmlns:p14="http://schemas.microsoft.com/office/powerpoint/2010/main" val="2020702367"/>
+      </p:ext>
+    </p:extLst>
+  </p:cSld>
+  <p:clrMapOvr>
+    <a:masterClrMapping/>
+  </p:clrMapOvr>
+</p:sld>
+</file>
+
+<file path=ppt/slides/slide22.xml><?xml version="1.0" encoding="utf-8"?>
+<p:sld xmlns:a="http://schemas.openxmlformats.org/drawingml/2006/main" xmlns:r="http://schemas.openxmlformats.org/officeDocument/2006/relationships" xmlns:p="http://schemas.openxmlformats.org/presentationml/2006/main">
+  <p:cSld>
+    <p:spTree>
+      <p:nvGrpSpPr>
+        <p:cNvPr id="1" name=""/>
+        <p:cNvGrpSpPr/>
+        <p:nvPr/>
+      </p:nvGrpSpPr>
+      <p:grpSpPr>
+        <a:xfrm>
+          <a:off x="0" y="0"/>
+          <a:ext cx="0" cy="0"/>
+          <a:chOff x="0" y="0"/>
+          <a:chExt cx="0" cy="0"/>
+        </a:xfrm>
+      </p:grpSpPr>
+      <p:pic>
+        <p:nvPicPr>
+          <p:cNvPr id="4" name="3 Marcador de contenido" descr="C:\proyectoDeliberyApp\Propotipos de vistas\Cocina.png"/>
+          <p:cNvPicPr>
+            <a:picLocks noGrp="1"/>
+          </p:cNvPicPr>
+          <p:nvPr>
+            <p:ph idx="1"/>
+          </p:nvPr>
+        </p:nvPicPr>
+        <p:blipFill>
+          <a:blip r:embed="rId2">
+            <a:extLst>
+              <a:ext uri="{28A0092B-C50C-407E-A947-70E740481C1C}">
+                <a14:useLocalDpi xmlns:a14="http://schemas.microsoft.com/office/drawing/2010/main" val="0"/>
+              </a:ext>
+            </a:extLst>
+          </a:blip>
+          <a:srcRect/>
+          <a:stretch>
+            <a:fillRect/>
+          </a:stretch>
+        </p:blipFill>
+        <p:spPr bwMode="auto">
+          <a:xfrm>
+            <a:off x="1381125" y="2105819"/>
+            <a:ext cx="6381750" cy="4048125"/>
+          </a:xfrm>
+          <a:prstGeom prst="rect">
+            <a:avLst/>
+          </a:prstGeom>
+          <a:noFill/>
+          <a:ln>
+            <a:noFill/>
+          </a:ln>
+        </p:spPr>
+      </p:pic>
+    </p:spTree>
+    <p:extLst>
+      <p:ext uri="{BB962C8B-B14F-4D97-AF65-F5344CB8AC3E}">
+        <p14:creationId xmlns:p14="http://schemas.microsoft.com/office/powerpoint/2010/main" val="1987229935"/>
+      </p:ext>
+    </p:extLst>
+  </p:cSld>
+  <p:clrMapOvr>
+    <a:masterClrMapping/>
+  </p:clrMapOvr>
+</p:sld>
+</file>
+
+<file path=ppt/slides/slide23.xml><?xml version="1.0" encoding="utf-8"?>
+<p:sld xmlns:a="http://schemas.openxmlformats.org/drawingml/2006/main" xmlns:r="http://schemas.openxmlformats.org/officeDocument/2006/relationships" xmlns:p="http://schemas.openxmlformats.org/presentationml/2006/main">
+  <p:cSld>
+    <p:spTree>
+      <p:nvGrpSpPr>
+        <p:cNvPr id="1" name=""/>
+        <p:cNvGrpSpPr/>
+        <p:nvPr/>
+      </p:nvGrpSpPr>
+      <p:grpSpPr>
+        <a:xfrm>
+          <a:off x="0" y="0"/>
+          <a:ext cx="0" cy="0"/>
+          <a:chOff x="0" y="0"/>
+          <a:chExt cx="0" cy="0"/>
+        </a:xfrm>
+      </p:grpSpPr>
+      <p:pic>
+        <p:nvPicPr>
+          <p:cNvPr id="4" name="3 Marcador de contenido" descr="C:\proyectoDeliberyApp\Propotipos de vistas\Caja.png"/>
+          <p:cNvPicPr>
+            <a:picLocks noGrp="1"/>
+          </p:cNvPicPr>
+          <p:nvPr>
+            <p:ph idx="1"/>
+          </p:nvPr>
+        </p:nvPicPr>
+        <p:blipFill>
+          <a:blip r:embed="rId2">
+            <a:extLst>
+              <a:ext uri="{28A0092B-C50C-407E-A947-70E740481C1C}">
+                <a14:useLocalDpi xmlns:a14="http://schemas.microsoft.com/office/drawing/2010/main" val="0"/>
+              </a:ext>
+            </a:extLst>
+          </a:blip>
+          <a:srcRect/>
+          <a:stretch>
+            <a:fillRect/>
+          </a:stretch>
+        </p:blipFill>
+        <p:spPr bwMode="auto">
+          <a:xfrm>
+            <a:off x="1381125" y="2117179"/>
+            <a:ext cx="6381750" cy="4048125"/>
+          </a:xfrm>
+          <a:prstGeom prst="rect">
+            <a:avLst/>
+          </a:prstGeom>
+          <a:noFill/>
+          <a:ln>
+            <a:noFill/>
+          </a:ln>
+        </p:spPr>
+      </p:pic>
+    </p:spTree>
+    <p:extLst>
+      <p:ext uri="{BB962C8B-B14F-4D97-AF65-F5344CB8AC3E}">
+        <p14:creationId xmlns:p14="http://schemas.microsoft.com/office/powerpoint/2010/main" val="399025501"/>
+      </p:ext>
+    </p:extLst>
+  </p:cSld>
+  <p:clrMapOvr>
+    <a:masterClrMapping/>
+  </p:clrMapOvr>
+</p:sld>
+</file>
+
+<file path=ppt/slides/slide24.xml><?xml version="1.0" encoding="utf-8"?>
+<p:sld xmlns:a="http://schemas.openxmlformats.org/drawingml/2006/main" xmlns:r="http://schemas.openxmlformats.org/officeDocument/2006/relationships" xmlns:p="http://schemas.openxmlformats.org/presentationml/2006/main">
+  <p:cSld>
+    <p:spTree>
+      <p:nvGrpSpPr>
+        <p:cNvPr id="1" name=""/>
+        <p:cNvGrpSpPr/>
+        <p:nvPr/>
+      </p:nvGrpSpPr>
+      <p:grpSpPr>
+        <a:xfrm>
+          <a:off x="0" y="0"/>
+          <a:ext cx="0" cy="0"/>
+          <a:chOff x="0" y="0"/>
+          <a:chExt cx="0" cy="0"/>
+        </a:xfrm>
+      </p:grpSpPr>
+      <p:sp>
+        <p:nvSpPr>
+          <p:cNvPr id="2" name="1 Título"/>
+          <p:cNvSpPr>
+            <a:spLocks noGrp="1"/>
+          </p:cNvSpPr>
+          <p:nvPr>
+            <p:ph type="title"/>
+          </p:nvPr>
+        </p:nvSpPr>
+        <p:spPr/>
+        <p:txBody>
+          <a:bodyPr/>
+          <a:lstStyle/>
+          <a:p>
+            <a:pPr algn="ctr"/>
+            <a:r>
+              <a:rPr lang="es-ES" dirty="0" smtClean="0"/>
+              <a:t>Herramientas colaborativas</a:t>
+            </a:r>
+            <a:endParaRPr lang="es-ES" dirty="0"/>
+          </a:p>
+        </p:txBody>
+      </p:sp>
+      <p:sp>
+        <p:nvSpPr>
+          <p:cNvPr id="3" name="2 Marcador de contenido"/>
+          <p:cNvSpPr>
+            <a:spLocks noGrp="1"/>
+          </p:cNvSpPr>
+          <p:nvPr>
+            <p:ph idx="1"/>
+          </p:nvPr>
+        </p:nvSpPr>
+        <p:spPr/>
+        <p:txBody>
+          <a:bodyPr/>
+          <a:lstStyle/>
+          <a:p>
+            <a:pPr marL="0" indent="0" algn="ctr">
+              <a:buNone/>
+            </a:pPr>
+            <a:r>
+              <a:rPr lang="es-ES" dirty="0"/>
+              <a:t>Durante el proceso de gestión de configuración se </a:t>
+            </a:r>
+            <a:r>
+              <a:rPr lang="es-ES" dirty="0" smtClean="0"/>
+              <a:t>utilizo </a:t>
+            </a:r>
+            <a:r>
+              <a:rPr lang="es-ES" dirty="0"/>
+              <a:t>la herramienta </a:t>
+            </a:r>
+            <a:r>
+              <a:rPr lang="es-ES" dirty="0" err="1"/>
+              <a:t>Github</a:t>
+            </a:r>
+            <a:r>
+              <a:rPr lang="es-ES" dirty="0"/>
+              <a:t> para el  control de versiones del proyecto. Esta gestión se </a:t>
+            </a:r>
+            <a:r>
+              <a:rPr lang="es-ES" dirty="0" smtClean="0"/>
+              <a:t>hizo </a:t>
+            </a:r>
+            <a:r>
+              <a:rPr lang="es-ES" dirty="0"/>
+              <a:t>mediante la herramienta </a:t>
+            </a:r>
+            <a:r>
+              <a:rPr lang="es-ES" dirty="0" err="1"/>
+              <a:t>Zenhub</a:t>
+            </a:r>
+            <a:r>
+              <a:rPr lang="es-ES" dirty="0"/>
+              <a:t> para los documentos y  Sublime para el código </a:t>
+            </a:r>
+            <a:r>
+              <a:rPr lang="es-ES" dirty="0" smtClean="0"/>
+              <a:t>fuente.</a:t>
+            </a:r>
+            <a:endParaRPr lang="es-ES" dirty="0"/>
+          </a:p>
+          <a:p>
+            <a:endParaRPr lang="es-ES" dirty="0"/>
+          </a:p>
+        </p:txBody>
+      </p:sp>
+    </p:spTree>
+    <p:extLst>
+      <p:ext uri="{BB962C8B-B14F-4D97-AF65-F5344CB8AC3E}">
+        <p14:creationId xmlns:p14="http://schemas.microsoft.com/office/powerpoint/2010/main" val="716299305"/>
+      </p:ext>
+    </p:extLst>
+  </p:cSld>
+  <p:clrMapOvr>
+    <a:masterClrMapping/>
+  </p:clrMapOvr>
+</p:sld>
+</file>
+
+<file path=ppt/slides/slide25.xml><?xml version="1.0" encoding="utf-8"?>
+<p:sld xmlns:a="http://schemas.openxmlformats.org/drawingml/2006/main" xmlns:r="http://schemas.openxmlformats.org/officeDocument/2006/relationships" xmlns:p="http://schemas.openxmlformats.org/presentationml/2006/main">
+  <p:cSld>
+    <p:spTree>
+      <p:nvGrpSpPr>
+        <p:cNvPr id="1" name=""/>
+        <p:cNvGrpSpPr/>
+        <p:nvPr/>
+      </p:nvGrpSpPr>
+      <p:grpSpPr>
+        <a:xfrm>
+          <a:off x="0" y="0"/>
+          <a:ext cx="0" cy="0"/>
+          <a:chOff x="0" y="0"/>
+          <a:chExt cx="0" cy="0"/>
+        </a:xfrm>
+      </p:grpSpPr>
+      <p:sp>
+        <p:nvSpPr>
+          <p:cNvPr id="2" name="1 Título"/>
+          <p:cNvSpPr>
+            <a:spLocks noGrp="1"/>
+          </p:cNvSpPr>
+          <p:nvPr>
+            <p:ph type="title"/>
+          </p:nvPr>
+        </p:nvSpPr>
+        <p:spPr/>
+        <p:txBody>
+          <a:bodyPr/>
+          <a:lstStyle/>
+          <a:p>
+            <a:pPr algn="ctr"/>
+            <a:r>
+              <a:rPr lang="es-ES" dirty="0" smtClean="0"/>
+              <a:t>Entorno de desarrollo</a:t>
+            </a:r>
+            <a:endParaRPr lang="es-ES" dirty="0"/>
+          </a:p>
+        </p:txBody>
+      </p:sp>
+      <p:pic>
+        <p:nvPicPr>
+          <p:cNvPr id="3074" name="Picture 2" descr="D:\alas\Downloads\visual_studio_purple-930x462.png"/>
+          <p:cNvPicPr>
+            <a:picLocks noGrp="1" noChangeAspect="1" noChangeArrowheads="1"/>
+          </p:cNvPicPr>
+          <p:nvPr>
+            <p:ph idx="1"/>
+          </p:nvPr>
+        </p:nvPicPr>
+        <p:blipFill>
+          <a:blip r:embed="rId2">
+            <a:extLst>
+              <a:ext uri="{28A0092B-C50C-407E-A947-70E740481C1C}">
+                <a14:useLocalDpi xmlns:a14="http://schemas.microsoft.com/office/drawing/2010/main" val="0"/>
+              </a:ext>
+            </a:extLst>
+          </a:blip>
+          <a:srcRect/>
+          <a:stretch>
+            <a:fillRect/>
+          </a:stretch>
+        </p:blipFill>
+        <p:spPr bwMode="auto">
+          <a:xfrm>
+            <a:off x="-85683" y="1778383"/>
+            <a:ext cx="5017723" cy="2492675"/>
+          </a:xfrm>
+          <a:prstGeom prst="rect">
+            <a:avLst/>
+          </a:prstGeom>
+          <a:noFill/>
+          <a:extLst>
+            <a:ext uri="{909E8E84-426E-40DD-AFC4-6F175D3DCCD1}">
+              <a14:hiddenFill xmlns:a14="http://schemas.microsoft.com/office/drawing/2010/main">
+                <a:solidFill>
+                  <a:srgbClr val="FFFFFF"/>
+                </a:solidFill>
+              </a14:hiddenFill>
+            </a:ext>
+          </a:extLst>
+        </p:spPr>
+      </p:pic>
+      <p:sp>
+        <p:nvSpPr>
+          <p:cNvPr id="4" name="AutoShape 4" descr="Resultado de imagen de entity framework logo"/>
+          <p:cNvSpPr>
+            <a:spLocks noChangeAspect="1" noChangeArrowheads="1"/>
+          </p:cNvSpPr>
+          <p:nvPr/>
+        </p:nvSpPr>
+        <p:spPr bwMode="auto">
+          <a:xfrm>
+            <a:off x="155575" y="-144463"/>
+            <a:ext cx="304800" cy="304801"/>
+          </a:xfrm>
+          <a:prstGeom prst="rect">
+            <a:avLst/>
+          </a:prstGeom>
+          <a:noFill/>
+          <a:extLst>
+            <a:ext uri="{909E8E84-426E-40DD-AFC4-6F175D3DCCD1}">
+              <a14:hiddenFill xmlns:a14="http://schemas.microsoft.com/office/drawing/2010/main">
+                <a:solidFill>
+                  <a:srgbClr val="FFFFFF"/>
+                </a:solidFill>
+              </a14:hiddenFill>
+            </a:ext>
+          </a:extLst>
+        </p:spPr>
+        <p:txBody>
+          <a:bodyPr vert="horz" wrap="square" lIns="91440" tIns="45720" rIns="91440" bIns="45720" numCol="1" anchor="t" anchorCtr="0" compatLnSpc="1">
+            <a:prstTxWarp prst="textNoShape">
+              <a:avLst/>
+            </a:prstTxWarp>
+          </a:bodyPr>
+          <a:lstStyle/>
+          <a:p>
+            <a:endParaRPr lang="es-ES"/>
+          </a:p>
+        </p:txBody>
+      </p:sp>
+      <p:pic>
+        <p:nvPicPr>
+          <p:cNvPr id="3077" name="Picture 5" descr="D:\alas\Downloads\entity-framework-logo-750x281.jpg"/>
+          <p:cNvPicPr>
+            <a:picLocks noChangeAspect="1" noChangeArrowheads="1"/>
+          </p:cNvPicPr>
+          <p:nvPr/>
+        </p:nvPicPr>
+        <p:blipFill>
+          <a:blip r:embed="rId3">
+            <a:extLst>
+              <a:ext uri="{28A0092B-C50C-407E-A947-70E740481C1C}">
+                <a14:useLocalDpi xmlns:a14="http://schemas.microsoft.com/office/drawing/2010/main" val="0"/>
+              </a:ext>
+            </a:extLst>
+          </a:blip>
+          <a:srcRect/>
+          <a:stretch>
+            <a:fillRect/>
+          </a:stretch>
+        </p:blipFill>
+        <p:spPr bwMode="auto">
+          <a:xfrm>
+            <a:off x="4491035" y="2276872"/>
+            <a:ext cx="3992077" cy="1495698"/>
+          </a:xfrm>
+          <a:prstGeom prst="rect">
+            <a:avLst/>
+          </a:prstGeom>
+          <a:noFill/>
+          <a:extLst>
+            <a:ext uri="{909E8E84-426E-40DD-AFC4-6F175D3DCCD1}">
+              <a14:hiddenFill xmlns:a14="http://schemas.microsoft.com/office/drawing/2010/main">
+                <a:solidFill>
+                  <a:srgbClr val="FFFFFF"/>
+                </a:solidFill>
+              </a14:hiddenFill>
+            </a:ext>
+          </a:extLst>
+        </p:spPr>
+      </p:pic>
+      <p:pic>
+        <p:nvPicPr>
+          <p:cNvPr id="3079" name="Picture 7" descr="http://programacion.net/files/article/20160104050126_aspnet.jpg"/>
+          <p:cNvPicPr>
+            <a:picLocks noChangeAspect="1" noChangeArrowheads="1"/>
+          </p:cNvPicPr>
+          <p:nvPr/>
+        </p:nvPicPr>
+        <p:blipFill>
+          <a:blip r:embed="rId4">
+            <a:extLst>
+              <a:ext uri="{28A0092B-C50C-407E-A947-70E740481C1C}">
+                <a14:useLocalDpi xmlns:a14="http://schemas.microsoft.com/office/drawing/2010/main" val="0"/>
+              </a:ext>
+            </a:extLst>
+          </a:blip>
+          <a:srcRect/>
+          <a:stretch>
+            <a:fillRect/>
+          </a:stretch>
+        </p:blipFill>
+        <p:spPr bwMode="auto">
+          <a:xfrm>
+            <a:off x="2195736" y="4149080"/>
+            <a:ext cx="4005935" cy="2002968"/>
+          </a:xfrm>
+          <a:prstGeom prst="rect">
+            <a:avLst/>
+          </a:prstGeom>
+          <a:noFill/>
+          <a:extLst>
+            <a:ext uri="{909E8E84-426E-40DD-AFC4-6F175D3DCCD1}">
+              <a14:hiddenFill xmlns:a14="http://schemas.microsoft.com/office/drawing/2010/main">
+                <a:solidFill>
+                  <a:srgbClr val="FFFFFF"/>
+                </a:solidFill>
+              </a14:hiddenFill>
+            </a:ext>
+          </a:extLst>
+        </p:spPr>
+      </p:pic>
+    </p:spTree>
+    <p:extLst>
+      <p:ext uri="{BB962C8B-B14F-4D97-AF65-F5344CB8AC3E}">
+        <p14:creationId xmlns:p14="http://schemas.microsoft.com/office/powerpoint/2010/main" val="775879315"/>
+      </p:ext>
+    </p:extLst>
+  </p:cSld>
+  <p:clrMapOvr>
+    <a:masterClrMapping/>
+  </p:clrMapOvr>
+</p:sld>
+</file>
+
+<file path=ppt/slides/slide26.xml><?xml version="1.0" encoding="utf-8"?>
+<p:sld xmlns:a="http://schemas.openxmlformats.org/drawingml/2006/main" xmlns:r="http://schemas.openxmlformats.org/officeDocument/2006/relationships" xmlns:p="http://schemas.openxmlformats.org/presentationml/2006/main">
+  <p:cSld>
+    <p:spTree>
+      <p:nvGrpSpPr>
+        <p:cNvPr id="1" name=""/>
+        <p:cNvGrpSpPr/>
+        <p:nvPr/>
+      </p:nvGrpSpPr>
+      <p:grpSpPr>
+        <a:xfrm>
+          <a:off x="0" y="0"/>
+          <a:ext cx="0" cy="0"/>
+          <a:chOff x="0" y="0"/>
+          <a:chExt cx="0" cy="0"/>
+        </a:xfrm>
+      </p:grpSpPr>
+      <p:sp>
+        <p:nvSpPr>
+          <p:cNvPr id="2" name="1 Título"/>
+          <p:cNvSpPr>
+            <a:spLocks noGrp="1"/>
+          </p:cNvSpPr>
+          <p:nvPr>
+            <p:ph type="title"/>
+          </p:nvPr>
+        </p:nvSpPr>
+        <p:spPr/>
+        <p:txBody>
+          <a:bodyPr/>
+          <a:lstStyle/>
+          <a:p>
+            <a:pPr algn="ctr"/>
             <a:r>
               <a:rPr lang="es-ES" dirty="0" smtClean="0"/>
               <a:t>Diagramas de UML</a:t>
@@ -4805,22 +6008,38 @@
         </p:nvSpPr>
         <p:spPr/>
         <p:txBody>
-          <a:bodyPr/>
-          <a:lstStyle/>
-          <a:p>
-            <a:r>
-              <a:rPr lang="es-ES" dirty="0" smtClean="0">
-                <a:solidFill>
-                  <a:srgbClr val="FF0000"/>
-                </a:solidFill>
-              </a:rPr>
-              <a:t>¿Por qué es importante usar?</a:t>
-            </a:r>
-            <a:endParaRPr lang="es-ES" dirty="0">
-              <a:solidFill>
-                <a:srgbClr val="FF0000"/>
-              </a:solidFill>
-            </a:endParaRPr>
+          <a:bodyPr>
+            <a:normAutofit/>
+          </a:bodyPr>
+          <a:lstStyle/>
+          <a:p>
+            <a:endParaRPr lang="es-ES" dirty="0" smtClean="0"/>
+          </a:p>
+          <a:p>
+            <a:r>
+              <a:rPr lang="es-ES" dirty="0" smtClean="0"/>
+              <a:t>UML </a:t>
+            </a:r>
+            <a:r>
+              <a:rPr lang="es-ES" dirty="0"/>
+              <a:t>(Lenguaje unificado de Modelado) es un conjunto de normas y estándares gráficos respecto a cómo se deben representar los esquemas relativos al software.</a:t>
+            </a:r>
+          </a:p>
+          <a:p>
+            <a:r>
+              <a:rPr lang="es-ES" dirty="0"/>
+              <a:t>Mediante UML se pueden establecer los requerimientos y la estructura necesaria para desarrollar un sistema antes de codificarlo (escribirlo).</a:t>
+            </a:r>
+          </a:p>
+          <a:p>
+            <a:pPr marL="0" indent="0">
+              <a:buNone/>
+            </a:pPr>
+            <a:r>
+              <a:rPr lang="es-ES" dirty="0" smtClean="0"/>
+              <a:t> </a:t>
+            </a:r>
+            <a:endParaRPr lang="es-ES" dirty="0"/>
           </a:p>
         </p:txBody>
       </p:sp>
@@ -4837,7 +6056,7 @@
 </p:sld>
 </file>
 
-<file path=ppt/slides/slide13.xml><?xml version="1.0" encoding="utf-8"?>
+<file path=ppt/slides/slide27.xml><?xml version="1.0" encoding="utf-8"?>
 <p:sld xmlns:a="http://schemas.openxmlformats.org/drawingml/2006/main" xmlns:r="http://schemas.openxmlformats.org/officeDocument/2006/relationships" xmlns:p="http://schemas.openxmlformats.org/presentationml/2006/main">
   <p:cSld>
     <p:spTree>
@@ -4922,7 +6141,7 @@
 </p:sld>
 </file>
 
-<file path=ppt/slides/slide14.xml><?xml version="1.0" encoding="utf-8"?>
+<file path=ppt/slides/slide28.xml><?xml version="1.0" encoding="utf-8"?>
 <p:sld xmlns:a="http://schemas.openxmlformats.org/drawingml/2006/main" xmlns:r="http://schemas.openxmlformats.org/officeDocument/2006/relationships" xmlns:p="http://schemas.openxmlformats.org/presentationml/2006/main">
   <p:cSld>
     <p:spTree>
@@ -5007,7 +6226,7 @@
 </p:sld>
 </file>
 
-<file path=ppt/slides/slide15.xml><?xml version="1.0" encoding="utf-8"?>
+<file path=ppt/slides/slide29.xml><?xml version="1.0" encoding="utf-8"?>
 <p:sld xmlns:a="http://schemas.openxmlformats.org/drawingml/2006/main" xmlns:r="http://schemas.openxmlformats.org/officeDocument/2006/relationships" xmlns:p="http://schemas.openxmlformats.org/presentationml/2006/main">
   <p:cSld>
     <p:spTree>
@@ -5039,6 +6258,7 @@
           <a:bodyPr/>
           <a:lstStyle/>
           <a:p>
+            <a:pPr algn="ctr"/>
             <a:r>
               <a:rPr lang="es-ES" dirty="0" smtClean="0"/>
               <a:t>Diagrama de Paquete</a:t>
@@ -5047,37 +6267,47 @@
           </a:p>
         </p:txBody>
       </p:sp>
-      <p:sp>
-        <p:nvSpPr>
-          <p:cNvPr id="3" name="2 Marcador de contenido"/>
-          <p:cNvSpPr>
-            <a:spLocks noGrp="1"/>
-          </p:cNvSpPr>
-          <p:nvPr>
-            <p:ph idx="1"/>
-          </p:nvPr>
-        </p:nvSpPr>
-        <p:spPr/>
-        <p:txBody>
-          <a:bodyPr/>
-          <a:lstStyle/>
-          <a:p>
-            <a:r>
-              <a:rPr lang="es-ES" dirty="0" smtClean="0">
+      <p:pic>
+        <p:nvPicPr>
+          <p:cNvPr id="1026" name="Picture 2" descr="C:\proyectoDeliberyApp\Diagramas\DiagramadePaquete.png"/>
+          <p:cNvPicPr>
+            <a:picLocks noChangeAspect="1" noChangeArrowheads="1"/>
+          </p:cNvPicPr>
+          <p:nvPr/>
+        </p:nvPicPr>
+        <p:blipFill>
+          <a:blip r:embed="rId2">
+            <a:extLst>
+              <a:ext uri="{28A0092B-C50C-407E-A947-70E740481C1C}">
+                <a14:useLocalDpi xmlns:a14="http://schemas.microsoft.com/office/drawing/2010/main" val="0"/>
+              </a:ext>
+            </a:extLst>
+          </a:blip>
+          <a:srcRect/>
+          <a:stretch>
+            <a:fillRect/>
+          </a:stretch>
+        </p:blipFill>
+        <p:spPr bwMode="auto">
+          <a:xfrm>
+            <a:off x="539552" y="1916832"/>
+            <a:ext cx="8146154" cy="4426818"/>
+          </a:xfrm>
+          <a:prstGeom prst="rect">
+            <a:avLst/>
+          </a:prstGeom>
+          <a:noFill/>
+          <a:extLst>
+            <a:ext uri="{909E8E84-426E-40DD-AFC4-6F175D3DCCD1}">
+              <a14:hiddenFill xmlns:a14="http://schemas.microsoft.com/office/drawing/2010/main">
                 <a:solidFill>
-                  <a:srgbClr val="FF0000"/>
+                  <a:srgbClr val="FFFFFF"/>
                 </a:solidFill>
-              </a:rPr>
-              <a:t>Haciendo Orlando</a:t>
-            </a:r>
-            <a:endParaRPr lang="es-ES" dirty="0">
-              <a:solidFill>
-                <a:srgbClr val="FF0000"/>
-              </a:solidFill>
-            </a:endParaRPr>
-          </a:p>
-        </p:txBody>
-      </p:sp>
+              </a14:hiddenFill>
+            </a:ext>
+          </a:extLst>
+        </p:spPr>
+      </p:pic>
     </p:spTree>
     <p:extLst>
       <p:ext uri="{BB962C8B-B14F-4D97-AF65-F5344CB8AC3E}">
@@ -5091,7 +6321,7 @@
 </p:sld>
 </file>
 
-<file path=ppt/slides/slide16.xml><?xml version="1.0" encoding="utf-8"?>
+<file path=ppt/slides/slide3.xml><?xml version="1.0" encoding="utf-8"?>
 <p:sld xmlns:a="http://schemas.openxmlformats.org/drawingml/2006/main" xmlns:r="http://schemas.openxmlformats.org/officeDocument/2006/relationships" xmlns:p="http://schemas.openxmlformats.org/presentationml/2006/main">
   <p:cSld>
     <p:spTree>
@@ -5120,9 +6350,183 @@
         </p:nvSpPr>
         <p:spPr/>
         <p:txBody>
+          <a:bodyPr>
+            <a:normAutofit fontScale="90000"/>
+          </a:bodyPr>
+          <a:lstStyle/>
+          <a:p>
+            <a:r>
+              <a:rPr lang="es-ES" dirty="0" smtClean="0"/>
+              <a:t>Recolección de datos para la elaboración de Requerimientos</a:t>
+            </a:r>
+            <a:endParaRPr lang="es-ES" dirty="0"/>
+          </a:p>
+        </p:txBody>
+      </p:sp>
+      <p:sp>
+        <p:nvSpPr>
+          <p:cNvPr id="3" name="2 Marcador de contenido"/>
+          <p:cNvSpPr>
+            <a:spLocks noGrp="1"/>
+          </p:cNvSpPr>
+          <p:nvPr>
+            <p:ph idx="1"/>
+          </p:nvPr>
+        </p:nvSpPr>
+        <p:spPr/>
+        <p:txBody>
+          <a:bodyPr>
+            <a:normAutofit fontScale="85000" lnSpcReduction="20000"/>
+          </a:bodyPr>
+          <a:lstStyle/>
+          <a:p>
+            <a:pPr lvl="0"/>
+            <a:r>
+              <a:rPr lang="es-ES" dirty="0"/>
+              <a:t>¿De qué forma realizan </a:t>
+            </a:r>
+            <a:r>
+              <a:rPr lang="es-ES" dirty="0" err="1"/>
+              <a:t>delivery</a:t>
+            </a:r>
+            <a:r>
+              <a:rPr lang="es-ES" dirty="0"/>
+              <a:t>? </a:t>
+            </a:r>
+          </a:p>
+          <a:p>
+            <a:pPr lvl="0"/>
+            <a:r>
+              <a:rPr lang="es-ES" dirty="0"/>
+              <a:t>¿Con cuántos personales cuentan?</a:t>
+            </a:r>
+          </a:p>
+          <a:p>
+            <a:pPr lvl="0"/>
+            <a:r>
+              <a:rPr lang="es-ES" dirty="0"/>
+              <a:t>¿Quién es el encargado de recibir los pedidos?</a:t>
+            </a:r>
+          </a:p>
+          <a:p>
+            <a:pPr lvl="0"/>
+            <a:r>
+              <a:rPr lang="es-ES" dirty="0"/>
+              <a:t>¿Cuáles son los datos que requieren para el pedido?</a:t>
+            </a:r>
+          </a:p>
+          <a:p>
+            <a:pPr lvl="0"/>
+            <a:r>
+              <a:rPr lang="es-ES" dirty="0"/>
+              <a:t>¿Existen algún inconveniente a la hora de recibir las llamadas?</a:t>
+            </a:r>
+          </a:p>
+          <a:p>
+            <a:pPr lvl="0"/>
+            <a:r>
+              <a:rPr lang="es-ES" dirty="0"/>
+              <a:t>¿Qué sucede en caso de que se corte la llamada?</a:t>
+            </a:r>
+          </a:p>
+          <a:p>
+            <a:pPr lvl="0"/>
+            <a:r>
+              <a:rPr lang="es-ES" dirty="0"/>
+              <a:t>¿Qué tipo de menú contiene su carta? ¿Cuáles son los más solicitados?</a:t>
+            </a:r>
+          </a:p>
+          <a:p>
+            <a:pPr lvl="0"/>
+            <a:r>
+              <a:rPr lang="es-ES" dirty="0"/>
+              <a:t>¿Qué tipo de publicidad utiliza para promocionar?</a:t>
+            </a:r>
+          </a:p>
+          <a:p>
+            <a:pPr lvl="0"/>
+            <a:r>
+              <a:rPr lang="es-ES" dirty="0"/>
+              <a:t>¿Realizan informes estadísticos?</a:t>
+            </a:r>
+          </a:p>
+          <a:p>
+            <a:pPr lvl="0"/>
+            <a:r>
+              <a:rPr lang="es-ES" dirty="0"/>
+              <a:t>¿Cuenta con un sistema para agilizar sus pedidos?</a:t>
+            </a:r>
+          </a:p>
+          <a:p>
+            <a:pPr lvl="0"/>
+            <a:r>
+              <a:rPr lang="es-ES" dirty="0"/>
+              <a:t>¿Te gustaría automatizar el proceso de </a:t>
+            </a:r>
+            <a:r>
+              <a:rPr lang="es-ES" dirty="0" err="1"/>
+              <a:t>delivery</a:t>
+            </a:r>
+            <a:r>
+              <a:rPr lang="es-ES" dirty="0"/>
+              <a:t>?</a:t>
+            </a:r>
+          </a:p>
+          <a:p>
+            <a:pPr lvl="0"/>
+            <a:r>
+              <a:rPr lang="es-ES" dirty="0"/>
+              <a:t>¿Qué le gustaría que contenga el sistema?</a:t>
+            </a:r>
+          </a:p>
+        </p:txBody>
+      </p:sp>
+    </p:spTree>
+    <p:extLst>
+      <p:ext uri="{BB962C8B-B14F-4D97-AF65-F5344CB8AC3E}">
+        <p14:creationId xmlns:p14="http://schemas.microsoft.com/office/powerpoint/2010/main" val="1211251010"/>
+      </p:ext>
+    </p:extLst>
+  </p:cSld>
+  <p:clrMapOvr>
+    <a:masterClrMapping/>
+  </p:clrMapOvr>
+</p:sld>
+</file>
+
+<file path=ppt/slides/slide30.xml><?xml version="1.0" encoding="utf-8"?>
+<p:sld xmlns:a="http://schemas.openxmlformats.org/drawingml/2006/main" xmlns:r="http://schemas.openxmlformats.org/officeDocument/2006/relationships" xmlns:p="http://schemas.openxmlformats.org/presentationml/2006/main">
+  <p:cSld>
+    <p:spTree>
+      <p:nvGrpSpPr>
+        <p:cNvPr id="1" name=""/>
+        <p:cNvGrpSpPr/>
+        <p:nvPr/>
+      </p:nvGrpSpPr>
+      <p:grpSpPr>
+        <a:xfrm>
+          <a:off x="0" y="0"/>
+          <a:ext cx="0" cy="0"/>
+          <a:chOff x="0" y="0"/>
+          <a:chExt cx="0" cy="0"/>
+        </a:xfrm>
+      </p:grpSpPr>
+      <p:sp>
+        <p:nvSpPr>
+          <p:cNvPr id="2" name="1 Título"/>
+          <p:cNvSpPr>
+            <a:spLocks noGrp="1"/>
+          </p:cNvSpPr>
+          <p:nvPr>
+            <p:ph type="title"/>
+          </p:nvPr>
+        </p:nvSpPr>
+        <p:spPr/>
+        <p:txBody>
           <a:bodyPr/>
           <a:lstStyle/>
           <a:p>
+            <a:pPr algn="ctr"/>
             <a:r>
               <a:rPr lang="es-ES" dirty="0" smtClean="0"/>
               <a:t>Diagrama  de Secuencia</a:t>
@@ -5182,7 +6586,7 @@
 </p:sld>
 </file>
 
-<file path=ppt/slides/slide17.xml><?xml version="1.0" encoding="utf-8"?>
+<file path=ppt/slides/slide31.xml><?xml version="1.0" encoding="utf-8"?>
 <p:sld xmlns:a="http://schemas.openxmlformats.org/drawingml/2006/main" xmlns:r="http://schemas.openxmlformats.org/officeDocument/2006/relationships" xmlns:p="http://schemas.openxmlformats.org/presentationml/2006/main">
   <p:cSld>
     <p:spTree>
@@ -5214,7 +6618,12 @@
           <a:bodyPr/>
           <a:lstStyle/>
           <a:p>
-            <a:endParaRPr lang="es-ES"/>
+            <a:pPr algn="ctr"/>
+            <a:r>
+              <a:rPr lang="es-ES" dirty="0"/>
+              <a:t>Diagrama  de Secuencia</a:t>
+            </a:r>
+            <a:endParaRPr lang="es-ES" dirty="0"/>
           </a:p>
         </p:txBody>
       </p:sp>
@@ -5270,7 +6679,7 @@
 </p:sld>
 </file>
 
-<file path=ppt/slides/slide18.xml><?xml version="1.0" encoding="utf-8"?>
+<file path=ppt/slides/slide32.xml><?xml version="1.0" encoding="utf-8"?>
 <p:sld xmlns:a="http://schemas.openxmlformats.org/drawingml/2006/main" xmlns:r="http://schemas.openxmlformats.org/officeDocument/2006/relationships" xmlns:p="http://schemas.openxmlformats.org/presentationml/2006/main">
   <p:cSld>
     <p:spTree>
@@ -5348,7 +6757,7 @@
 </p:sld>
 </file>
 
-<file path=ppt/slides/slide19.xml><?xml version="1.0" encoding="utf-8"?>
+<file path=ppt/slides/slide33.xml><?xml version="1.0" encoding="utf-8"?>
 <p:sld xmlns:a="http://schemas.openxmlformats.org/drawingml/2006/main" xmlns:r="http://schemas.openxmlformats.org/officeDocument/2006/relationships" xmlns:p="http://schemas.openxmlformats.org/presentationml/2006/main">
   <p:cSld>
     <p:spTree>
@@ -5380,6 +6789,7 @@
           <a:bodyPr/>
           <a:lstStyle/>
           <a:p>
+            <a:pPr algn="ctr"/>
             <a:r>
               <a:rPr lang="es-ES" dirty="0" smtClean="0"/>
               <a:t>Diagrama de Actividad</a:t>
@@ -5388,36 +6798,45 @@
           </a:p>
         </p:txBody>
       </p:sp>
-      <p:sp>
-        <p:nvSpPr>
-          <p:cNvPr id="3" name="2 Marcador de contenido"/>
-          <p:cNvSpPr>
-            <a:spLocks noGrp="1"/>
-          </p:cNvSpPr>
-          <p:nvPr>
-            <p:ph idx="1"/>
-          </p:nvPr>
-        </p:nvSpPr>
-        <p:spPr/>
-        <p:txBody>
-          <a:bodyPr/>
-          <a:lstStyle/>
-          <a:p>
-            <a:r>
-              <a:rPr lang="es-ES" dirty="0" smtClean="0"/>
-              <a:t>Myriam </a:t>
-            </a:r>
-            <a:r>
-              <a:rPr lang="es-ES" dirty="0" err="1" smtClean="0"/>
-              <a:t>Correccion</a:t>
-            </a:r>
-            <a:endParaRPr lang="es-ES" dirty="0" smtClean="0"/>
-          </a:p>
-          <a:p>
-            <a:endParaRPr lang="es-ES" dirty="0"/>
-          </a:p>
-        </p:txBody>
-      </p:sp>
+      <p:pic>
+        <p:nvPicPr>
+          <p:cNvPr id="2050" name="Picture 2" descr="C:\proyectoDeliberyApp\caso de uso\CasoUsoSistema\ac2.png"/>
+          <p:cNvPicPr>
+            <a:picLocks noChangeAspect="1" noChangeArrowheads="1"/>
+          </p:cNvPicPr>
+          <p:nvPr/>
+        </p:nvPicPr>
+        <p:blipFill rotWithShape="1">
+          <a:blip r:embed="rId2">
+            <a:extLst>
+              <a:ext uri="{28A0092B-C50C-407E-A947-70E740481C1C}">
+                <a14:useLocalDpi xmlns:a14="http://schemas.microsoft.com/office/drawing/2010/main" val="0"/>
+              </a:ext>
+            </a:extLst>
+          </a:blip>
+          <a:srcRect l="15071" r="12717" b="34267"/>
+          <a:stretch/>
+        </p:blipFill>
+        <p:spPr bwMode="auto">
+          <a:xfrm>
+            <a:off x="1403648" y="1846845"/>
+            <a:ext cx="5756622" cy="4984931"/>
+          </a:xfrm>
+          <a:prstGeom prst="rect">
+            <a:avLst/>
+          </a:prstGeom>
+          <a:noFill/>
+          <a:extLst>
+            <a:ext uri="{909E8E84-426E-40DD-AFC4-6F175D3DCCD1}">
+              <a14:hiddenFill xmlns:a14="http://schemas.microsoft.com/office/drawing/2010/main">
+                <a:solidFill>
+                  <a:srgbClr val="FFFFFF"/>
+                </a:solidFill>
+              </a14:hiddenFill>
+            </a:ext>
+          </a:extLst>
+        </p:spPr>
+      </p:pic>
     </p:spTree>
     <p:extLst>
       <p:ext uri="{BB962C8B-B14F-4D97-AF65-F5344CB8AC3E}">
@@ -5431,7 +6850,7 @@
 </p:sld>
 </file>
 
-<file path=ppt/slides/slide2.xml><?xml version="1.0" encoding="utf-8"?>
+<file path=ppt/slides/slide34.xml><?xml version="1.0" encoding="utf-8"?>
 <p:sld xmlns:a="http://schemas.openxmlformats.org/drawingml/2006/main" xmlns:r="http://schemas.openxmlformats.org/officeDocument/2006/relationships" xmlns:p="http://schemas.openxmlformats.org/presentationml/2006/main">
   <p:cSld>
     <p:spTree>
@@ -5466,71 +6885,58 @@
             <a:pPr algn="ctr"/>
             <a:r>
               <a:rPr lang="es-ES" dirty="0"/>
-              <a:t>O</a:t>
-            </a:r>
-            <a:r>
-              <a:rPr lang="es-ES" dirty="0" smtClean="0"/>
-              <a:t>bjetivos</a:t>
-            </a:r>
-            <a:endParaRPr lang="es-ES" dirty="0"/>
-          </a:p>
-        </p:txBody>
-      </p:sp>
-      <p:sp>
-        <p:nvSpPr>
-          <p:cNvPr id="3" name="2 Marcador de contenido"/>
-          <p:cNvSpPr>
-            <a:spLocks noGrp="1"/>
-          </p:cNvSpPr>
+              <a:t>Diagrama de Actividad</a:t>
+            </a:r>
+          </a:p>
+        </p:txBody>
+      </p:sp>
+      <p:pic>
+        <p:nvPicPr>
+          <p:cNvPr id="4" name="Picture 3" descr="C:\proyectoDeliberyApp\caso de uso\CasoUsoSistema\ac.png"/>
+          <p:cNvPicPr>
+            <a:picLocks noGrp="1" noChangeAspect="1" noChangeArrowheads="1"/>
+          </p:cNvPicPr>
           <p:nvPr>
             <p:ph idx="1"/>
           </p:nvPr>
-        </p:nvSpPr>
-        <p:spPr/>
-        <p:txBody>
-          <a:bodyPr>
-            <a:normAutofit/>
-          </a:bodyPr>
-          <a:lstStyle/>
-          <a:p>
-            <a:r>
-              <a:rPr lang="es-ES" dirty="0"/>
-              <a:t>Los objetivos del sistema son minimizar los problemas referentes a la gestión de pedidos de parte del cliente, optimizar la gestión de ventas del restaurante. </a:t>
-            </a:r>
-            <a:endParaRPr lang="es-ES" dirty="0" smtClean="0"/>
-          </a:p>
-          <a:p>
-            <a:r>
-              <a:rPr lang="es-ES" dirty="0"/>
-              <a:t>El beneficio con que cuenta el sistema es el de agilizar los pedidos de tal forma que no se pierda tiempo con las llamadas. </a:t>
-            </a:r>
-          </a:p>
-          <a:p>
-            <a:r>
-              <a:rPr lang="es-ES" dirty="0"/>
-              <a:t>La meta a alcanzar es mejorar el servicio de </a:t>
-            </a:r>
-            <a:r>
-              <a:rPr lang="es-ES" dirty="0" err="1"/>
-              <a:t>delivery</a:t>
-            </a:r>
-            <a:r>
-              <a:rPr lang="es-ES" dirty="0"/>
-              <a:t> y aumentar las ventas.</a:t>
-            </a:r>
-          </a:p>
-          <a:p>
-            <a:endParaRPr lang="es-ES" dirty="0"/>
-          </a:p>
-          <a:p>
-            <a:endParaRPr lang="es-ES" dirty="0"/>
-          </a:p>
-        </p:txBody>
-      </p:sp>
+        </p:nvPicPr>
+        <p:blipFill>
+          <a:blip r:embed="rId2">
+            <a:extLst>
+              <a:ext uri="{28A0092B-C50C-407E-A947-70E740481C1C}">
+                <a14:useLocalDpi xmlns:a14="http://schemas.microsoft.com/office/drawing/2010/main" val="0"/>
+              </a:ext>
+            </a:extLst>
+          </a:blip>
+          <a:srcRect/>
+          <a:stretch>
+            <a:fillRect/>
+          </a:stretch>
+        </p:blipFill>
+        <p:spPr bwMode="auto">
+          <a:xfrm>
+            <a:off x="771299" y="1556792"/>
+            <a:ext cx="7601401" cy="4389437"/>
+          </a:xfrm>
+          <a:prstGeom prst="rect">
+            <a:avLst/>
+          </a:prstGeom>
+          <a:noFill/>
+          <a:extLst>
+            <a:ext uri="{909E8E84-426E-40DD-AFC4-6F175D3DCCD1}">
+              <a14:hiddenFill xmlns:a14="http://schemas.microsoft.com/office/drawing/2010/main">
+                <a:solidFill>
+                  <a:srgbClr val="FFFFFF"/>
+                </a:solidFill>
+              </a14:hiddenFill>
+            </a:ext>
+          </a:extLst>
+        </p:spPr>
+      </p:pic>
     </p:spTree>
     <p:extLst>
       <p:ext uri="{BB962C8B-B14F-4D97-AF65-F5344CB8AC3E}">
-        <p14:creationId xmlns:p14="http://schemas.microsoft.com/office/powerpoint/2010/main" val="3246394978"/>
+        <p14:creationId xmlns:p14="http://schemas.microsoft.com/office/powerpoint/2010/main" val="1284382175"/>
       </p:ext>
     </p:extLst>
   </p:cSld>
@@ -5540,7 +6946,7 @@
 </p:sld>
 </file>
 
-<file path=ppt/slides/slide3.xml><?xml version="1.0" encoding="utf-8"?>
+<file path=ppt/slides/slide35.xml><?xml version="1.0" encoding="utf-8"?>
 <p:sld xmlns:a="http://schemas.openxmlformats.org/drawingml/2006/main" xmlns:r="http://schemas.openxmlformats.org/officeDocument/2006/relationships" xmlns:p="http://schemas.openxmlformats.org/presentationml/2006/main">
   <p:cSld>
     <p:spTree>
@@ -5559,151 +6965,63 @@
       </p:grpSpPr>
       <p:sp>
         <p:nvSpPr>
-          <p:cNvPr id="2" name="1 Título"/>
-          <p:cNvSpPr>
-            <a:spLocks noGrp="1"/>
-          </p:cNvSpPr>
-          <p:nvPr>
-            <p:ph type="title"/>
-          </p:nvPr>
-        </p:nvSpPr>
-        <p:spPr/>
+          <p:cNvPr id="3" name="2 Marcador de contenido"/>
+          <p:cNvSpPr>
+            <a:spLocks noGrp="1"/>
+          </p:cNvSpPr>
+          <p:nvPr>
+            <p:ph idx="1"/>
+          </p:nvPr>
+        </p:nvSpPr>
+        <p:spPr>
+          <a:xfrm rot="21291343">
+            <a:off x="431719" y="2348950"/>
+            <a:ext cx="8229600" cy="4389120"/>
+          </a:xfrm>
+        </p:spPr>
         <p:txBody>
           <a:bodyPr>
-            <a:normAutofit fontScale="90000"/>
+            <a:normAutofit/>
           </a:bodyPr>
           <a:lstStyle/>
           <a:p>
-            <a:r>
-              <a:rPr lang="es-ES" dirty="0" smtClean="0"/>
-              <a:t>Recolección de datos para la elaboración de Requerimientos</a:t>
-            </a:r>
-            <a:endParaRPr lang="es-ES" dirty="0"/>
-          </a:p>
-        </p:txBody>
-      </p:sp>
-      <p:sp>
-        <p:nvSpPr>
-          <p:cNvPr id="3" name="2 Marcador de contenido"/>
-          <p:cNvSpPr>
-            <a:spLocks noGrp="1"/>
-          </p:cNvSpPr>
-          <p:nvPr>
-            <p:ph idx="1"/>
-          </p:nvPr>
-        </p:nvSpPr>
-        <p:spPr/>
-        <p:txBody>
-          <a:bodyPr>
-            <a:normAutofit fontScale="85000" lnSpcReduction="20000"/>
-          </a:bodyPr>
-          <a:lstStyle/>
-          <a:p>
-            <a:pPr lvl="0"/>
-            <a:r>
-              <a:rPr lang="es-ES" dirty="0"/>
-              <a:t>¿De qué forma realizan </a:t>
-            </a:r>
-            <a:r>
-              <a:rPr lang="es-ES" dirty="0" err="1"/>
-              <a:t>delivery</a:t>
-            </a:r>
-            <a:r>
-              <a:rPr lang="es-ES" dirty="0"/>
-              <a:t>? </a:t>
-            </a:r>
-          </a:p>
-          <a:p>
-            <a:pPr lvl="0"/>
-            <a:r>
-              <a:rPr lang="es-ES" dirty="0"/>
-              <a:t>¿Con cuántos personales cuentan?</a:t>
-            </a:r>
-          </a:p>
-          <a:p>
-            <a:pPr lvl="0"/>
-            <a:r>
-              <a:rPr lang="es-ES" dirty="0"/>
-              <a:t>¿Quién es el encargado de recibir los pedidos?</a:t>
-            </a:r>
-          </a:p>
-          <a:p>
-            <a:pPr lvl="0"/>
-            <a:r>
-              <a:rPr lang="es-ES" dirty="0"/>
-              <a:t>¿Cuáles son los datos que requieren para el pedido?</a:t>
-            </a:r>
-          </a:p>
-          <a:p>
-            <a:pPr lvl="0"/>
-            <a:r>
-              <a:rPr lang="es-ES" dirty="0"/>
-              <a:t>¿Existen algún inconveniente a la hora de recibir las llamadas?</a:t>
-            </a:r>
-          </a:p>
-          <a:p>
-            <a:pPr lvl="0"/>
-            <a:r>
-              <a:rPr lang="es-ES" dirty="0"/>
-              <a:t>¿Qué sucede en caso de que se corte la llamada?</a:t>
-            </a:r>
-          </a:p>
-          <a:p>
-            <a:pPr lvl="0"/>
-            <a:r>
-              <a:rPr lang="es-ES" dirty="0"/>
-              <a:t>¿Qué tipo de menú contiene su carta? ¿Cuáles son los más solicitados?</a:t>
-            </a:r>
-          </a:p>
-          <a:p>
-            <a:pPr lvl="0"/>
-            <a:r>
-              <a:rPr lang="es-ES" dirty="0"/>
-              <a:t>¿Qué tipo de publicidad utiliza para promocionar?</a:t>
-            </a:r>
-          </a:p>
-          <a:p>
-            <a:pPr lvl="0"/>
-            <a:r>
-              <a:rPr lang="es-ES" dirty="0"/>
-              <a:t>¿Realizan informes estadísticos?</a:t>
-            </a:r>
-          </a:p>
-          <a:p>
-            <a:pPr lvl="0"/>
-            <a:r>
-              <a:rPr lang="es-ES" dirty="0"/>
-              <a:t>¿Cuenta con un sistema para agilizar sus pedidos?</a:t>
-            </a:r>
-          </a:p>
-          <a:p>
-            <a:pPr lvl="0"/>
-            <a:r>
-              <a:rPr lang="es-ES" dirty="0"/>
-              <a:t>¿Te gustaría automatizar el proceso de </a:t>
-            </a:r>
-            <a:r>
-              <a:rPr lang="es-ES" dirty="0" err="1"/>
-              <a:t>delivery</a:t>
-            </a:r>
-            <a:r>
-              <a:rPr lang="es-ES" dirty="0"/>
-              <a:t>?</a:t>
-            </a:r>
-          </a:p>
-          <a:p>
-            <a:pPr lvl="0"/>
-            <a:r>
-              <a:rPr lang="es-ES" dirty="0"/>
-              <a:t>¿Qué le gustaría que contenga el sistema?</a:t>
-            </a:r>
+            <a:pPr marL="0" indent="0" algn="ctr">
+              <a:buNone/>
+            </a:pPr>
+            <a:r>
+              <a:rPr lang="es-ES" sz="6000" dirty="0" smtClean="0">
+                <a:solidFill>
+                  <a:srgbClr val="00B0F0"/>
+                </a:solidFill>
+                <a:effectLst>
+                  <a:outerShdw blurRad="38100" dist="38100" dir="2700000" algn="tl">
+                    <a:srgbClr val="000000">
+                      <a:alpha val="43137"/>
+                    </a:srgbClr>
+                  </a:outerShdw>
+                </a:effectLst>
+              </a:rPr>
+              <a:t>GRACIAS!!!</a:t>
+            </a:r>
+            <a:endParaRPr lang="es-ES" sz="6000" dirty="0">
+              <a:solidFill>
+                <a:srgbClr val="00B0F0"/>
+              </a:solidFill>
+              <a:effectLst>
+                <a:outerShdw blurRad="38100" dist="38100" dir="2700000" algn="tl">
+                  <a:srgbClr val="000000">
+                    <a:alpha val="43137"/>
+                  </a:srgbClr>
+                </a:outerShdw>
+              </a:effectLst>
+            </a:endParaRPr>
           </a:p>
         </p:txBody>
       </p:sp>
     </p:spTree>
     <p:extLst>
       <p:ext uri="{BB962C8B-B14F-4D97-AF65-F5344CB8AC3E}">
-        <p14:creationId xmlns:p14="http://schemas.microsoft.com/office/powerpoint/2010/main" val="1211251010"/>
+        <p14:creationId xmlns:p14="http://schemas.microsoft.com/office/powerpoint/2010/main" val="2692759912"/>
       </p:ext>
     </p:extLst>
   </p:cSld>
@@ -5846,6 +7164,7 @@
           <a:bodyPr/>
           <a:lstStyle/>
           <a:p>
+            <a:pPr algn="ctr"/>
             <a:r>
               <a:rPr lang="es-ES" dirty="0" smtClean="0"/>
               <a:t>Delimitación</a:t>
@@ -5864,12 +7183,17 @@
             <p:ph idx="1"/>
           </p:nvPr>
         </p:nvSpPr>
-        <p:spPr/>
+        <p:spPr>
+          <a:xfrm>
+            <a:off x="446856" y="1935480"/>
+            <a:ext cx="8229600" cy="4389120"/>
+          </a:xfrm>
+        </p:spPr>
         <p:txBody>
           <a:bodyPr/>
           <a:lstStyle/>
           <a:p>
-            <a:pPr marL="0" indent="0">
+            <a:pPr marL="0" indent="0" algn="ctr">
               <a:buNone/>
             </a:pPr>
             <a:r>
@@ -5921,7 +7245,7 @@
         </p:nvSpPr>
         <p:spPr>
           <a:xfrm>
-            <a:off x="539552" y="3140968"/>
+            <a:off x="428475" y="3717032"/>
             <a:ext cx="8229600" cy="3456384"/>
           </a:xfrm>
         </p:spPr>
@@ -5931,7 +7255,7 @@
           </a:bodyPr>
           <a:lstStyle/>
           <a:p>
-            <a:pPr marL="0" indent="0">
+            <a:pPr marL="0" indent="0" algn="ctr">
               <a:buNone/>
             </a:pPr>
             <a:r>
@@ -5952,7 +7276,7 @@
             </a:r>
             <a:r>
               <a:rPr lang="es-ES" sz="2400" dirty="0"/>
-              <a:t>un proceso de ingeniería de software que suministra un enfoque para asignar tareas y responsabilidades dentro de una organización de desarrollo. Su objetivo es asegurar la producción de software de alta y de mayor calidad para satisfacer las necesidades de los  usuarios que tienen un cumplimiento al final dentro de un limite de  tiempo y presupuesto previsible. Es una metodología de desarrollo iterativo que es enfocada hacia “ diagramas de los casos de uso, y manejo de los riesgos y el manejo de la arquitectura” como tal.</a:t>
+              <a:t>un proceso de ingeniería de software que suministra un enfoque para asignar tareas y responsabilidades dentro de una organización de desarrollo. </a:t>
             </a:r>
             <a:endParaRPr lang="es-ES" sz="2400" dirty="0">
               <a:solidFill>
@@ -6011,7 +7335,7 @@
         </p:blipFill>
         <p:spPr bwMode="auto">
           <a:xfrm>
-            <a:off x="3203848" y="1124744"/>
+            <a:off x="3203848" y="1453426"/>
             <a:ext cx="2376264" cy="2160240"/>
           </a:xfrm>
           <a:prstGeom prst="rect">
@@ -6116,6 +7440,7 @@
           </a:bodyPr>
           <a:lstStyle/>
           <a:p>
+            <a:pPr algn="ctr"/>
             <a:r>
               <a:rPr lang="es-ES" dirty="0" smtClean="0"/>
               <a:t>Tipo de Proceso</a:t>
@@ -6219,22 +7544,32 @@
         </p:nvSpPr>
         <p:spPr/>
         <p:txBody>
-          <a:bodyPr/>
-          <a:lstStyle/>
-          <a:p>
-            <a:r>
-              <a:rPr lang="es-ES" dirty="0" smtClean="0">
-                <a:solidFill>
-                  <a:srgbClr val="FF0000"/>
-                </a:solidFill>
-              </a:rPr>
-              <a:t>Falta hacer el desglose</a:t>
-            </a:r>
-            <a:endParaRPr lang="es-ES" dirty="0">
-              <a:solidFill>
-                <a:srgbClr val="FF0000"/>
-              </a:solidFill>
-            </a:endParaRPr>
+          <a:bodyPr>
+            <a:normAutofit fontScale="85000" lnSpcReduction="20000"/>
+          </a:bodyPr>
+          <a:lstStyle/>
+          <a:p>
+            <a:pPr marL="0" indent="0" algn="ctr">
+              <a:buNone/>
+            </a:pPr>
+            <a:r>
+              <a:rPr lang="es-ES" b="1" dirty="0"/>
+              <a:t>Descripción Escrita del Modelado de negocio</a:t>
+            </a:r>
+            <a:endParaRPr lang="es-ES" dirty="0"/>
+          </a:p>
+          <a:p>
+            <a:pPr marL="0" indent="0" algn="ctr">
+              <a:buNone/>
+            </a:pPr>
+            <a:r>
+              <a:rPr lang="es-ES" dirty="0" smtClean="0"/>
+              <a:t>El </a:t>
+            </a:r>
+            <a:r>
+              <a:rPr lang="es-ES" dirty="0"/>
+              <a:t>cliente llama al negocio, la  recepcionista atiende la llamada y le consulta sobre su necesidad, el cliente si no conoce el menú o lo que le gustaría consumir pregunta sobre el menú vigente, la  recepcionista le dicta el menú, posteriormente el cliente elige según su preferencia, la  recepcionista pregunta si está satisfecho con su pedido o si le gustaría agregar algo más, el cliente pide algo mas o solo confirma el pedido, la  recepcionista solicita los datos personales del cliente como: nombre, número de teléfono y dirección, una vez obtenido los datos la  recepcionista le comunica el monto total y pregunta si tiene cambio, el cliente le contesta y finaliza la llamada, el pedido es pasado de la recepción a la cocina en donde se prepara, luego de elaborar completamente el pedido, se le entrega al repartidor para enviarle al cliente su pedido y cobrar.</a:t>
+            </a:r>
           </a:p>
         </p:txBody>
       </p:sp>
@@ -6268,64 +7603,49 @@
           <a:chExt cx="0" cy="0"/>
         </a:xfrm>
       </p:grpSpPr>
-      <p:sp>
-        <p:nvSpPr>
-          <p:cNvPr id="2" name="1 Título"/>
-          <p:cNvSpPr>
-            <a:spLocks noGrp="1"/>
-          </p:cNvSpPr>
-          <p:nvPr>
-            <p:ph type="title"/>
-          </p:nvPr>
-        </p:nvSpPr>
-        <p:spPr/>
-        <p:txBody>
-          <a:bodyPr/>
-          <a:lstStyle/>
-          <a:p>
-            <a:r>
-              <a:rPr lang="es-ES" dirty="0" smtClean="0"/>
-              <a:t>Prototipos</a:t>
-            </a:r>
-            <a:endParaRPr lang="es-ES" dirty="0"/>
-          </a:p>
-        </p:txBody>
-      </p:sp>
-      <p:sp>
-        <p:nvSpPr>
-          <p:cNvPr id="3" name="2 Marcador de contenido"/>
-          <p:cNvSpPr>
-            <a:spLocks noGrp="1"/>
-          </p:cNvSpPr>
+      <p:pic>
+        <p:nvPicPr>
+          <p:cNvPr id="4" name="0 Imagen"/>
+          <p:cNvPicPr>
+            <a:picLocks noGrp="1"/>
+          </p:cNvPicPr>
           <p:nvPr>
             <p:ph idx="1"/>
           </p:nvPr>
-        </p:nvSpPr>
-        <p:spPr/>
-        <p:txBody>
-          <a:bodyPr/>
-          <a:lstStyle/>
-          <a:p>
-            <a:r>
-              <a:rPr lang="es-ES" dirty="0" smtClean="0">
-                <a:solidFill>
-                  <a:srgbClr val="FF0000"/>
-                </a:solidFill>
-              </a:rPr>
-              <a:t>Falta hacer</a:t>
-            </a:r>
-            <a:endParaRPr lang="es-ES" dirty="0">
-              <a:solidFill>
-                <a:srgbClr val="FF0000"/>
-              </a:solidFill>
-            </a:endParaRPr>
-          </a:p>
-        </p:txBody>
-      </p:sp>
+        </p:nvPicPr>
+        <p:blipFill rotWithShape="1">
+          <a:blip r:embed="rId2">
+            <a:extLst>
+              <a:ext uri="{28A0092B-C50C-407E-A947-70E740481C1C}">
+                <a14:useLocalDpi xmlns:a14="http://schemas.microsoft.com/office/drawing/2010/main" val="0"/>
+              </a:ext>
+            </a:extLst>
+          </a:blip>
+          <a:srcRect r="2149" b="44641"/>
+          <a:stretch/>
+        </p:blipFill>
+        <p:spPr bwMode="auto">
+          <a:xfrm>
+            <a:off x="1043608" y="1124744"/>
+            <a:ext cx="6768752" cy="4464496"/>
+          </a:xfrm>
+          <a:prstGeom prst="rect">
+            <a:avLst/>
+          </a:prstGeom>
+          <a:ln>
+            <a:noFill/>
+          </a:ln>
+          <a:extLst>
+            <a:ext uri="{53640926-AAD7-44D8-BBD7-CCE9431645EC}">
+              <a14:shadowObscured xmlns:a14="http://schemas.microsoft.com/office/drawing/2010/main"/>
+            </a:ext>
+          </a:extLst>
+        </p:spPr>
+      </p:pic>
     </p:spTree>
     <p:extLst>
       <p:ext uri="{BB962C8B-B14F-4D97-AF65-F5344CB8AC3E}">
-        <p14:creationId xmlns:p14="http://schemas.microsoft.com/office/powerpoint/2010/main" val="470114740"/>
+        <p14:creationId xmlns:p14="http://schemas.microsoft.com/office/powerpoint/2010/main" val="1027070222"/>
       </p:ext>
     </p:extLst>
   </p:cSld>

</xml_diff>

<commit_message>
Presentación fianal. Power Point
</commit_message>
<xml_diff>
--- a/Para Presentacion final.pptx
+++ b/Para Presentacion final.pptx
@@ -140,7 +140,7 @@
   </p:defaultTextStyle>
   <p:extLst>
     <p:ext uri="{EFAFB233-063F-42B5-8137-9DF3F51BA10A}">
-      <p15:sldGuideLst xmlns="" xmlns:p15="http://schemas.microsoft.com/office/powerpoint/2012/main">
+      <p15:sldGuideLst xmlns:p15="http://schemas.microsoft.com/office/powerpoint/2012/main" xmlns="">
         <p15:guide id="1" orient="horz" pos="2160">
           <p15:clr>
             <a:srgbClr val="A4A3A4"/>
@@ -330,7 +330,7 @@
           <a:p>
             <a:fld id="{15236BF2-5D97-4A23-B897-87C18D793EA7}" type="datetimeFigureOut">
               <a:rPr lang="es-ES" smtClean="0"/>
-              <a:t>19/08/2016</a:t>
+              <a:t>25/08/2016</a:t>
             </a:fld>
             <a:endParaRPr lang="es-ES"/>
           </a:p>
@@ -495,7 +495,7 @@
           <a:p>
             <a:fld id="{15236BF2-5D97-4A23-B897-87C18D793EA7}" type="datetimeFigureOut">
               <a:rPr lang="es-ES" smtClean="0"/>
-              <a:t>19/08/2016</a:t>
+              <a:t>25/08/2016</a:t>
             </a:fld>
             <a:endParaRPr lang="es-ES"/>
           </a:p>
@@ -670,7 +670,7 @@
           <a:p>
             <a:fld id="{15236BF2-5D97-4A23-B897-87C18D793EA7}" type="datetimeFigureOut">
               <a:rPr lang="es-ES" smtClean="0"/>
-              <a:t>19/08/2016</a:t>
+              <a:t>25/08/2016</a:t>
             </a:fld>
             <a:endParaRPr lang="es-ES"/>
           </a:p>
@@ -835,7 +835,7 @@
           <a:p>
             <a:fld id="{15236BF2-5D97-4A23-B897-87C18D793EA7}" type="datetimeFigureOut">
               <a:rPr lang="es-ES" smtClean="0"/>
-              <a:t>19/08/2016</a:t>
+              <a:t>25/08/2016</a:t>
             </a:fld>
             <a:endParaRPr lang="es-ES"/>
           </a:p>
@@ -1077,7 +1077,7 @@
           <a:p>
             <a:fld id="{15236BF2-5D97-4A23-B897-87C18D793EA7}" type="datetimeFigureOut">
               <a:rPr lang="es-ES" smtClean="0"/>
-              <a:t>19/08/2016</a:t>
+              <a:t>25/08/2016</a:t>
             </a:fld>
             <a:endParaRPr lang="es-ES"/>
           </a:p>
@@ -1341,7 +1341,7 @@
           <a:p>
             <a:fld id="{15236BF2-5D97-4A23-B897-87C18D793EA7}" type="datetimeFigureOut">
               <a:rPr lang="es-ES" smtClean="0"/>
-              <a:t>19/08/2016</a:t>
+              <a:t>25/08/2016</a:t>
             </a:fld>
             <a:endParaRPr lang="es-ES"/>
           </a:p>
@@ -1719,7 +1719,7 @@
           <a:p>
             <a:fld id="{15236BF2-5D97-4A23-B897-87C18D793EA7}" type="datetimeFigureOut">
               <a:rPr lang="es-ES" smtClean="0"/>
-              <a:t>19/08/2016</a:t>
+              <a:t>25/08/2016</a:t>
             </a:fld>
             <a:endParaRPr lang="es-ES"/>
           </a:p>
@@ -1869,7 +1869,7 @@
           <a:p>
             <a:fld id="{15236BF2-5D97-4A23-B897-87C18D793EA7}" type="datetimeFigureOut">
               <a:rPr lang="es-ES" smtClean="0"/>
-              <a:t>19/08/2016</a:t>
+              <a:t>25/08/2016</a:t>
             </a:fld>
             <a:endParaRPr lang="es-ES"/>
           </a:p>
@@ -1959,7 +1959,7 @@
           <a:p>
             <a:fld id="{15236BF2-5D97-4A23-B897-87C18D793EA7}" type="datetimeFigureOut">
               <a:rPr lang="es-ES" smtClean="0"/>
-              <a:t>19/08/2016</a:t>
+              <a:t>25/08/2016</a:t>
             </a:fld>
             <a:endParaRPr lang="es-ES"/>
           </a:p>
@@ -2220,7 +2220,7 @@
           <a:p>
             <a:fld id="{15236BF2-5D97-4A23-B897-87C18D793EA7}" type="datetimeFigureOut">
               <a:rPr lang="es-ES" smtClean="0"/>
-              <a:t>19/08/2016</a:t>
+              <a:t>25/08/2016</a:t>
             </a:fld>
             <a:endParaRPr lang="es-ES"/>
           </a:p>
@@ -2508,7 +2508,7 @@
           <a:p>
             <a:fld id="{15236BF2-5D97-4A23-B897-87C18D793EA7}" type="datetimeFigureOut">
               <a:rPr lang="es-ES" smtClean="0"/>
-              <a:t>19/08/2016</a:t>
+              <a:t>25/08/2016</a:t>
             </a:fld>
             <a:endParaRPr lang="es-ES"/>
           </a:p>
@@ -3279,7 +3279,7 @@
           <a:p>
             <a:fld id="{15236BF2-5D97-4A23-B897-87C18D793EA7}" type="datetimeFigureOut">
               <a:rPr lang="es-ES" smtClean="0"/>
-              <a:t>19/08/2016</a:t>
+              <a:t>25/08/2016</a:t>
             </a:fld>
             <a:endParaRPr lang="es-ES"/>
           </a:p>
@@ -3909,7 +3909,7 @@
         </p:nvSpPr>
         <p:spPr>
           <a:xfrm>
-            <a:off x="1835696" y="264843"/>
+            <a:off x="1907704" y="0"/>
             <a:ext cx="5550768" cy="1828800"/>
           </a:xfrm>
         </p:spPr>
@@ -3922,15 +3922,7 @@
             <a:pPr algn="ctr"/>
             <a:r>
               <a:rPr lang="es-ES" sz="3000" dirty="0" smtClean="0"/>
-              <a:t>Universidad Autónoma </a:t>
-            </a:r>
-            <a:r>
-              <a:rPr lang="es-ES" sz="3000" dirty="0" smtClean="0"/>
-              <a:t>de </a:t>
-            </a:r>
-            <a:r>
-              <a:rPr lang="es-ES" sz="3000" dirty="0" smtClean="0"/>
-              <a:t>Encarnación</a:t>
+              <a:t>Universidad Autónoma de Encarnación</a:t>
             </a:r>
             <a:endParaRPr lang="es-ES" sz="3000" dirty="0"/>
           </a:p>
@@ -4002,8 +3994,8 @@
               <a:t>Prof.: Ing. Hugo </a:t>
             </a:r>
             <a:r>
-              <a:rPr lang="es-PY" sz="11200" b="1" dirty="0" err="1"/>
-              <a:t>Sendoa</a:t>
+              <a:rPr lang="es-PY" sz="11200" b="1" dirty="0" err="1" smtClean="0"/>
+              <a:t>Sendhoa</a:t>
             </a:r>
             <a:r>
               <a:rPr lang="es-PY" sz="11200" b="1" dirty="0"/>
@@ -4039,7 +4031,7 @@
         </p:blipFill>
         <p:spPr bwMode="auto">
           <a:xfrm>
-            <a:off x="7020272" y="403087"/>
+            <a:off x="7060588" y="403087"/>
             <a:ext cx="2004745" cy="2064850"/>
           </a:xfrm>
           <a:prstGeom prst="rect">
@@ -4080,7 +4072,7 @@
         </p:blipFill>
         <p:spPr bwMode="auto">
           <a:xfrm>
-            <a:off x="44298" y="264843"/>
+            <a:off x="107504" y="126598"/>
             <a:ext cx="2295454" cy="2341339"/>
           </a:xfrm>
           <a:prstGeom prst="rect">
@@ -4520,13 +4512,13 @@
   <p:clrMapOvr>
     <a:masterClrMapping/>
   </p:clrMapOvr>
-  <mc:AlternateContent xmlns:mc="http://schemas.openxmlformats.org/markup-compatibility/2006">
-    <mc:Choice xmlns:p14="http://schemas.microsoft.com/office/powerpoint/2010/main" Requires="p14">
+  <mc:AlternateContent xmlns:mc="http://schemas.openxmlformats.org/markup-compatibility/2006" xmlns:p14="http://schemas.microsoft.com/office/powerpoint/2010/main">
+    <mc:Choice Requires="p14">
       <p:transition spd="med" p14:dur="700">
         <p:fade/>
       </p:transition>
     </mc:Choice>
-    <mc:Fallback>
+    <mc:Fallback xmlns="">
       <p:transition spd="med">
         <p:fade/>
       </p:transition>
@@ -4569,7 +4561,12 @@
             <p:ph idx="1"/>
           </p:nvPr>
         </p:nvSpPr>
-        <p:spPr/>
+        <p:spPr>
+          <a:xfrm>
+            <a:off x="467544" y="1340768"/>
+            <a:ext cx="8229600" cy="4389120"/>
+          </a:xfrm>
+        </p:spPr>
         <p:txBody>
           <a:bodyPr>
             <a:normAutofit fontScale="70000" lnSpcReduction="20000"/>
@@ -4624,8 +4621,8 @@
         </p:nvSpPr>
         <p:spPr>
           <a:xfrm>
-            <a:off x="518864" y="402400"/>
-            <a:ext cx="8229600" cy="2306520"/>
+            <a:off x="539552" y="1196752"/>
+            <a:ext cx="8229600" cy="648072"/>
           </a:xfrm>
         </p:spPr>
         <p:txBody>
@@ -4636,16 +4633,8 @@
           <a:p>
             <a:pPr algn="ctr"/>
             <a:r>
-              <a:rPr lang="es-ES" dirty="0" smtClean="0"/>
-              <a:t>Modelado de </a:t>
-            </a:r>
-            <a:r>
-              <a:rPr lang="es-ES" dirty="0"/>
-              <a:t>Requerimiento </a:t>
-            </a:r>
-            <a:r>
-              <a:rPr lang="es-ES" dirty="0"/>
-              <a:t>del Sistema</a:t>
+              <a:rPr lang="es-ES" sz="3200" b="1" dirty="0" smtClean="0"/>
+              <a:t>MODELADO DE REQUERIMIENTO DEL SISTEMA</a:t>
             </a:r>
             <a:r>
               <a:rPr lang="es-ES" b="1" dirty="0"/>
@@ -4721,8 +4710,8 @@
         </p:blipFill>
         <p:spPr bwMode="auto">
           <a:xfrm>
-            <a:off x="971600" y="620688"/>
-            <a:ext cx="7272808" cy="5832648"/>
+            <a:off x="323528" y="737320"/>
+            <a:ext cx="8640960" cy="6120680"/>
           </a:xfrm>
           <a:prstGeom prst="rect">
             <a:avLst/>
@@ -4800,9 +4789,10 @@
           <a:p>
             <a:pPr algn="ctr"/>
             <a:r>
-              <a:rPr lang="es-ES" dirty="0"/>
-              <a:t>Prototipos</a:t>
-            </a:r>
+              <a:rPr lang="es-ES" b="1" dirty="0" smtClean="0"/>
+              <a:t>PROTOTIPOS</a:t>
+            </a:r>
+            <a:endParaRPr lang="es-ES" b="1" dirty="0"/>
           </a:p>
         </p:txBody>
       </p:sp>
@@ -4871,7 +4861,7 @@
         </p:blipFill>
         <p:spPr bwMode="auto">
           <a:xfrm>
-            <a:off x="1381125" y="2105819"/>
+            <a:off x="1403648" y="1340768"/>
             <a:ext cx="6381750" cy="4048125"/>
           </a:xfrm>
           <a:prstGeom prst="rect">
@@ -4948,8 +4938,8 @@
         </p:blipFill>
         <p:spPr bwMode="auto">
           <a:xfrm>
-            <a:off x="1381125" y="2105819"/>
-            <a:ext cx="6381750" cy="4048125"/>
+            <a:off x="1187624" y="1124744"/>
+            <a:ext cx="6984776" cy="4536504"/>
           </a:xfrm>
           <a:prstGeom prst="rect">
             <a:avLst/>
@@ -5025,8 +5015,8 @@
         </p:blipFill>
         <p:spPr bwMode="auto">
           <a:xfrm>
-            <a:off x="1381125" y="2105819"/>
-            <a:ext cx="6381750" cy="4048125"/>
+            <a:off x="1187624" y="1196752"/>
+            <a:ext cx="6912768" cy="4752528"/>
           </a:xfrm>
           <a:prstGeom prst="rect">
             <a:avLst/>
@@ -5102,8 +5092,8 @@
         </p:blipFill>
         <p:spPr bwMode="auto">
           <a:xfrm>
-            <a:off x="1381125" y="2067719"/>
-            <a:ext cx="6381750" cy="4124325"/>
+            <a:off x="971600" y="1196752"/>
+            <a:ext cx="7128792" cy="4824536"/>
           </a:xfrm>
           <a:prstGeom prst="rect">
             <a:avLst/>
@@ -5179,8 +5169,8 @@
         </p:blipFill>
         <p:spPr bwMode="auto">
           <a:xfrm>
-            <a:off x="1381125" y="2105819"/>
-            <a:ext cx="6381750" cy="4048125"/>
+            <a:off x="971600" y="1124744"/>
+            <a:ext cx="7416824" cy="4824536"/>
           </a:xfrm>
           <a:prstGeom prst="rect">
             <a:avLst/>
@@ -5256,8 +5246,8 @@
         </p:blipFill>
         <p:spPr bwMode="auto">
           <a:xfrm>
-            <a:off x="1381125" y="2067719"/>
-            <a:ext cx="6381750" cy="4124325"/>
+            <a:off x="755576" y="1052736"/>
+            <a:ext cx="7488832" cy="5112568"/>
           </a:xfrm>
           <a:prstGeom prst="rect">
             <a:avLst/>
@@ -5333,8 +5323,8 @@
         </p:blipFill>
         <p:spPr bwMode="auto">
           <a:xfrm>
-            <a:off x="1381125" y="2105819"/>
-            <a:ext cx="6381750" cy="4048125"/>
+            <a:off x="899592" y="980728"/>
+            <a:ext cx="7560840" cy="4752528"/>
           </a:xfrm>
           <a:prstGeom prst="rect">
             <a:avLst/>
@@ -5395,21 +5385,22 @@
             <p:ph type="title"/>
           </p:nvPr>
         </p:nvSpPr>
-        <p:spPr/>
+        <p:spPr>
+          <a:xfrm>
+            <a:off x="251520" y="188640"/>
+            <a:ext cx="8229600" cy="1143000"/>
+          </a:xfrm>
+        </p:spPr>
         <p:txBody>
           <a:bodyPr/>
           <a:lstStyle/>
           <a:p>
             <a:pPr algn="ctr"/>
             <a:r>
-              <a:rPr lang="es-ES" dirty="0"/>
-              <a:t>O</a:t>
-            </a:r>
-            <a:r>
-              <a:rPr lang="es-ES" dirty="0" smtClean="0"/>
-              <a:t>bjetivos</a:t>
-            </a:r>
-            <a:endParaRPr lang="es-ES" dirty="0"/>
+              <a:rPr lang="es-ES" b="1" dirty="0" smtClean="0"/>
+              <a:t>OBJETIVOS</a:t>
+            </a:r>
+            <a:endParaRPr lang="es-ES" b="1" dirty="0"/>
           </a:p>
         </p:txBody>
       </p:sp>
@@ -5423,7 +5414,12 @@
             <p:ph idx="1"/>
           </p:nvPr>
         </p:nvSpPr>
-        <p:spPr/>
+        <p:spPr>
+          <a:xfrm>
+            <a:off x="467544" y="1628800"/>
+            <a:ext cx="8229600" cy="4389120"/>
+          </a:xfrm>
+        </p:spPr>
         <p:txBody>
           <a:bodyPr>
             <a:normAutofit/>
@@ -5432,7 +5428,33 @@
           <a:p>
             <a:r>
               <a:rPr lang="es-ES" dirty="0"/>
-              <a:t>Los objetivos del sistema son minimizar los problemas referentes a la gestión de pedidos de parte del cliente, optimizar la gestión de ventas del restaurante. </a:t>
+              <a:t>M</a:t>
+            </a:r>
+            <a:r>
+              <a:rPr lang="es-ES" dirty="0" smtClean="0"/>
+              <a:t>inimizar </a:t>
+            </a:r>
+            <a:r>
+              <a:rPr lang="es-ES" dirty="0"/>
+              <a:t>los problemas referentes a la gestión de pedidos de parte del </a:t>
+            </a:r>
+            <a:r>
+              <a:rPr lang="es-ES" dirty="0" smtClean="0"/>
+              <a:t>cliente.</a:t>
+            </a:r>
+          </a:p>
+          <a:p>
+            <a:r>
+              <a:rPr lang="es-ES" dirty="0"/>
+              <a:t>O</a:t>
+            </a:r>
+            <a:r>
+              <a:rPr lang="es-ES" dirty="0" smtClean="0"/>
+              <a:t>ptimizar </a:t>
+            </a:r>
+            <a:r>
+              <a:rPr lang="es-ES" dirty="0"/>
+              <a:t>la gestión de ventas del restaurante. </a:t>
             </a:r>
             <a:endParaRPr lang="es-ES" dirty="0" smtClean="0"/>
           </a:p>
@@ -5445,7 +5467,15 @@
           <a:p>
             <a:r>
               <a:rPr lang="es-ES" dirty="0"/>
-              <a:t>La meta a alcanzar es mejorar el servicio de </a:t>
+              <a:t>La meta </a:t>
+            </a:r>
+            <a:r>
+              <a:rPr lang="es-ES" dirty="0" smtClean="0"/>
+              <a:t>es </a:t>
+            </a:r>
+            <a:r>
+              <a:rPr lang="es-ES" dirty="0"/>
+              <a:t>mejorar el servicio de </a:t>
             </a:r>
             <a:r>
               <a:rPr lang="es-ES" dirty="0" err="1"/>
@@ -5453,7 +5483,15 @@
             </a:r>
             <a:r>
               <a:rPr lang="es-ES" dirty="0"/>
-              <a:t> y aumentar las ventas.</a:t>
+              <a:t> </a:t>
+            </a:r>
+            <a:r>
+              <a:rPr lang="es-ES" dirty="0" smtClean="0"/>
+              <a:t> y </a:t>
+            </a:r>
+            <a:r>
+              <a:rPr lang="es-ES" dirty="0"/>
+              <a:t>aumentar las ventas.</a:t>
             </a:r>
           </a:p>
           <a:p>
@@ -5529,8 +5567,8 @@
         </p:blipFill>
         <p:spPr bwMode="auto">
           <a:xfrm>
-            <a:off x="1381125" y="2105819"/>
-            <a:ext cx="6381750" cy="4048125"/>
+            <a:off x="611560" y="980728"/>
+            <a:ext cx="7920880" cy="4968552"/>
           </a:xfrm>
           <a:prstGeom prst="rect">
             <a:avLst/>
@@ -5606,8 +5644,8 @@
         </p:blipFill>
         <p:spPr bwMode="auto">
           <a:xfrm>
-            <a:off x="1381125" y="2105819"/>
-            <a:ext cx="6381750" cy="4048125"/>
+            <a:off x="971600" y="1052736"/>
+            <a:ext cx="7488832" cy="5112568"/>
           </a:xfrm>
           <a:prstGeom prst="rect">
             <a:avLst/>
@@ -5683,8 +5721,8 @@
         </p:blipFill>
         <p:spPr bwMode="auto">
           <a:xfrm>
-            <a:off x="1381125" y="2105819"/>
-            <a:ext cx="6381750" cy="4048125"/>
+            <a:off x="899592" y="908720"/>
+            <a:ext cx="7776864" cy="5184576"/>
           </a:xfrm>
           <a:prstGeom prst="rect">
             <a:avLst/>
@@ -5760,8 +5798,8 @@
         </p:blipFill>
         <p:spPr bwMode="auto">
           <a:xfrm>
-            <a:off x="1381125" y="2117179"/>
-            <a:ext cx="6381750" cy="4048125"/>
+            <a:off x="971600" y="1052736"/>
+            <a:ext cx="7632848" cy="4824536"/>
           </a:xfrm>
           <a:prstGeom prst="rect">
             <a:avLst/>
@@ -5822,17 +5860,24 @@
             <p:ph type="title"/>
           </p:nvPr>
         </p:nvSpPr>
-        <p:spPr/>
-        <p:txBody>
-          <a:bodyPr/>
+        <p:spPr>
+          <a:xfrm>
+            <a:off x="467544" y="476672"/>
+            <a:ext cx="8229600" cy="1143000"/>
+          </a:xfrm>
+        </p:spPr>
+        <p:txBody>
+          <a:bodyPr>
+            <a:normAutofit fontScale="90000"/>
+          </a:bodyPr>
           <a:lstStyle/>
           <a:p>
             <a:pPr algn="ctr"/>
             <a:r>
-              <a:rPr lang="es-ES" dirty="0" smtClean="0"/>
-              <a:t>Herramientas colaborativas</a:t>
-            </a:r>
-            <a:endParaRPr lang="es-ES" dirty="0"/>
+              <a:rPr lang="es-ES" b="1" dirty="0" smtClean="0"/>
+              <a:t>HERRAMIENTAS COLABORATIVAS</a:t>
+            </a:r>
+            <a:endParaRPr lang="es-ES" b="1" dirty="0"/>
           </a:p>
         </p:txBody>
       </p:sp>
@@ -5897,10 +5942,229 @@
             <a:endParaRPr lang="es-ES" dirty="0"/>
           </a:p>
           <a:p>
+            <a:pPr marL="0" indent="0">
+              <a:buNone/>
+            </a:pPr>
             <a:endParaRPr lang="es-ES" dirty="0"/>
           </a:p>
         </p:txBody>
       </p:sp>
+      <p:pic>
+        <p:nvPicPr>
+          <p:cNvPr id="1026" name="Picture 2"/>
+          <p:cNvPicPr>
+            <a:picLocks noChangeAspect="1" noChangeArrowheads="1"/>
+          </p:cNvPicPr>
+          <p:nvPr/>
+        </p:nvPicPr>
+        <p:blipFill>
+          <a:blip r:embed="rId2" cstate="print">
+            <a:extLst>
+              <a:ext uri="{28A0092B-C50C-407E-A947-70E740481C1C}">
+                <a14:useLocalDpi xmlns:a14="http://schemas.microsoft.com/office/drawing/2010/main" val="0"/>
+              </a:ext>
+            </a:extLst>
+          </a:blip>
+          <a:srcRect/>
+          <a:stretch>
+            <a:fillRect/>
+          </a:stretch>
+        </p:blipFill>
+        <p:spPr bwMode="auto">
+          <a:xfrm rot="20930783">
+            <a:off x="550779" y="3868323"/>
+            <a:ext cx="2425452" cy="1616968"/>
+          </a:xfrm>
+          <a:prstGeom prst="rect">
+            <a:avLst/>
+          </a:prstGeom>
+          <a:noFill/>
+          <a:ln>
+            <a:noFill/>
+          </a:ln>
+          <a:extLst>
+            <a:ext uri="{909E8E84-426E-40DD-AFC4-6F175D3DCCD1}">
+              <a14:hiddenFill xmlns:a14="http://schemas.microsoft.com/office/drawing/2010/main">
+                <a:solidFill>
+                  <a:schemeClr val="accent1"/>
+                </a:solidFill>
+              </a14:hiddenFill>
+            </a:ext>
+            <a:ext uri="{91240B29-F687-4F45-9708-019B960494DF}">
+              <a14:hiddenLine xmlns:a14="http://schemas.microsoft.com/office/drawing/2010/main" w="9525">
+                <a:solidFill>
+                  <a:schemeClr val="tx1"/>
+                </a:solidFill>
+                <a:miter lim="800000"/>
+                <a:headEnd/>
+                <a:tailEnd/>
+              </a14:hiddenLine>
+            </a:ext>
+          </a:extLst>
+        </p:spPr>
+      </p:pic>
+      <p:pic>
+        <p:nvPicPr>
+          <p:cNvPr id="1027" name="Picture 3"/>
+          <p:cNvPicPr>
+            <a:picLocks noChangeAspect="1" noChangeArrowheads="1"/>
+          </p:cNvPicPr>
+          <p:nvPr/>
+        </p:nvPicPr>
+        <p:blipFill>
+          <a:blip r:embed="rId3">
+            <a:extLst>
+              <a:ext uri="{28A0092B-C50C-407E-A947-70E740481C1C}">
+                <a14:useLocalDpi xmlns:a14="http://schemas.microsoft.com/office/drawing/2010/main" val="0"/>
+              </a:ext>
+            </a:extLst>
+          </a:blip>
+          <a:srcRect/>
+          <a:stretch>
+            <a:fillRect/>
+          </a:stretch>
+        </p:blipFill>
+        <p:spPr bwMode="auto">
+          <a:xfrm rot="638652">
+            <a:off x="3017926" y="5074764"/>
+            <a:ext cx="1219200" cy="1219200"/>
+          </a:xfrm>
+          <a:prstGeom prst="rect">
+            <a:avLst/>
+          </a:prstGeom>
+          <a:noFill/>
+          <a:ln>
+            <a:noFill/>
+          </a:ln>
+          <a:extLst>
+            <a:ext uri="{909E8E84-426E-40DD-AFC4-6F175D3DCCD1}">
+              <a14:hiddenFill xmlns:a14="http://schemas.microsoft.com/office/drawing/2010/main">
+                <a:solidFill>
+                  <a:schemeClr val="accent1"/>
+                </a:solidFill>
+              </a14:hiddenFill>
+            </a:ext>
+            <a:ext uri="{91240B29-F687-4F45-9708-019B960494DF}">
+              <a14:hiddenLine xmlns:a14="http://schemas.microsoft.com/office/drawing/2010/main" w="9525">
+                <a:solidFill>
+                  <a:schemeClr val="tx1"/>
+                </a:solidFill>
+                <a:miter lim="800000"/>
+                <a:headEnd/>
+                <a:tailEnd/>
+              </a14:hiddenLine>
+            </a:ext>
+          </a:extLst>
+        </p:spPr>
+      </p:pic>
+      <p:pic>
+        <p:nvPicPr>
+          <p:cNvPr id="1028" name="Picture 4"/>
+          <p:cNvPicPr>
+            <a:picLocks noChangeAspect="1" noChangeArrowheads="1"/>
+          </p:cNvPicPr>
+          <p:nvPr/>
+        </p:nvPicPr>
+        <p:blipFill>
+          <a:blip r:embed="rId4">
+            <a:extLst>
+              <a:ext uri="{28A0092B-C50C-407E-A947-70E740481C1C}">
+                <a14:useLocalDpi xmlns:a14="http://schemas.microsoft.com/office/drawing/2010/main" val="0"/>
+              </a:ext>
+            </a:extLst>
+          </a:blip>
+          <a:srcRect/>
+          <a:stretch>
+            <a:fillRect/>
+          </a:stretch>
+        </p:blipFill>
+        <p:spPr bwMode="auto">
+          <a:xfrm rot="21182784">
+            <a:off x="4730655" y="4073715"/>
+            <a:ext cx="1524000" cy="1524000"/>
+          </a:xfrm>
+          <a:prstGeom prst="rect">
+            <a:avLst/>
+          </a:prstGeom>
+          <a:noFill/>
+          <a:ln>
+            <a:noFill/>
+          </a:ln>
+          <a:extLst>
+            <a:ext uri="{909E8E84-426E-40DD-AFC4-6F175D3DCCD1}">
+              <a14:hiddenFill xmlns:a14="http://schemas.microsoft.com/office/drawing/2010/main">
+                <a:solidFill>
+                  <a:schemeClr val="accent1"/>
+                </a:solidFill>
+              </a14:hiddenFill>
+            </a:ext>
+            <a:ext uri="{91240B29-F687-4F45-9708-019B960494DF}">
+              <a14:hiddenLine xmlns:a14="http://schemas.microsoft.com/office/drawing/2010/main" w="9525">
+                <a:solidFill>
+                  <a:schemeClr val="tx1"/>
+                </a:solidFill>
+                <a:miter lim="800000"/>
+                <a:headEnd/>
+                <a:tailEnd/>
+              </a14:hiddenLine>
+            </a:ext>
+          </a:extLst>
+        </p:spPr>
+      </p:pic>
+      <p:pic>
+        <p:nvPicPr>
+          <p:cNvPr id="1029" name="Picture 5"/>
+          <p:cNvPicPr>
+            <a:picLocks noChangeAspect="1" noChangeArrowheads="1"/>
+          </p:cNvPicPr>
+          <p:nvPr/>
+        </p:nvPicPr>
+        <p:blipFill>
+          <a:blip r:embed="rId5">
+            <a:extLst>
+              <a:ext uri="{28A0092B-C50C-407E-A947-70E740481C1C}">
+                <a14:useLocalDpi xmlns:a14="http://schemas.microsoft.com/office/drawing/2010/main" val="0"/>
+              </a:ext>
+            </a:extLst>
+          </a:blip>
+          <a:srcRect/>
+          <a:stretch>
+            <a:fillRect/>
+          </a:stretch>
+        </p:blipFill>
+        <p:spPr bwMode="auto">
+          <a:xfrm>
+            <a:off x="6732240" y="4389603"/>
+            <a:ext cx="1441698" cy="1618510"/>
+          </a:xfrm>
+          <a:prstGeom prst="rect">
+            <a:avLst/>
+          </a:prstGeom>
+          <a:noFill/>
+          <a:ln>
+            <a:noFill/>
+          </a:ln>
+          <a:extLst>
+            <a:ext uri="{909E8E84-426E-40DD-AFC4-6F175D3DCCD1}">
+              <a14:hiddenFill xmlns:a14="http://schemas.microsoft.com/office/drawing/2010/main">
+                <a:solidFill>
+                  <a:schemeClr val="accent1"/>
+                </a:solidFill>
+              </a14:hiddenFill>
+            </a:ext>
+            <a:ext uri="{91240B29-F687-4F45-9708-019B960494DF}">
+              <a14:hiddenLine xmlns:a14="http://schemas.microsoft.com/office/drawing/2010/main" w="9525">
+                <a:solidFill>
+                  <a:schemeClr val="tx1"/>
+                </a:solidFill>
+                <a:miter lim="800000"/>
+                <a:headEnd/>
+                <a:tailEnd/>
+              </a14:hiddenLine>
+            </a:ext>
+          </a:extLst>
+        </p:spPr>
+      </p:pic>
     </p:spTree>
     <p:extLst>
       <p:ext uri="{BB962C8B-B14F-4D97-AF65-F5344CB8AC3E}">
@@ -5958,10 +6222,10 @@
           <a:p>
             <a:pPr algn="ctr"/>
             <a:r>
-              <a:rPr lang="es-ES" dirty="0" smtClean="0"/>
-              <a:t>Entorno de desarrollo</a:t>
-            </a:r>
-            <a:endParaRPr lang="es-ES" dirty="0"/>
+              <a:rPr lang="es-ES" b="1" dirty="0" smtClean="0"/>
+              <a:t>ENTORNO DE DESARROLLO</a:t>
+            </a:r>
+            <a:endParaRPr lang="es-ES" b="1" dirty="0"/>
           </a:p>
         </p:txBody>
       </p:sp>
@@ -5989,9 +6253,9 @@
           </a:stretch>
         </p:blipFill>
         <p:spPr bwMode="auto">
-          <a:xfrm>
-            <a:off x="-85683" y="1778383"/>
-            <a:ext cx="5017723" cy="2492675"/>
+          <a:xfrm rot="20609922">
+            <a:off x="-85682" y="1997463"/>
+            <a:ext cx="4576718" cy="2273595"/>
           </a:xfrm>
           <a:prstGeom prst="rect">
             <a:avLst/>
@@ -6069,8 +6333,8 @@
           </a:stretch>
         </p:blipFill>
         <p:spPr bwMode="auto">
-          <a:xfrm>
-            <a:off x="4491035" y="2276872"/>
+          <a:xfrm rot="676186">
+            <a:off x="4491035" y="2436510"/>
             <a:ext cx="3992077" cy="1495698"/>
           </a:xfrm>
           <a:prstGeom prst="rect">
@@ -6110,8 +6374,8 @@
           </a:stretch>
         </p:blipFill>
         <p:spPr bwMode="auto">
-          <a:xfrm>
-            <a:off x="2195736" y="4149080"/>
+          <a:xfrm rot="288563">
+            <a:off x="2429554" y="4025453"/>
             <a:ext cx="4005935" cy="2002968"/>
           </a:xfrm>
           <a:prstGeom prst="rect">
@@ -6179,17 +6443,22 @@
             <p:ph type="title"/>
           </p:nvPr>
         </p:nvSpPr>
-        <p:spPr/>
+        <p:spPr>
+          <a:xfrm>
+            <a:off x="395536" y="764704"/>
+            <a:ext cx="8229600" cy="1143000"/>
+          </a:xfrm>
+        </p:spPr>
         <p:txBody>
           <a:bodyPr/>
           <a:lstStyle/>
           <a:p>
             <a:pPr algn="ctr"/>
             <a:r>
-              <a:rPr lang="es-ES" dirty="0" smtClean="0"/>
-              <a:t>Diagramas de UML</a:t>
-            </a:r>
-            <a:endParaRPr lang="es-ES" dirty="0"/>
+              <a:rPr lang="es-ES" b="1" dirty="0" smtClean="0"/>
+              <a:t>DIAGRAMAS DE UML</a:t>
+            </a:r>
+            <a:endParaRPr lang="es-ES" b="1" dirty="0"/>
           </a:p>
         </p:txBody>
       </p:sp>
@@ -6203,7 +6472,12 @@
             <p:ph idx="1"/>
           </p:nvPr>
         </p:nvSpPr>
-        <p:spPr/>
+        <p:spPr>
+          <a:xfrm>
+            <a:off x="539552" y="1916832"/>
+            <a:ext cx="8229600" cy="4389120"/>
+          </a:xfrm>
+        </p:spPr>
         <p:txBody>
           <a:bodyPr>
             <a:normAutofit/>
@@ -6213,6 +6487,9 @@
             <a:endParaRPr lang="es-ES" dirty="0" smtClean="0"/>
           </a:p>
           <a:p>
+            <a:pPr marL="0" indent="0" algn="ctr">
+              <a:buNone/>
+            </a:pPr>
             <a:r>
               <a:rPr lang="es-ES" dirty="0" smtClean="0"/>
               <a:t>UML </a:t>
@@ -6223,9 +6500,24 @@
             </a:r>
           </a:p>
           <a:p>
+            <a:pPr marL="0" indent="0" algn="ctr">
+              <a:buNone/>
+            </a:pPr>
+            <a:r>
+              <a:rPr lang="es-ES" dirty="0" smtClean="0"/>
+              <a:t>Mediante </a:t>
+            </a:r>
             <a:r>
               <a:rPr lang="es-ES" dirty="0"/>
-              <a:t>Mediante UML se pueden establecer los requerimientos y la estructura necesaria para desarrollar un sistema antes de codificarlo (escribirlo).</a:t>
+              <a:t>UML se pueden establecer </a:t>
+            </a:r>
+            <a:r>
+              <a:rPr lang="es-ES" dirty="0" smtClean="0"/>
+              <a:t>los       requerimientos </a:t>
+            </a:r>
+            <a:r>
+              <a:rPr lang="es-ES" dirty="0"/>
+              <a:t>y la estructura necesaria para desarrollar un sistema antes de codificarlo (escribirlo).</a:t>
             </a:r>
           </a:p>
           <a:p>
@@ -6290,17 +6582,22 @@
             <p:ph type="title"/>
           </p:nvPr>
         </p:nvSpPr>
-        <p:spPr/>
+        <p:spPr>
+          <a:xfrm>
+            <a:off x="467544" y="548680"/>
+            <a:ext cx="8229600" cy="1143000"/>
+          </a:xfrm>
+        </p:spPr>
         <p:txBody>
           <a:bodyPr/>
           <a:lstStyle/>
           <a:p>
             <a:pPr algn="ctr"/>
             <a:r>
-              <a:rPr lang="es-ES" dirty="0" smtClean="0"/>
-              <a:t>Diagrama de estado </a:t>
-            </a:r>
-            <a:endParaRPr lang="es-ES" dirty="0"/>
+              <a:rPr lang="es-ES" b="1" dirty="0" smtClean="0"/>
+              <a:t>DIAGRAMA DE ESTADO </a:t>
+            </a:r>
+            <a:endParaRPr lang="es-ES" b="1" dirty="0"/>
           </a:p>
         </p:txBody>
       </p:sp>
@@ -6328,8 +6625,8 @@
         </p:blipFill>
         <p:spPr>
           <a:xfrm>
-            <a:off x="457200" y="2715792"/>
-            <a:ext cx="8229600" cy="2828178"/>
+            <a:off x="0" y="2132856"/>
+            <a:ext cx="9144000" cy="4824536"/>
           </a:xfrm>
           <a:prstGeom prst="rect">
             <a:avLst/>
@@ -6393,10 +6690,10 @@
           <a:p>
             <a:pPr algn="ctr"/>
             <a:r>
-              <a:rPr lang="es-ES" dirty="0" smtClean="0"/>
+              <a:rPr lang="es-ES" b="1" dirty="0" smtClean="0"/>
               <a:t>Diagrama de clases</a:t>
             </a:r>
-            <a:endParaRPr lang="es-ES" dirty="0"/>
+            <a:endParaRPr lang="es-ES" b="1" dirty="0"/>
           </a:p>
         </p:txBody>
       </p:sp>
@@ -6424,8 +6721,8 @@
         </p:blipFill>
         <p:spPr>
           <a:xfrm>
-            <a:off x="478655" y="1935163"/>
-            <a:ext cx="8186689" cy="4389437"/>
+            <a:off x="251521" y="1844825"/>
+            <a:ext cx="8413824" cy="4479776"/>
           </a:xfrm>
           <a:prstGeom prst="rect">
             <a:avLst/>
@@ -6489,10 +6786,10 @@
           <a:p>
             <a:pPr algn="ctr"/>
             <a:r>
-              <a:rPr lang="es-ES" dirty="0" smtClean="0"/>
-              <a:t>Diagrama de Paquete</a:t>
-            </a:r>
-            <a:endParaRPr lang="es-ES" dirty="0"/>
+              <a:rPr lang="es-ES" b="1" dirty="0" smtClean="0"/>
+              <a:t>DIAGRAMA DE PAQUETE</a:t>
+            </a:r>
+            <a:endParaRPr lang="es-ES" b="1" dirty="0"/>
           </a:p>
         </p:txBody>
       </p:sp>
@@ -6587,18 +6884,24 @@
             <p:ph type="title"/>
           </p:nvPr>
         </p:nvSpPr>
-        <p:spPr/>
+        <p:spPr>
+          <a:xfrm>
+            <a:off x="323528" y="260648"/>
+            <a:ext cx="8229600" cy="1143000"/>
+          </a:xfrm>
+        </p:spPr>
         <p:txBody>
           <a:bodyPr>
-            <a:normAutofit fontScale="90000"/>
+            <a:normAutofit/>
           </a:bodyPr>
           <a:lstStyle/>
           <a:p>
-            <a:r>
-              <a:rPr lang="es-ES" dirty="0" smtClean="0"/>
-              <a:t>Recolección de datos para la elaboración de Requerimientos</a:t>
-            </a:r>
-            <a:endParaRPr lang="es-ES" dirty="0"/>
+            <a:pPr algn="ctr"/>
+            <a:r>
+              <a:rPr lang="es-ES" b="1" dirty="0" smtClean="0"/>
+              <a:t>RECOLECCIÓN DE DATOS</a:t>
+            </a:r>
+            <a:endParaRPr lang="es-ES" b="1" dirty="0"/>
           </a:p>
         </p:txBody>
       </p:sp>
@@ -6612,7 +6915,12 @@
             <p:ph idx="1"/>
           </p:nvPr>
         </p:nvSpPr>
-        <p:spPr/>
+        <p:spPr>
+          <a:xfrm>
+            <a:off x="395536" y="1628800"/>
+            <a:ext cx="8229600" cy="4389120"/>
+          </a:xfrm>
+        </p:spPr>
         <p:txBody>
           <a:bodyPr>
             <a:normAutofit fontScale="85000" lnSpcReduction="20000"/>
@@ -6770,17 +7078,22 @@
             <p:ph type="title"/>
           </p:nvPr>
         </p:nvSpPr>
-        <p:spPr/>
+        <p:spPr>
+          <a:xfrm>
+            <a:off x="395536" y="260648"/>
+            <a:ext cx="8229600" cy="1143000"/>
+          </a:xfrm>
+        </p:spPr>
         <p:txBody>
           <a:bodyPr/>
           <a:lstStyle/>
           <a:p>
             <a:pPr algn="ctr"/>
             <a:r>
-              <a:rPr lang="es-ES" dirty="0" smtClean="0"/>
+              <a:rPr lang="es-ES" b="1" dirty="0" smtClean="0"/>
               <a:t>Diagrama  de Secuencia</a:t>
             </a:r>
-            <a:endParaRPr lang="es-ES" dirty="0"/>
+            <a:endParaRPr lang="es-ES" b="1" dirty="0"/>
           </a:p>
         </p:txBody>
       </p:sp>
@@ -6806,8 +7119,8 @@
         </p:blipFill>
         <p:spPr bwMode="auto">
           <a:xfrm>
-            <a:off x="1778149" y="1935163"/>
-            <a:ext cx="5587702" cy="4389437"/>
+            <a:off x="467544" y="1935163"/>
+            <a:ext cx="8280920" cy="4389437"/>
           </a:xfrm>
           <a:prstGeom prst="rect">
             <a:avLst/>
@@ -6879,10 +7192,9 @@
           <a:p>
             <a:pPr algn="ctr"/>
             <a:r>
-              <a:rPr lang="es-ES" dirty="0"/>
+              <a:rPr lang="es-ES" b="1" dirty="0"/>
               <a:t>Diagrama  de Secuencia</a:t>
             </a:r>
-            <a:endParaRPr lang="es-ES" dirty="0"/>
           </a:p>
         </p:txBody>
       </p:sp>
@@ -6908,8 +7220,8 @@
         </p:blipFill>
         <p:spPr bwMode="auto">
           <a:xfrm>
-            <a:off x="2296445" y="1935163"/>
-            <a:ext cx="4551110" cy="4389437"/>
+            <a:off x="107504" y="1916832"/>
+            <a:ext cx="9505056" cy="6462389"/>
           </a:xfrm>
           <a:prstGeom prst="rect">
             <a:avLst/>
@@ -6983,7 +7295,7 @@
             <a:pPr algn="ctr"/>
             <a:r>
               <a:rPr lang="es-ES" dirty="0" smtClean="0"/>
-              <a:t>Diagrama Comunicación</a:t>
+              <a:t>DIAGRAMA COMUNICACIÓN</a:t>
             </a:r>
             <a:endParaRPr lang="es-ES" dirty="0"/>
           </a:p>
@@ -7006,8 +7318,8 @@
         </p:blipFill>
         <p:spPr>
           <a:xfrm>
-            <a:off x="822250" y="1844824"/>
-            <a:ext cx="7499500" cy="2736304"/>
+            <a:off x="899592" y="2060848"/>
+            <a:ext cx="7499500" cy="4104456"/>
           </a:xfrm>
           <a:prstGeom prst="rect">
             <a:avLst/>
@@ -7064,17 +7376,22 @@
             <p:ph type="title"/>
           </p:nvPr>
         </p:nvSpPr>
-        <p:spPr/>
+        <p:spPr>
+          <a:xfrm>
+            <a:off x="395536" y="260648"/>
+            <a:ext cx="8229600" cy="1143000"/>
+          </a:xfrm>
+        </p:spPr>
         <p:txBody>
           <a:bodyPr/>
           <a:lstStyle/>
           <a:p>
             <a:pPr algn="ctr"/>
             <a:r>
-              <a:rPr lang="es-ES" dirty="0" smtClean="0"/>
-              <a:t>Diagrama de Actividad</a:t>
-            </a:r>
-            <a:endParaRPr lang="es-ES" dirty="0"/>
+              <a:rPr lang="es-ES" b="1" dirty="0" smtClean="0"/>
+              <a:t>DIAGRAMA DE ACTIVIDAD</a:t>
+            </a:r>
+            <a:endParaRPr lang="es-ES" b="1" dirty="0"/>
           </a:p>
         </p:txBody>
       </p:sp>
@@ -7099,8 +7416,8 @@
         </p:blipFill>
         <p:spPr bwMode="auto">
           <a:xfrm>
-            <a:off x="1403648" y="1846845"/>
-            <a:ext cx="5756622" cy="4984931"/>
+            <a:off x="971600" y="1472715"/>
+            <a:ext cx="7056784" cy="5359062"/>
           </a:xfrm>
           <a:prstGeom prst="rect">
             <a:avLst/>
@@ -7157,29 +7474,6 @@
           <a:chExt cx="0" cy="0"/>
         </a:xfrm>
       </p:grpSpPr>
-      <p:sp>
-        <p:nvSpPr>
-          <p:cNvPr id="2" name="1 Título"/>
-          <p:cNvSpPr>
-            <a:spLocks noGrp="1"/>
-          </p:cNvSpPr>
-          <p:nvPr>
-            <p:ph type="title"/>
-          </p:nvPr>
-        </p:nvSpPr>
-        <p:spPr/>
-        <p:txBody>
-          <a:bodyPr/>
-          <a:lstStyle/>
-          <a:p>
-            <a:pPr algn="ctr"/>
-            <a:r>
-              <a:rPr lang="es-ES" dirty="0"/>
-              <a:t>Diagrama de Actividad</a:t>
-            </a:r>
-          </a:p>
-        </p:txBody>
-      </p:sp>
       <p:pic>
         <p:nvPicPr>
           <p:cNvPr id="4" name="Picture 3" descr="C:\proyectoDeliberyApp\caso de uso\CasoUsoSistema\ac.png"/>
@@ -7205,8 +7499,8 @@
         </p:blipFill>
         <p:spPr bwMode="auto">
           <a:xfrm>
-            <a:off x="771299" y="1556792"/>
-            <a:ext cx="7601401" cy="4389437"/>
+            <a:off x="0" y="1111405"/>
+            <a:ext cx="9143999" cy="5280211"/>
           </a:xfrm>
           <a:prstGeom prst="rect">
             <a:avLst/>
@@ -7223,6 +7517,38 @@
           </a:extLst>
         </p:spPr>
       </p:pic>
+      <p:sp>
+        <p:nvSpPr>
+          <p:cNvPr id="2" name="1 Título"/>
+          <p:cNvSpPr>
+            <a:spLocks noGrp="1"/>
+          </p:cNvSpPr>
+          <p:nvPr>
+            <p:ph type="title"/>
+          </p:nvPr>
+        </p:nvSpPr>
+        <p:spPr/>
+        <p:txBody>
+          <a:bodyPr/>
+          <a:lstStyle/>
+          <a:p>
+            <a:pPr algn="ctr"/>
+            <a:r>
+              <a:rPr lang="es-ES" b="1" dirty="0" smtClean="0">
+                <a:solidFill>
+                  <a:schemeClr val="tx1"/>
+                </a:solidFill>
+              </a:rPr>
+              <a:t>DIAGRAMA DE ACTIVIDAD</a:t>
+            </a:r>
+            <a:endParaRPr lang="es-ES" b="1" dirty="0">
+              <a:solidFill>
+                <a:schemeClr val="tx1"/>
+              </a:solidFill>
+            </a:endParaRPr>
+          </a:p>
+        </p:txBody>
+      </p:sp>
     </p:spTree>
     <p:extLst>
       <p:ext uri="{BB962C8B-B14F-4D97-AF65-F5344CB8AC3E}">
@@ -7328,13 +7654,13 @@
   <p:clrMapOvr>
     <a:masterClrMapping/>
   </p:clrMapOvr>
-  <mc:AlternateContent xmlns:mc="http://schemas.openxmlformats.org/markup-compatibility/2006">
-    <mc:Choice xmlns:p14="http://schemas.microsoft.com/office/powerpoint/2010/main" Requires="p14">
+  <mc:AlternateContent xmlns:mc="http://schemas.openxmlformats.org/markup-compatibility/2006" xmlns:p14="http://schemas.microsoft.com/office/powerpoint/2010/main">
+    <mc:Choice Requires="p14">
       <p:transition spd="slow" p14:dur="1400">
         <p14:ripple/>
       </p:transition>
     </mc:Choice>
-    <mc:Fallback>
+    <mc:Fallback xmlns="">
       <p:transition spd="slow">
         <p:fade/>
       </p:transition>
@@ -7377,16 +7703,22 @@
             <p:ph type="title"/>
           </p:nvPr>
         </p:nvSpPr>
-        <p:spPr/>
+        <p:spPr>
+          <a:xfrm>
+            <a:off x="467544" y="188640"/>
+            <a:ext cx="8229600" cy="1143000"/>
+          </a:xfrm>
+        </p:spPr>
         <p:txBody>
           <a:bodyPr/>
           <a:lstStyle/>
           <a:p>
-            <a:r>
-              <a:rPr lang="es-ES" dirty="0" smtClean="0"/>
-              <a:t>Alcance</a:t>
-            </a:r>
-            <a:endParaRPr lang="es-ES" dirty="0"/>
+            <a:pPr algn="ctr"/>
+            <a:r>
+              <a:rPr lang="es-ES" b="1" dirty="0" smtClean="0"/>
+              <a:t>ALCANCE</a:t>
+            </a:r>
+            <a:endParaRPr lang="es-ES" b="1" dirty="0"/>
           </a:p>
         </p:txBody>
       </p:sp>
@@ -7400,13 +7732,21 @@
             <p:ph idx="1"/>
           </p:nvPr>
         </p:nvSpPr>
-        <p:spPr/>
+        <p:spPr>
+          <a:xfrm>
+            <a:off x="467544" y="1628800"/>
+            <a:ext cx="8229600" cy="4389120"/>
+          </a:xfrm>
+        </p:spPr>
         <p:txBody>
           <a:bodyPr>
-            <a:normAutofit lnSpcReduction="10000"/>
+            <a:normAutofit/>
           </a:bodyPr>
           <a:lstStyle/>
           <a:p>
+            <a:pPr marL="0" indent="0" algn="ctr">
+              <a:buNone/>
+            </a:pPr>
             <a:r>
               <a:rPr lang="es-ES" dirty="0" err="1" smtClean="0"/>
               <a:t>DeliverYApp</a:t>
@@ -7485,7 +7825,7 @@
         </p:nvSpPr>
         <p:spPr>
           <a:xfrm>
-            <a:off x="467544" y="476672"/>
+            <a:off x="467544" y="332656"/>
             <a:ext cx="8229600" cy="1143000"/>
           </a:xfrm>
         </p:spPr>
@@ -7495,10 +7835,10 @@
           <a:p>
             <a:pPr algn="ctr"/>
             <a:r>
-              <a:rPr lang="es-ES" dirty="0" smtClean="0"/>
-              <a:t>Delimitación</a:t>
-            </a:r>
-            <a:endParaRPr lang="es-ES" dirty="0"/>
+              <a:rPr lang="es-ES" b="1" dirty="0" smtClean="0"/>
+              <a:t>DELIMITACIÓN</a:t>
+            </a:r>
+            <a:endParaRPr lang="es-ES" b="1" dirty="0"/>
           </a:p>
         </p:txBody>
       </p:sp>
@@ -7514,8 +7854,8 @@
         </p:nvSpPr>
         <p:spPr>
           <a:xfrm>
-            <a:off x="446856" y="1935480"/>
-            <a:ext cx="8229600" cy="4389120"/>
+            <a:off x="395536" y="2348880"/>
+            <a:ext cx="8229600" cy="2357616"/>
           </a:xfrm>
         </p:spPr>
         <p:txBody>
@@ -7584,8 +7924,8 @@
         </p:nvSpPr>
         <p:spPr>
           <a:xfrm>
-            <a:off x="428475" y="3717032"/>
-            <a:ext cx="8229600" cy="3456384"/>
+            <a:off x="428475" y="4142264"/>
+            <a:ext cx="8229600" cy="1728192"/>
           </a:xfrm>
         </p:spPr>
         <p:txBody>
@@ -7673,8 +8013,8 @@
           </a:stretch>
         </p:blipFill>
         <p:spPr bwMode="auto">
-          <a:xfrm>
-            <a:off x="3203848" y="1453426"/>
+          <a:xfrm rot="20173433">
+            <a:off x="3510225" y="1594684"/>
             <a:ext cx="2376264" cy="2160240"/>
           </a:xfrm>
           <a:prstGeom prst="rect">
@@ -7696,7 +8036,7 @@
         </p:nvSpPr>
         <p:spPr>
           <a:xfrm>
-            <a:off x="612157" y="260648"/>
+            <a:off x="583557" y="476672"/>
             <a:ext cx="8229600" cy="1143000"/>
           </a:xfrm>
           <a:prstGeom prst="rect">
@@ -7705,7 +8045,7 @@
         </p:spPr>
         <p:txBody>
           <a:bodyPr vert="horz" lIns="91440" tIns="45720" rIns="91440" bIns="45720" rtlCol="0" anchor="ctr">
-            <a:normAutofit/>
+            <a:normAutofit fontScale="92500"/>
           </a:bodyPr>
           <a:lstStyle>
             <a:lvl1pPr algn="ctr" defTabSz="914400" rtl="0" eaLnBrk="1" latinLnBrk="0" hangingPunct="1">
@@ -7725,14 +8065,14 @@
           </a:lstStyle>
           <a:p>
             <a:r>
-              <a:rPr lang="es-ES" sz="5000" dirty="0">
+              <a:rPr lang="es-ES" sz="5000" b="1" dirty="0" smtClean="0">
                 <a:solidFill>
                   <a:schemeClr val="tx2"/>
                 </a:solidFill>
               </a:rPr>
-              <a:t>Metodología de Desarrollo</a:t>
-            </a:r>
-            <a:endParaRPr lang="es-ES" sz="5000" dirty="0">
+              <a:t>METODOLOGÍA DE DESARROLLO</a:t>
+            </a:r>
+            <a:endParaRPr lang="es-ES" sz="5000" b="1" dirty="0">
               <a:solidFill>
                 <a:schemeClr val="tx2"/>
               </a:solidFill>
@@ -7799,17 +8139,17 @@
           <a:p>
             <a:pPr algn="ctr"/>
             <a:r>
-              <a:rPr lang="es-ES" dirty="0" smtClean="0"/>
-              <a:t>Tipo de Proceso</a:t>
+              <a:rPr lang="es-ES" b="1" dirty="0" smtClean="0"/>
+              <a:t>TIPO DE PROCESO</a:t>
             </a:r>
             <a:br>
-              <a:rPr lang="es-ES" dirty="0" smtClean="0"/>
+              <a:rPr lang="es-ES" b="1" dirty="0" smtClean="0"/>
             </a:br>
             <a:r>
-              <a:rPr lang="es-ES" dirty="0" smtClean="0"/>
+              <a:rPr lang="es-ES" b="1" i="1" u="sng" dirty="0" smtClean="0"/>
               <a:t>Espiral</a:t>
             </a:r>
-            <a:endParaRPr lang="es-ES" dirty="0"/>
+            <a:endParaRPr lang="es-ES" b="1" i="1" u="sng" dirty="0"/>
           </a:p>
         </p:txBody>
       </p:sp>
@@ -7834,6 +8174,15 @@
             <a:off x="479523" y="1935163"/>
             <a:ext cx="8184954" cy="4389437"/>
           </a:xfrm>
+          <a:prstGeom prst="rect">
+            <a:avLst/>
+          </a:prstGeom>
+          <a:ln>
+            <a:noFill/>
+          </a:ln>
+          <a:effectLst>
+            <a:softEdge rad="112500"/>
+          </a:effectLst>
         </p:spPr>
       </p:pic>
     </p:spTree>
@@ -7888,30 +8237,22 @@
         </p:nvSpPr>
         <p:spPr>
           <a:xfrm>
-            <a:off x="518864" y="917848"/>
-            <a:ext cx="8229600" cy="1143000"/>
+            <a:off x="0" y="836712"/>
+            <a:ext cx="9144000" cy="566936"/>
           </a:xfrm>
         </p:spPr>
         <p:txBody>
           <a:bodyPr>
-            <a:normAutofit fontScale="90000"/>
+            <a:noAutofit/>
           </a:bodyPr>
           <a:lstStyle/>
           <a:p>
             <a:pPr algn="ctr"/>
             <a:r>
-              <a:rPr lang="es-ES" dirty="0"/>
-              <a:t>Modelado de Requerimiento </a:t>
-            </a:r>
-            <a:r>
-              <a:rPr lang="es-ES" dirty="0"/>
-              <a:t>de </a:t>
-            </a:r>
-            <a:r>
-              <a:rPr lang="es-ES" dirty="0" smtClean="0"/>
-              <a:t>negocio</a:t>
-            </a:r>
-            <a:endParaRPr lang="es-ES" dirty="0"/>
+              <a:rPr lang="es-ES" sz="3600" b="1" dirty="0" smtClean="0"/>
+              <a:t>MODELADO DE REQUERIMIENTO DE NEGOCIO</a:t>
+            </a:r>
+            <a:endParaRPr lang="es-ES" sz="3600" b="1" dirty="0"/>
           </a:p>
         </p:txBody>
       </p:sp>
@@ -7925,7 +8266,12 @@
             <p:ph idx="1"/>
           </p:nvPr>
         </p:nvSpPr>
-        <p:spPr/>
+        <p:spPr>
+          <a:xfrm>
+            <a:off x="467544" y="1772816"/>
+            <a:ext cx="8229600" cy="4389120"/>
+          </a:xfrm>
+        </p:spPr>
         <p:txBody>
           <a:bodyPr>
             <a:normAutofit fontScale="85000" lnSpcReduction="10000"/>
@@ -8009,8 +8355,8 @@
         </p:blipFill>
         <p:spPr bwMode="auto">
           <a:xfrm>
-            <a:off x="1043608" y="1124744"/>
-            <a:ext cx="6768752" cy="4464496"/>
+            <a:off x="0" y="836712"/>
+            <a:ext cx="9144000" cy="5904656"/>
           </a:xfrm>
           <a:prstGeom prst="rect">
             <a:avLst/>

</xml_diff>

<commit_message>
Planteamiento del problema Antes de Objetivos para que empiece a hablar
</commit_message>
<xml_diff>
--- a/Para Presentacion final.pptx
+++ b/Para Presentacion final.pptx
@@ -7,39 +7,40 @@
   <p:sldIdLst>
     <p:sldId id="256" r:id="rId2"/>
     <p:sldId id="257" r:id="rId3"/>
-    <p:sldId id="258" r:id="rId4"/>
-    <p:sldId id="259" r:id="rId5"/>
-    <p:sldId id="260" r:id="rId6"/>
-    <p:sldId id="261" r:id="rId7"/>
-    <p:sldId id="275" r:id="rId8"/>
-    <p:sldId id="262" r:id="rId9"/>
-    <p:sldId id="288" r:id="rId10"/>
-    <p:sldId id="289" r:id="rId11"/>
-    <p:sldId id="290" r:id="rId12"/>
-    <p:sldId id="287" r:id="rId13"/>
-    <p:sldId id="263" r:id="rId14"/>
-    <p:sldId id="276" r:id="rId15"/>
-    <p:sldId id="277" r:id="rId16"/>
-    <p:sldId id="278" r:id="rId17"/>
-    <p:sldId id="279" r:id="rId18"/>
-    <p:sldId id="280" r:id="rId19"/>
-    <p:sldId id="281" r:id="rId20"/>
-    <p:sldId id="282" r:id="rId21"/>
-    <p:sldId id="283" r:id="rId22"/>
-    <p:sldId id="284" r:id="rId23"/>
-    <p:sldId id="285" r:id="rId24"/>
-    <p:sldId id="265" r:id="rId25"/>
-    <p:sldId id="266" r:id="rId26"/>
-    <p:sldId id="267" r:id="rId27"/>
-    <p:sldId id="268" r:id="rId28"/>
-    <p:sldId id="269" r:id="rId29"/>
-    <p:sldId id="270" r:id="rId30"/>
-    <p:sldId id="271" r:id="rId31"/>
-    <p:sldId id="274" r:id="rId32"/>
-    <p:sldId id="272" r:id="rId33"/>
-    <p:sldId id="273" r:id="rId34"/>
-    <p:sldId id="286" r:id="rId35"/>
-    <p:sldId id="291" r:id="rId36"/>
+    <p:sldId id="292" r:id="rId4"/>
+    <p:sldId id="258" r:id="rId5"/>
+    <p:sldId id="259" r:id="rId6"/>
+    <p:sldId id="260" r:id="rId7"/>
+    <p:sldId id="261" r:id="rId8"/>
+    <p:sldId id="275" r:id="rId9"/>
+    <p:sldId id="262" r:id="rId10"/>
+    <p:sldId id="288" r:id="rId11"/>
+    <p:sldId id="289" r:id="rId12"/>
+    <p:sldId id="290" r:id="rId13"/>
+    <p:sldId id="287" r:id="rId14"/>
+    <p:sldId id="263" r:id="rId15"/>
+    <p:sldId id="276" r:id="rId16"/>
+    <p:sldId id="277" r:id="rId17"/>
+    <p:sldId id="278" r:id="rId18"/>
+    <p:sldId id="279" r:id="rId19"/>
+    <p:sldId id="280" r:id="rId20"/>
+    <p:sldId id="281" r:id="rId21"/>
+    <p:sldId id="282" r:id="rId22"/>
+    <p:sldId id="283" r:id="rId23"/>
+    <p:sldId id="284" r:id="rId24"/>
+    <p:sldId id="285" r:id="rId25"/>
+    <p:sldId id="265" r:id="rId26"/>
+    <p:sldId id="266" r:id="rId27"/>
+    <p:sldId id="267" r:id="rId28"/>
+    <p:sldId id="268" r:id="rId29"/>
+    <p:sldId id="269" r:id="rId30"/>
+    <p:sldId id="270" r:id="rId31"/>
+    <p:sldId id="271" r:id="rId32"/>
+    <p:sldId id="274" r:id="rId33"/>
+    <p:sldId id="272" r:id="rId34"/>
+    <p:sldId id="273" r:id="rId35"/>
+    <p:sldId id="286" r:id="rId36"/>
+    <p:sldId id="291" r:id="rId37"/>
   </p:sldIdLst>
   <p:sldSz cx="9144000" cy="6858000" type="screen4x3"/>
   <p:notesSz cx="6858000" cy="9144000"/>
@@ -140,7 +141,7 @@
   </p:defaultTextStyle>
   <p:extLst>
     <p:ext uri="{EFAFB233-063F-42B5-8137-9DF3F51BA10A}">
-      <p15:sldGuideLst xmlns:p15="http://schemas.microsoft.com/office/powerpoint/2012/main" xmlns="">
+      <p15:sldGuideLst xmlns:p15="http://schemas.microsoft.com/office/powerpoint/2012/main">
         <p15:guide id="1" orient="horz" pos="2160">
           <p15:clr>
             <a:srgbClr val="A4A3A4"/>
@@ -330,7 +331,7 @@
           <a:p>
             <a:fld id="{15236BF2-5D97-4A23-B897-87C18D793EA7}" type="datetimeFigureOut">
               <a:rPr lang="es-ES" smtClean="0"/>
-              <a:t>25/08/2016</a:t>
+              <a:t>26/08/2016</a:t>
             </a:fld>
             <a:endParaRPr lang="es-ES"/>
           </a:p>
@@ -495,7 +496,7 @@
           <a:p>
             <a:fld id="{15236BF2-5D97-4A23-B897-87C18D793EA7}" type="datetimeFigureOut">
               <a:rPr lang="es-ES" smtClean="0"/>
-              <a:t>25/08/2016</a:t>
+              <a:t>26/08/2016</a:t>
             </a:fld>
             <a:endParaRPr lang="es-ES"/>
           </a:p>
@@ -670,7 +671,7 @@
           <a:p>
             <a:fld id="{15236BF2-5D97-4A23-B897-87C18D793EA7}" type="datetimeFigureOut">
               <a:rPr lang="es-ES" smtClean="0"/>
-              <a:t>25/08/2016</a:t>
+              <a:t>26/08/2016</a:t>
             </a:fld>
             <a:endParaRPr lang="es-ES"/>
           </a:p>
@@ -835,7 +836,7 @@
           <a:p>
             <a:fld id="{15236BF2-5D97-4A23-B897-87C18D793EA7}" type="datetimeFigureOut">
               <a:rPr lang="es-ES" smtClean="0"/>
-              <a:t>25/08/2016</a:t>
+              <a:t>26/08/2016</a:t>
             </a:fld>
             <a:endParaRPr lang="es-ES"/>
           </a:p>
@@ -1077,7 +1078,7 @@
           <a:p>
             <a:fld id="{15236BF2-5D97-4A23-B897-87C18D793EA7}" type="datetimeFigureOut">
               <a:rPr lang="es-ES" smtClean="0"/>
-              <a:t>25/08/2016</a:t>
+              <a:t>26/08/2016</a:t>
             </a:fld>
             <a:endParaRPr lang="es-ES"/>
           </a:p>
@@ -1341,7 +1342,7 @@
           <a:p>
             <a:fld id="{15236BF2-5D97-4A23-B897-87C18D793EA7}" type="datetimeFigureOut">
               <a:rPr lang="es-ES" smtClean="0"/>
-              <a:t>25/08/2016</a:t>
+              <a:t>26/08/2016</a:t>
             </a:fld>
             <a:endParaRPr lang="es-ES"/>
           </a:p>
@@ -1719,7 +1720,7 @@
           <a:p>
             <a:fld id="{15236BF2-5D97-4A23-B897-87C18D793EA7}" type="datetimeFigureOut">
               <a:rPr lang="es-ES" smtClean="0"/>
-              <a:t>25/08/2016</a:t>
+              <a:t>26/08/2016</a:t>
             </a:fld>
             <a:endParaRPr lang="es-ES"/>
           </a:p>
@@ -1869,7 +1870,7 @@
           <a:p>
             <a:fld id="{15236BF2-5D97-4A23-B897-87C18D793EA7}" type="datetimeFigureOut">
               <a:rPr lang="es-ES" smtClean="0"/>
-              <a:t>25/08/2016</a:t>
+              <a:t>26/08/2016</a:t>
             </a:fld>
             <a:endParaRPr lang="es-ES"/>
           </a:p>
@@ -1959,7 +1960,7 @@
           <a:p>
             <a:fld id="{15236BF2-5D97-4A23-B897-87C18D793EA7}" type="datetimeFigureOut">
               <a:rPr lang="es-ES" smtClean="0"/>
-              <a:t>25/08/2016</a:t>
+              <a:t>26/08/2016</a:t>
             </a:fld>
             <a:endParaRPr lang="es-ES"/>
           </a:p>
@@ -2220,7 +2221,7 @@
           <a:p>
             <a:fld id="{15236BF2-5D97-4A23-B897-87C18D793EA7}" type="datetimeFigureOut">
               <a:rPr lang="es-ES" smtClean="0"/>
-              <a:t>25/08/2016</a:t>
+              <a:t>26/08/2016</a:t>
             </a:fld>
             <a:endParaRPr lang="es-ES"/>
           </a:p>
@@ -2508,7 +2509,7 @@
           <a:p>
             <a:fld id="{15236BF2-5D97-4A23-B897-87C18D793EA7}" type="datetimeFigureOut">
               <a:rPr lang="es-ES" smtClean="0"/>
-              <a:t>25/08/2016</a:t>
+              <a:t>26/08/2016</a:t>
             </a:fld>
             <a:endParaRPr lang="es-ES"/>
           </a:p>
@@ -3279,7 +3280,7 @@
           <a:p>
             <a:fld id="{15236BF2-5D97-4A23-B897-87C18D793EA7}" type="datetimeFigureOut">
               <a:rPr lang="es-ES" smtClean="0"/>
-              <a:t>25/08/2016</a:t>
+              <a:t>26/08/2016</a:t>
             </a:fld>
             <a:endParaRPr lang="es-ES"/>
           </a:p>
@@ -4551,106 +4552,49 @@
           <a:chExt cx="0" cy="0"/>
         </a:xfrm>
       </p:grpSpPr>
-      <p:sp>
-        <p:nvSpPr>
-          <p:cNvPr id="3" name="2 Marcador de contenido"/>
-          <p:cNvSpPr>
-            <a:spLocks noGrp="1"/>
-          </p:cNvSpPr>
+      <p:pic>
+        <p:nvPicPr>
+          <p:cNvPr id="4" name="0 Imagen"/>
+          <p:cNvPicPr>
+            <a:picLocks noGrp="1"/>
+          </p:cNvPicPr>
           <p:nvPr>
             <p:ph idx="1"/>
           </p:nvPr>
-        </p:nvSpPr>
-        <p:spPr>
+        </p:nvPicPr>
+        <p:blipFill rotWithShape="1">
+          <a:blip r:embed="rId2">
+            <a:extLst>
+              <a:ext uri="{28A0092B-C50C-407E-A947-70E740481C1C}">
+                <a14:useLocalDpi xmlns:a14="http://schemas.microsoft.com/office/drawing/2010/main" val="0"/>
+              </a:ext>
+            </a:extLst>
+          </a:blip>
+          <a:srcRect r="2149" b="44641"/>
+          <a:stretch/>
+        </p:blipFill>
+        <p:spPr bwMode="auto">
           <a:xfrm>
-            <a:off x="467544" y="1340768"/>
-            <a:ext cx="8229600" cy="4389120"/>
-          </a:xfrm>
-        </p:spPr>
-        <p:txBody>
-          <a:bodyPr>
-            <a:normAutofit fontScale="70000" lnSpcReduction="20000"/>
-          </a:bodyPr>
-          <a:lstStyle/>
-          <a:p>
-            <a:pPr marL="0" indent="0" algn="ctr">
-              <a:buNone/>
-            </a:pPr>
-            <a:r>
-              <a:rPr lang="es-ES" dirty="0" smtClean="0"/>
-              <a:t>El </a:t>
-            </a:r>
-            <a:r>
-              <a:rPr lang="es-ES" dirty="0"/>
-              <a:t>cliente desde su navegador ingresa a la aplicación “</a:t>
-            </a:r>
-            <a:r>
-              <a:rPr lang="es-ES" dirty="0" err="1"/>
-              <a:t>DeliverYApp</a:t>
-            </a:r>
-            <a:r>
-              <a:rPr lang="es-ES" dirty="0"/>
-              <a:t>”, primeramente se debe registrar (</a:t>
-            </a:r>
-            <a:r>
-              <a:rPr lang="es-ES" dirty="0" err="1"/>
-              <a:t>Loguearse</a:t>
-            </a:r>
-            <a:r>
-              <a:rPr lang="es-ES" dirty="0"/>
-              <a:t>) con los datos requeridos por el sistema, luego de eso podrá ver un mensaje de bienvenida y una lista de restaurantes en el cual tendrá la opción de elegir uno de ellos, una vez seleccionado el restaurante se desplegará una interfaz con las opciones del menú donde el cliente por medio de imágenes con sus respectivas descripciones optara por su plato de preferencia. Realizado esto aparecerán los datos personales con la lista de pedido que ha hecho el cliente con sus respectivos precios y el monto total a abonar. Si el cliente está de acuerdo, presiona el botón para confirmar su pedido y se  mostrará un mensaje de envío correcto. Luego, la recepcionista recibe el pedido y lo verifica (si los datos son coherentes y correctos), en caso de que no se cumplan los requisitos el sistema notificara al cliente que su pedido fue rechazado y que  lo intente nuevamente, al confirmar que el pedido cumple los requisitos, se notificará al cliente que su pedido fue aceptado, este ingresara a la cocina con estado pendiente, culminado el menú solicitado, pasa al cajero  y cambia el estado a enviado imprimiendo un ticket con los datos del cliente necesarios para el envío, al retornar el repartidor rinde cuenta de los pedidos entregados el cajero ingresa el pago actualizando el estado ha cobrado. </a:t>
-            </a:r>
-          </a:p>
-          <a:p>
-            <a:pPr marL="0" indent="0">
-              <a:buNone/>
-            </a:pPr>
-            <a:endParaRPr lang="es-ES" dirty="0"/>
-          </a:p>
-        </p:txBody>
-      </p:sp>
-      <p:sp>
-        <p:nvSpPr>
-          <p:cNvPr id="4" name="1 Título"/>
-          <p:cNvSpPr>
-            <a:spLocks noGrp="1"/>
-          </p:cNvSpPr>
-          <p:nvPr>
-            <p:ph type="title"/>
-          </p:nvPr>
-        </p:nvSpPr>
-        <p:spPr>
-          <a:xfrm>
-            <a:off x="539552" y="1196752"/>
-            <a:ext cx="8229600" cy="648072"/>
-          </a:xfrm>
-        </p:spPr>
-        <p:txBody>
-          <a:bodyPr>
-            <a:normAutofit fontScale="90000"/>
-          </a:bodyPr>
-          <a:lstStyle/>
-          <a:p>
-            <a:pPr algn="ctr"/>
-            <a:r>
-              <a:rPr lang="es-ES" sz="3200" b="1" dirty="0" smtClean="0"/>
-              <a:t>MODELADO DE REQUERIMIENTO DEL SISTEMA</a:t>
-            </a:r>
-            <a:r>
-              <a:rPr lang="es-ES" b="1" dirty="0"/>
-              <a:t/>
-            </a:r>
-            <a:br>
-              <a:rPr lang="es-ES" b="1" dirty="0"/>
-            </a:br>
-            <a:endParaRPr lang="es-ES" dirty="0"/>
-          </a:p>
-        </p:txBody>
-      </p:sp>
+            <a:off x="0" y="836712"/>
+            <a:ext cx="9144000" cy="5904656"/>
+          </a:xfrm>
+          <a:prstGeom prst="rect">
+            <a:avLst/>
+          </a:prstGeom>
+          <a:ln>
+            <a:noFill/>
+          </a:ln>
+          <a:extLst>
+            <a:ext uri="{53640926-AAD7-44D8-BBD7-CCE9431645EC}">
+              <a14:shadowObscured xmlns:a14="http://schemas.microsoft.com/office/drawing/2010/main"/>
+            </a:ext>
+          </a:extLst>
+        </p:spPr>
+      </p:pic>
     </p:spTree>
     <p:extLst>
       <p:ext uri="{BB962C8B-B14F-4D97-AF65-F5344CB8AC3E}">
-        <p14:creationId xmlns:p14="http://schemas.microsoft.com/office/powerpoint/2010/main" val="126946295"/>
+        <p14:creationId xmlns:p14="http://schemas.microsoft.com/office/powerpoint/2010/main" val="1027070222"/>
       </p:ext>
     </p:extLst>
   </p:cSld>
@@ -4687,50 +4631,106 @@
           <a:chExt cx="0" cy="0"/>
         </a:xfrm>
       </p:grpSpPr>
-      <p:pic>
-        <p:nvPicPr>
-          <p:cNvPr id="4" name="3 Marcador de contenido" descr="C:\Users\Usuario\Documents\Facu2016\Ing. de Software\Diagramas\CU_Sistema.png"/>
-          <p:cNvPicPr>
-            <a:picLocks noGrp="1"/>
-          </p:cNvPicPr>
+      <p:sp>
+        <p:nvSpPr>
+          <p:cNvPr id="3" name="2 Marcador de contenido"/>
+          <p:cNvSpPr>
+            <a:spLocks noGrp="1"/>
+          </p:cNvSpPr>
           <p:nvPr>
             <p:ph idx="1"/>
           </p:nvPr>
-        </p:nvPicPr>
-        <p:blipFill rotWithShape="1">
-          <a:blip r:embed="rId2">
-            <a:extLst>
-              <a:ext uri="{28A0092B-C50C-407E-A947-70E740481C1C}">
-                <a14:useLocalDpi xmlns:a14="http://schemas.microsoft.com/office/drawing/2010/main" val="0"/>
-              </a:ext>
-            </a:extLst>
-          </a:blip>
-          <a:srcRect b="20413"/>
-          <a:stretch/>
-        </p:blipFill>
-        <p:spPr bwMode="auto">
+        </p:nvSpPr>
+        <p:spPr>
           <a:xfrm>
-            <a:off x="323528" y="737320"/>
-            <a:ext cx="8640960" cy="6120680"/>
-          </a:xfrm>
-          <a:prstGeom prst="rect">
-            <a:avLst/>
-          </a:prstGeom>
-          <a:noFill/>
-          <a:ln>
-            <a:noFill/>
-          </a:ln>
-          <a:extLst>
-            <a:ext uri="{53640926-AAD7-44D8-BBD7-CCE9431645EC}">
-              <a14:shadowObscured xmlns:a14="http://schemas.microsoft.com/office/drawing/2010/main"/>
-            </a:ext>
-          </a:extLst>
-        </p:spPr>
-      </p:pic>
+            <a:off x="467544" y="1340768"/>
+            <a:ext cx="8229600" cy="4389120"/>
+          </a:xfrm>
+        </p:spPr>
+        <p:txBody>
+          <a:bodyPr>
+            <a:normAutofit fontScale="70000" lnSpcReduction="20000"/>
+          </a:bodyPr>
+          <a:lstStyle/>
+          <a:p>
+            <a:pPr marL="0" indent="0" algn="ctr">
+              <a:buNone/>
+            </a:pPr>
+            <a:r>
+              <a:rPr lang="es-ES" dirty="0" smtClean="0"/>
+              <a:t>El </a:t>
+            </a:r>
+            <a:r>
+              <a:rPr lang="es-ES" dirty="0"/>
+              <a:t>cliente desde su navegador ingresa a la aplicación “</a:t>
+            </a:r>
+            <a:r>
+              <a:rPr lang="es-ES" dirty="0" err="1"/>
+              <a:t>DeliverYApp</a:t>
+            </a:r>
+            <a:r>
+              <a:rPr lang="es-ES" dirty="0"/>
+              <a:t>”, primeramente se debe registrar (</a:t>
+            </a:r>
+            <a:r>
+              <a:rPr lang="es-ES" dirty="0" err="1"/>
+              <a:t>Loguearse</a:t>
+            </a:r>
+            <a:r>
+              <a:rPr lang="es-ES" dirty="0"/>
+              <a:t>) con los datos requeridos por el sistema, luego de eso podrá ver un mensaje de bienvenida y una lista de restaurantes en el cual tendrá la opción de elegir uno de ellos, una vez seleccionado el restaurante se desplegará una interfaz con las opciones del menú donde el cliente por medio de imágenes con sus respectivas descripciones optara por su plato de preferencia. Realizado esto aparecerán los datos personales con la lista de pedido que ha hecho el cliente con sus respectivos precios y el monto total a abonar. Si el cliente está de acuerdo, presiona el botón para confirmar su pedido y se  mostrará un mensaje de envío correcto. Luego, la recepcionista recibe el pedido y lo verifica (si los datos son coherentes y correctos), en caso de que no se cumplan los requisitos el sistema notificara al cliente que su pedido fue rechazado y que  lo intente nuevamente, al confirmar que el pedido cumple los requisitos, se notificará al cliente que su pedido fue aceptado, este ingresara a la cocina con estado pendiente, culminado el menú solicitado, pasa al cajero  y cambia el estado a enviado imprimiendo un ticket con los datos del cliente necesarios para el envío, al retornar el repartidor rinde cuenta de los pedidos entregados el cajero ingresa el pago actualizando el estado ha cobrado. </a:t>
+            </a:r>
+          </a:p>
+          <a:p>
+            <a:pPr marL="0" indent="0">
+              <a:buNone/>
+            </a:pPr>
+            <a:endParaRPr lang="es-ES" dirty="0"/>
+          </a:p>
+        </p:txBody>
+      </p:sp>
+      <p:sp>
+        <p:nvSpPr>
+          <p:cNvPr id="4" name="1 Título"/>
+          <p:cNvSpPr>
+            <a:spLocks noGrp="1"/>
+          </p:cNvSpPr>
+          <p:nvPr>
+            <p:ph type="title"/>
+          </p:nvPr>
+        </p:nvSpPr>
+        <p:spPr>
+          <a:xfrm>
+            <a:off x="539552" y="1196752"/>
+            <a:ext cx="8229600" cy="648072"/>
+          </a:xfrm>
+        </p:spPr>
+        <p:txBody>
+          <a:bodyPr>
+            <a:normAutofit fontScale="90000"/>
+          </a:bodyPr>
+          <a:lstStyle/>
+          <a:p>
+            <a:pPr algn="ctr"/>
+            <a:r>
+              <a:rPr lang="es-ES" sz="3200" b="1" dirty="0" smtClean="0"/>
+              <a:t>MODELADO DE REQUERIMIENTO DEL SISTEMA</a:t>
+            </a:r>
+            <a:r>
+              <a:rPr lang="es-ES" b="1" dirty="0"/>
+              <a:t/>
+            </a:r>
+            <a:br>
+              <a:rPr lang="es-ES" b="1" dirty="0"/>
+            </a:br>
+            <a:endParaRPr lang="es-ES" dirty="0"/>
+          </a:p>
+        </p:txBody>
+      </p:sp>
     </p:spTree>
     <p:extLst>
       <p:ext uri="{BB962C8B-B14F-4D97-AF65-F5344CB8AC3E}">
-        <p14:creationId xmlns:p14="http://schemas.microsoft.com/office/powerpoint/2010/main" val="3656664426"/>
+        <p14:creationId xmlns:p14="http://schemas.microsoft.com/office/powerpoint/2010/main" val="126946295"/>
       </p:ext>
     </p:extLst>
   </p:cSld>
@@ -4767,39 +4767,50 @@
           <a:chExt cx="0" cy="0"/>
         </a:xfrm>
       </p:grpSpPr>
-      <p:sp>
-        <p:nvSpPr>
-          <p:cNvPr id="2" name="1 Título"/>
-          <p:cNvSpPr>
-            <a:spLocks noGrp="1"/>
-          </p:cNvSpPr>
-          <p:nvPr>
-            <p:ph type="title"/>
-          </p:nvPr>
-        </p:nvSpPr>
-        <p:spPr>
+      <p:pic>
+        <p:nvPicPr>
+          <p:cNvPr id="4" name="3 Marcador de contenido" descr="C:\Users\Usuario\Documents\Facu2016\Ing. de Software\Diagramas\CU_Sistema.png"/>
+          <p:cNvPicPr>
+            <a:picLocks noGrp="1"/>
+          </p:cNvPicPr>
+          <p:nvPr>
+            <p:ph idx="1"/>
+          </p:nvPr>
+        </p:nvPicPr>
+        <p:blipFill rotWithShape="1">
+          <a:blip r:embed="rId2">
+            <a:extLst>
+              <a:ext uri="{28A0092B-C50C-407E-A947-70E740481C1C}">
+                <a14:useLocalDpi xmlns:a14="http://schemas.microsoft.com/office/drawing/2010/main" val="0"/>
+              </a:ext>
+            </a:extLst>
+          </a:blip>
+          <a:srcRect b="20413"/>
+          <a:stretch/>
+        </p:blipFill>
+        <p:spPr bwMode="auto">
           <a:xfrm>
-            <a:off x="395536" y="2564904"/>
-            <a:ext cx="8229600" cy="1143000"/>
-          </a:xfrm>
-        </p:spPr>
-        <p:txBody>
-          <a:bodyPr/>
-          <a:lstStyle/>
-          <a:p>
-            <a:pPr algn="ctr"/>
-            <a:r>
-              <a:rPr lang="es-ES" b="1" dirty="0" smtClean="0"/>
-              <a:t>PROTOTIPOS</a:t>
-            </a:r>
-            <a:endParaRPr lang="es-ES" b="1" dirty="0"/>
-          </a:p>
-        </p:txBody>
-      </p:sp>
+            <a:off x="323528" y="737320"/>
+            <a:ext cx="8640960" cy="6120680"/>
+          </a:xfrm>
+          <a:prstGeom prst="rect">
+            <a:avLst/>
+          </a:prstGeom>
+          <a:noFill/>
+          <a:ln>
+            <a:noFill/>
+          </a:ln>
+          <a:extLst>
+            <a:ext uri="{53640926-AAD7-44D8-BBD7-CCE9431645EC}">
+              <a14:shadowObscured xmlns:a14="http://schemas.microsoft.com/office/drawing/2010/main"/>
+            </a:ext>
+          </a:extLst>
+        </p:spPr>
+      </p:pic>
     </p:spTree>
     <p:extLst>
       <p:ext uri="{BB962C8B-B14F-4D97-AF65-F5344CB8AC3E}">
-        <p14:creationId xmlns:p14="http://schemas.microsoft.com/office/powerpoint/2010/main" val="3701943948"/>
+        <p14:creationId xmlns:p14="http://schemas.microsoft.com/office/powerpoint/2010/main" val="3656664426"/>
       </p:ext>
     </p:extLst>
   </p:cSld>
@@ -4836,47 +4847,39 @@
           <a:chExt cx="0" cy="0"/>
         </a:xfrm>
       </p:grpSpPr>
-      <p:pic>
-        <p:nvPicPr>
-          <p:cNvPr id="4" name="3 Marcador de contenido" descr="C:\proyectoDeliberyApp\Propotipos de vistas\Login Admin.png"/>
-          <p:cNvPicPr>
-            <a:picLocks noGrp="1"/>
-          </p:cNvPicPr>
-          <p:nvPr>
-            <p:ph idx="1"/>
-          </p:nvPr>
-        </p:nvPicPr>
-        <p:blipFill>
-          <a:blip r:embed="rId2">
-            <a:extLst>
-              <a:ext uri="{28A0092B-C50C-407E-A947-70E740481C1C}">
-                <a14:useLocalDpi xmlns:a14="http://schemas.microsoft.com/office/drawing/2010/main" val="0"/>
-              </a:ext>
-            </a:extLst>
-          </a:blip>
-          <a:srcRect/>
-          <a:stretch>
-            <a:fillRect/>
-          </a:stretch>
-        </p:blipFill>
-        <p:spPr bwMode="auto">
+      <p:sp>
+        <p:nvSpPr>
+          <p:cNvPr id="2" name="1 Título"/>
+          <p:cNvSpPr>
+            <a:spLocks noGrp="1"/>
+          </p:cNvSpPr>
+          <p:nvPr>
+            <p:ph type="title"/>
+          </p:nvPr>
+        </p:nvSpPr>
+        <p:spPr>
           <a:xfrm>
-            <a:off x="1403648" y="1340768"/>
-            <a:ext cx="6381750" cy="4048125"/>
-          </a:xfrm>
-          <a:prstGeom prst="rect">
-            <a:avLst/>
-          </a:prstGeom>
-          <a:noFill/>
-          <a:ln>
-            <a:noFill/>
-          </a:ln>
-        </p:spPr>
-      </p:pic>
+            <a:off x="395536" y="2564904"/>
+            <a:ext cx="8229600" cy="1143000"/>
+          </a:xfrm>
+        </p:spPr>
+        <p:txBody>
+          <a:bodyPr/>
+          <a:lstStyle/>
+          <a:p>
+            <a:pPr algn="ctr"/>
+            <a:r>
+              <a:rPr lang="es-ES" b="1" dirty="0" smtClean="0"/>
+              <a:t>PROTOTIPOS</a:t>
+            </a:r>
+            <a:endParaRPr lang="es-ES" b="1" dirty="0"/>
+          </a:p>
+        </p:txBody>
+      </p:sp>
     </p:spTree>
     <p:extLst>
       <p:ext uri="{BB962C8B-B14F-4D97-AF65-F5344CB8AC3E}">
-        <p14:creationId xmlns:p14="http://schemas.microsoft.com/office/powerpoint/2010/main" val="470114740"/>
+        <p14:creationId xmlns:p14="http://schemas.microsoft.com/office/powerpoint/2010/main" val="3701943948"/>
       </p:ext>
     </p:extLst>
   </p:cSld>
@@ -4915,7 +4918,7 @@
       </p:grpSpPr>
       <p:pic>
         <p:nvPicPr>
-          <p:cNvPr id="4" name="3 Marcador de contenido" descr="C:\proyectoDeliberyApp\Propotipos de vistas\Panel de control.png"/>
+          <p:cNvPr id="4" name="3 Marcador de contenido" descr="C:\proyectoDeliberyApp\Propotipos de vistas\Login Admin.png"/>
           <p:cNvPicPr>
             <a:picLocks noGrp="1"/>
           </p:cNvPicPr>
@@ -4938,8 +4941,8 @@
         </p:blipFill>
         <p:spPr bwMode="auto">
           <a:xfrm>
-            <a:off x="1187624" y="1124744"/>
-            <a:ext cx="6984776" cy="4536504"/>
+            <a:off x="1403648" y="1340768"/>
+            <a:ext cx="6381750" cy="4048125"/>
           </a:xfrm>
           <a:prstGeom prst="rect">
             <a:avLst/>
@@ -4953,7 +4956,7 @@
     </p:spTree>
     <p:extLst>
       <p:ext uri="{BB962C8B-B14F-4D97-AF65-F5344CB8AC3E}">
-        <p14:creationId xmlns:p14="http://schemas.microsoft.com/office/powerpoint/2010/main" val="374828817"/>
+        <p14:creationId xmlns:p14="http://schemas.microsoft.com/office/powerpoint/2010/main" val="470114740"/>
       </p:ext>
     </p:extLst>
   </p:cSld>
@@ -4992,7 +4995,7 @@
       </p:grpSpPr>
       <p:pic>
         <p:nvPicPr>
-          <p:cNvPr id="4" name="3 Marcador de contenido" descr="C:\proyectoDeliberyApp\Propotipos de vistas\New Mockup 1.png"/>
+          <p:cNvPr id="4" name="3 Marcador de contenido" descr="C:\proyectoDeliberyApp\Propotipos de vistas\Panel de control.png"/>
           <p:cNvPicPr>
             <a:picLocks noGrp="1"/>
           </p:cNvPicPr>
@@ -5015,8 +5018,8 @@
         </p:blipFill>
         <p:spPr bwMode="auto">
           <a:xfrm>
-            <a:off x="1187624" y="1196752"/>
-            <a:ext cx="6912768" cy="4752528"/>
+            <a:off x="1187624" y="1124744"/>
+            <a:ext cx="6984776" cy="4536504"/>
           </a:xfrm>
           <a:prstGeom prst="rect">
             <a:avLst/>
@@ -5030,7 +5033,7 @@
     </p:spTree>
     <p:extLst>
       <p:ext uri="{BB962C8B-B14F-4D97-AF65-F5344CB8AC3E}">
-        <p14:creationId xmlns:p14="http://schemas.microsoft.com/office/powerpoint/2010/main" val="731604007"/>
+        <p14:creationId xmlns:p14="http://schemas.microsoft.com/office/powerpoint/2010/main" val="374828817"/>
       </p:ext>
     </p:extLst>
   </p:cSld>
@@ -5069,7 +5072,7 @@
       </p:grpSpPr>
       <p:pic>
         <p:nvPicPr>
-          <p:cNvPr id="4" name="3 Marcador de contenido" descr="C:\proyectoDeliberyApp\Propotipos de vistas\Bienvenida.png"/>
+          <p:cNvPr id="4" name="3 Marcador de contenido" descr="C:\proyectoDeliberyApp\Propotipos de vistas\New Mockup 1.png"/>
           <p:cNvPicPr>
             <a:picLocks noGrp="1"/>
           </p:cNvPicPr>
@@ -5092,8 +5095,8 @@
         </p:blipFill>
         <p:spPr bwMode="auto">
           <a:xfrm>
-            <a:off x="971600" y="1196752"/>
-            <a:ext cx="7128792" cy="4824536"/>
+            <a:off x="1187624" y="1196752"/>
+            <a:ext cx="6912768" cy="4752528"/>
           </a:xfrm>
           <a:prstGeom prst="rect">
             <a:avLst/>
@@ -5107,7 +5110,7 @@
     </p:spTree>
     <p:extLst>
       <p:ext uri="{BB962C8B-B14F-4D97-AF65-F5344CB8AC3E}">
-        <p14:creationId xmlns:p14="http://schemas.microsoft.com/office/powerpoint/2010/main" val="1447868382"/>
+        <p14:creationId xmlns:p14="http://schemas.microsoft.com/office/powerpoint/2010/main" val="731604007"/>
       </p:ext>
     </p:extLst>
   </p:cSld>
@@ -5146,7 +5149,7 @@
       </p:grpSpPr>
       <p:pic>
         <p:nvPicPr>
-          <p:cNvPr id="4" name="3 Marcador de contenido" descr="C:\proyectoDeliberyApp\Propotipos de vistas\Registro Cliente.png"/>
+          <p:cNvPr id="4" name="3 Marcador de contenido" descr="C:\proyectoDeliberyApp\Propotipos de vistas\Bienvenida.png"/>
           <p:cNvPicPr>
             <a:picLocks noGrp="1"/>
           </p:cNvPicPr>
@@ -5169,8 +5172,8 @@
         </p:blipFill>
         <p:spPr bwMode="auto">
           <a:xfrm>
-            <a:off x="971600" y="1124744"/>
-            <a:ext cx="7416824" cy="4824536"/>
+            <a:off x="971600" y="1196752"/>
+            <a:ext cx="7128792" cy="4824536"/>
           </a:xfrm>
           <a:prstGeom prst="rect">
             <a:avLst/>
@@ -5184,7 +5187,7 @@
     </p:spTree>
     <p:extLst>
       <p:ext uri="{BB962C8B-B14F-4D97-AF65-F5344CB8AC3E}">
-        <p14:creationId xmlns:p14="http://schemas.microsoft.com/office/powerpoint/2010/main" val="1252314896"/>
+        <p14:creationId xmlns:p14="http://schemas.microsoft.com/office/powerpoint/2010/main" val="1447868382"/>
       </p:ext>
     </p:extLst>
   </p:cSld>
@@ -5223,7 +5226,7 @@
       </p:grpSpPr>
       <p:pic>
         <p:nvPicPr>
-          <p:cNvPr id="4" name="3 Marcador de contenido" descr="C:\proyectoDeliberyApp\Propotipos de vistas\Selecion de Restautantes (Alternate 856m).png"/>
+          <p:cNvPr id="4" name="3 Marcador de contenido" descr="C:\proyectoDeliberyApp\Propotipos de vistas\Registro Cliente.png"/>
           <p:cNvPicPr>
             <a:picLocks noGrp="1"/>
           </p:cNvPicPr>
@@ -5246,8 +5249,8 @@
         </p:blipFill>
         <p:spPr bwMode="auto">
           <a:xfrm>
-            <a:off x="755576" y="1052736"/>
-            <a:ext cx="7488832" cy="5112568"/>
+            <a:off x="971600" y="1124744"/>
+            <a:ext cx="7416824" cy="4824536"/>
           </a:xfrm>
           <a:prstGeom prst="rect">
             <a:avLst/>
@@ -5261,7 +5264,7 @@
     </p:spTree>
     <p:extLst>
       <p:ext uri="{BB962C8B-B14F-4D97-AF65-F5344CB8AC3E}">
-        <p14:creationId xmlns:p14="http://schemas.microsoft.com/office/powerpoint/2010/main" val="2849871865"/>
+        <p14:creationId xmlns:p14="http://schemas.microsoft.com/office/powerpoint/2010/main" val="1252314896"/>
       </p:ext>
     </p:extLst>
   </p:cSld>
@@ -5300,7 +5303,7 @@
       </p:grpSpPr>
       <p:pic>
         <p:nvPicPr>
-          <p:cNvPr id="4" name="3 Marcador de contenido" descr="C:\proyectoDeliberyApp\Propotipos de vistas\Seleccion de menu.png"/>
+          <p:cNvPr id="4" name="3 Marcador de contenido" descr="C:\proyectoDeliberyApp\Propotipos de vistas\Selecion de Restautantes (Alternate 856m).png"/>
           <p:cNvPicPr>
             <a:picLocks noGrp="1"/>
           </p:cNvPicPr>
@@ -5323,8 +5326,8 @@
         </p:blipFill>
         <p:spPr bwMode="auto">
           <a:xfrm>
-            <a:off x="899592" y="980728"/>
-            <a:ext cx="7560840" cy="4752528"/>
+            <a:off x="755576" y="1052736"/>
+            <a:ext cx="7488832" cy="5112568"/>
           </a:xfrm>
           <a:prstGeom prst="rect">
             <a:avLst/>
@@ -5338,7 +5341,7 @@
     </p:spTree>
     <p:extLst>
       <p:ext uri="{BB962C8B-B14F-4D97-AF65-F5344CB8AC3E}">
-        <p14:creationId xmlns:p14="http://schemas.microsoft.com/office/powerpoint/2010/main" val="2398759630"/>
+        <p14:creationId xmlns:p14="http://schemas.microsoft.com/office/powerpoint/2010/main" val="2849871865"/>
       </p:ext>
     </p:extLst>
   </p:cSld>
@@ -5387,37 +5390,8 @@
         </p:nvSpPr>
         <p:spPr>
           <a:xfrm>
-            <a:off x="251520" y="188640"/>
+            <a:off x="467544" y="2348880"/>
             <a:ext cx="8229600" cy="1143000"/>
-          </a:xfrm>
-        </p:spPr>
-        <p:txBody>
-          <a:bodyPr/>
-          <a:lstStyle/>
-          <a:p>
-            <a:pPr algn="ctr"/>
-            <a:r>
-              <a:rPr lang="es-ES" b="1" dirty="0" smtClean="0"/>
-              <a:t>OBJETIVOS</a:t>
-            </a:r>
-            <a:endParaRPr lang="es-ES" b="1" dirty="0"/>
-          </a:p>
-        </p:txBody>
-      </p:sp>
-      <p:sp>
-        <p:nvSpPr>
-          <p:cNvPr id="3" name="2 Marcador de contenido"/>
-          <p:cNvSpPr>
-            <a:spLocks noGrp="1"/>
-          </p:cNvSpPr>
-          <p:nvPr>
-            <p:ph idx="1"/>
-          </p:nvPr>
-        </p:nvSpPr>
-        <p:spPr>
-          <a:xfrm>
-            <a:off x="467544" y="1628800"/>
-            <a:ext cx="8229600" cy="4389120"/>
           </a:xfrm>
         </p:spPr>
         <p:txBody>
@@ -5426,79 +5400,20 @@
           </a:bodyPr>
           <a:lstStyle/>
           <a:p>
-            <a:r>
-              <a:rPr lang="es-ES" dirty="0"/>
-              <a:t>M</a:t>
-            </a:r>
-            <a:r>
-              <a:rPr lang="es-ES" dirty="0" smtClean="0"/>
-              <a:t>inimizar </a:t>
-            </a:r>
-            <a:r>
-              <a:rPr lang="es-ES" dirty="0"/>
-              <a:t>los problemas referentes a la gestión de pedidos de parte del </a:t>
-            </a:r>
-            <a:r>
-              <a:rPr lang="es-ES" dirty="0" smtClean="0"/>
-              <a:t>cliente.</a:t>
-            </a:r>
-          </a:p>
-          <a:p>
-            <a:r>
-              <a:rPr lang="es-ES" dirty="0"/>
-              <a:t>O</a:t>
-            </a:r>
-            <a:r>
-              <a:rPr lang="es-ES" dirty="0" smtClean="0"/>
-              <a:t>ptimizar </a:t>
-            </a:r>
-            <a:r>
-              <a:rPr lang="es-ES" dirty="0"/>
-              <a:t>la gestión de ventas del restaurante. </a:t>
-            </a:r>
-            <a:endParaRPr lang="es-ES" dirty="0" smtClean="0"/>
-          </a:p>
-          <a:p>
-            <a:r>
-              <a:rPr lang="es-ES" dirty="0"/>
-              <a:t>El beneficio con que cuenta el sistema es el de agilizar los pedidos de tal forma que no se pierda tiempo con las llamadas. </a:t>
-            </a:r>
-          </a:p>
-          <a:p>
-            <a:r>
-              <a:rPr lang="es-ES" dirty="0"/>
-              <a:t>La meta </a:t>
-            </a:r>
-            <a:r>
-              <a:rPr lang="es-ES" dirty="0" smtClean="0"/>
-              <a:t>es </a:t>
-            </a:r>
-            <a:r>
-              <a:rPr lang="es-ES" dirty="0"/>
-              <a:t>mejorar el servicio de </a:t>
-            </a:r>
-            <a:r>
-              <a:rPr lang="es-ES" dirty="0" err="1"/>
-              <a:t>delivery</a:t>
-            </a:r>
-            <a:r>
-              <a:rPr lang="es-ES" dirty="0"/>
-              <a:t> </a:t>
-            </a:r>
-            <a:r>
-              <a:rPr lang="es-ES" dirty="0" smtClean="0"/>
-              <a:t> y </a:t>
-            </a:r>
-            <a:r>
-              <a:rPr lang="es-ES" dirty="0"/>
-              <a:t>aumentar las ventas.</a:t>
-            </a:r>
-          </a:p>
-          <a:p>
-            <a:endParaRPr lang="es-ES" dirty="0"/>
-          </a:p>
-          <a:p>
-            <a:endParaRPr lang="es-ES" dirty="0"/>
+            <a:pPr algn="ctr"/>
+            <a:r>
+              <a:rPr lang="es-419" b="1" dirty="0" smtClean="0"/>
+              <a:t>Planteamiento</a:t>
+            </a:r>
+            <a:r>
+              <a:rPr lang="en-US" b="1" dirty="0" smtClean="0"/>
+              <a:t> del </a:t>
+            </a:r>
+            <a:r>
+              <a:rPr lang="es-419" b="1" dirty="0" smtClean="0"/>
+              <a:t>Problema</a:t>
+            </a:r>
+            <a:endParaRPr lang="es-419" b="1" dirty="0"/>
           </a:p>
         </p:txBody>
       </p:sp>
@@ -5544,7 +5459,7 @@
       </p:grpSpPr>
       <p:pic>
         <p:nvPicPr>
-          <p:cNvPr id="4" name="3 Marcador de contenido" descr="C:\proyectoDeliberyApp\Propotipos de vistas\Fin Pedido.png"/>
+          <p:cNvPr id="4" name="3 Marcador de contenido" descr="C:\proyectoDeliberyApp\Propotipos de vistas\Seleccion de menu.png"/>
           <p:cNvPicPr>
             <a:picLocks noGrp="1"/>
           </p:cNvPicPr>
@@ -5567,8 +5482,8 @@
         </p:blipFill>
         <p:spPr bwMode="auto">
           <a:xfrm>
-            <a:off x="611560" y="980728"/>
-            <a:ext cx="7920880" cy="4968552"/>
+            <a:off x="899592" y="980728"/>
+            <a:ext cx="7560840" cy="4752528"/>
           </a:xfrm>
           <a:prstGeom prst="rect">
             <a:avLst/>
@@ -5582,7 +5497,7 @@
     </p:spTree>
     <p:extLst>
       <p:ext uri="{BB962C8B-B14F-4D97-AF65-F5344CB8AC3E}">
-        <p14:creationId xmlns:p14="http://schemas.microsoft.com/office/powerpoint/2010/main" val="542597209"/>
+        <p14:creationId xmlns:p14="http://schemas.microsoft.com/office/powerpoint/2010/main" val="2398759630"/>
       </p:ext>
     </p:extLst>
   </p:cSld>
@@ -5621,7 +5536,7 @@
       </p:grpSpPr>
       <p:pic>
         <p:nvPicPr>
-          <p:cNvPr id="4" name="3 Marcador de contenido" descr="C:\proyectoDeliberyApp\Propotipos de vistas\Recepcin de pedidos.png"/>
+          <p:cNvPr id="4" name="3 Marcador de contenido" descr="C:\proyectoDeliberyApp\Propotipos de vistas\Fin Pedido.png"/>
           <p:cNvPicPr>
             <a:picLocks noGrp="1"/>
           </p:cNvPicPr>
@@ -5644,8 +5559,8 @@
         </p:blipFill>
         <p:spPr bwMode="auto">
           <a:xfrm>
-            <a:off x="971600" y="1052736"/>
-            <a:ext cx="7488832" cy="5112568"/>
+            <a:off x="611560" y="980728"/>
+            <a:ext cx="7920880" cy="4968552"/>
           </a:xfrm>
           <a:prstGeom prst="rect">
             <a:avLst/>
@@ -5659,7 +5574,7 @@
     </p:spTree>
     <p:extLst>
       <p:ext uri="{BB962C8B-B14F-4D97-AF65-F5344CB8AC3E}">
-        <p14:creationId xmlns:p14="http://schemas.microsoft.com/office/powerpoint/2010/main" val="2020702367"/>
+        <p14:creationId xmlns:p14="http://schemas.microsoft.com/office/powerpoint/2010/main" val="542597209"/>
       </p:ext>
     </p:extLst>
   </p:cSld>
@@ -5698,7 +5613,7 @@
       </p:grpSpPr>
       <p:pic>
         <p:nvPicPr>
-          <p:cNvPr id="4" name="3 Marcador de contenido" descr="C:\proyectoDeliberyApp\Propotipos de vistas\Cocina.png"/>
+          <p:cNvPr id="4" name="3 Marcador de contenido" descr="C:\proyectoDeliberyApp\Propotipos de vistas\Recepcin de pedidos.png"/>
           <p:cNvPicPr>
             <a:picLocks noGrp="1"/>
           </p:cNvPicPr>
@@ -5721,8 +5636,8 @@
         </p:blipFill>
         <p:spPr bwMode="auto">
           <a:xfrm>
-            <a:off x="899592" y="908720"/>
-            <a:ext cx="7776864" cy="5184576"/>
+            <a:off x="971600" y="1052736"/>
+            <a:ext cx="7488832" cy="5112568"/>
           </a:xfrm>
           <a:prstGeom prst="rect">
             <a:avLst/>
@@ -5736,7 +5651,7 @@
     </p:spTree>
     <p:extLst>
       <p:ext uri="{BB962C8B-B14F-4D97-AF65-F5344CB8AC3E}">
-        <p14:creationId xmlns:p14="http://schemas.microsoft.com/office/powerpoint/2010/main" val="1987229935"/>
+        <p14:creationId xmlns:p14="http://schemas.microsoft.com/office/powerpoint/2010/main" val="2020702367"/>
       </p:ext>
     </p:extLst>
   </p:cSld>
@@ -5775,7 +5690,7 @@
       </p:grpSpPr>
       <p:pic>
         <p:nvPicPr>
-          <p:cNvPr id="4" name="3 Marcador de contenido" descr="C:\proyectoDeliberyApp\Propotipos de vistas\Caja.png"/>
+          <p:cNvPr id="4" name="3 Marcador de contenido" descr="C:\proyectoDeliberyApp\Propotipos de vistas\Cocina.png"/>
           <p:cNvPicPr>
             <a:picLocks noGrp="1"/>
           </p:cNvPicPr>
@@ -5798,8 +5713,8 @@
         </p:blipFill>
         <p:spPr bwMode="auto">
           <a:xfrm>
-            <a:off x="971600" y="1052736"/>
-            <a:ext cx="7632848" cy="4824536"/>
+            <a:off x="899592" y="908720"/>
+            <a:ext cx="7776864" cy="5184576"/>
           </a:xfrm>
           <a:prstGeom prst="rect">
             <a:avLst/>
@@ -5813,7 +5728,7 @@
     </p:spTree>
     <p:extLst>
       <p:ext uri="{BB962C8B-B14F-4D97-AF65-F5344CB8AC3E}">
-        <p14:creationId xmlns:p14="http://schemas.microsoft.com/office/powerpoint/2010/main" val="399025501"/>
+        <p14:creationId xmlns:p14="http://schemas.microsoft.com/office/powerpoint/2010/main" val="1987229935"/>
       </p:ext>
     </p:extLst>
   </p:cSld>
@@ -5850,277 +5765,18 @@
           <a:chExt cx="0" cy="0"/>
         </a:xfrm>
       </p:grpSpPr>
-      <p:sp>
-        <p:nvSpPr>
-          <p:cNvPr id="2" name="1 Título"/>
-          <p:cNvSpPr>
-            <a:spLocks noGrp="1"/>
-          </p:cNvSpPr>
-          <p:nvPr>
-            <p:ph type="title"/>
-          </p:nvPr>
-        </p:nvSpPr>
-        <p:spPr>
-          <a:xfrm>
-            <a:off x="467544" y="476672"/>
-            <a:ext cx="8229600" cy="1143000"/>
-          </a:xfrm>
-        </p:spPr>
-        <p:txBody>
-          <a:bodyPr>
-            <a:normAutofit fontScale="90000"/>
-          </a:bodyPr>
-          <a:lstStyle/>
-          <a:p>
-            <a:pPr algn="ctr"/>
-            <a:r>
-              <a:rPr lang="es-ES" b="1" dirty="0" smtClean="0"/>
-              <a:t>HERRAMIENTAS COLABORATIVAS</a:t>
-            </a:r>
-            <a:endParaRPr lang="es-ES" b="1" dirty="0"/>
-          </a:p>
-        </p:txBody>
-      </p:sp>
-      <p:sp>
-        <p:nvSpPr>
-          <p:cNvPr id="3" name="2 Marcador de contenido"/>
-          <p:cNvSpPr>
-            <a:spLocks noGrp="1"/>
-          </p:cNvSpPr>
-          <p:nvPr>
-            <p:ph idx="1"/>
-          </p:nvPr>
-        </p:nvSpPr>
-        <p:spPr/>
-        <p:txBody>
-          <a:bodyPr/>
-          <a:lstStyle/>
-          <a:p>
-            <a:pPr marL="0" indent="0" algn="ctr">
-              <a:buNone/>
-            </a:pPr>
-            <a:r>
-              <a:rPr lang="es-ES" dirty="0"/>
-              <a:t>Durante el proceso de gestión de configuración se </a:t>
-            </a:r>
-            <a:r>
-              <a:rPr lang="es-ES" dirty="0" smtClean="0"/>
-              <a:t>utilizo </a:t>
-            </a:r>
-            <a:r>
-              <a:rPr lang="es-ES" dirty="0"/>
-              <a:t>la herramienta </a:t>
-            </a:r>
-            <a:r>
-              <a:rPr lang="es-ES" dirty="0" err="1"/>
-              <a:t>Github</a:t>
-            </a:r>
-            <a:r>
-              <a:rPr lang="es-ES" dirty="0"/>
-              <a:t> para el  control de versiones del proyecto. Esta gestión se </a:t>
-            </a:r>
-            <a:r>
-              <a:rPr lang="es-ES" dirty="0" smtClean="0"/>
-              <a:t>hizo </a:t>
-            </a:r>
-            <a:r>
-              <a:rPr lang="es-ES" dirty="0"/>
-              <a:t>mediante la herramienta </a:t>
-            </a:r>
-            <a:r>
-              <a:rPr lang="es-ES" dirty="0" err="1"/>
-              <a:t>Zenhub</a:t>
-            </a:r>
-            <a:r>
-              <a:rPr lang="es-ES" dirty="0"/>
-              <a:t> para los documentos y  Sublime para el código </a:t>
-            </a:r>
-            <a:r>
-              <a:rPr lang="es-ES" dirty="0" smtClean="0"/>
-              <a:t>fuente.</a:t>
-            </a:r>
-            <a:endParaRPr lang="es-ES" dirty="0"/>
-          </a:p>
-          <a:p>
-            <a:pPr marL="0" indent="0">
-              <a:buNone/>
-            </a:pPr>
-            <a:endParaRPr lang="es-ES" dirty="0"/>
-          </a:p>
-        </p:txBody>
-      </p:sp>
       <p:pic>
         <p:nvPicPr>
-          <p:cNvPr id="1026" name="Picture 2"/>
+          <p:cNvPr id="4" name="3 Marcador de contenido" descr="C:\proyectoDeliberyApp\Propotipos de vistas\Caja.png"/>
           <p:cNvPicPr>
-            <a:picLocks noChangeAspect="1" noChangeArrowheads="1"/>
+            <a:picLocks noGrp="1"/>
           </p:cNvPicPr>
-          <p:nvPr/>
+          <p:nvPr>
+            <p:ph idx="1"/>
+          </p:nvPr>
         </p:nvPicPr>
         <p:blipFill>
-          <a:blip r:embed="rId2" cstate="print">
-            <a:extLst>
-              <a:ext uri="{28A0092B-C50C-407E-A947-70E740481C1C}">
-                <a14:useLocalDpi xmlns:a14="http://schemas.microsoft.com/office/drawing/2010/main" val="0"/>
-              </a:ext>
-            </a:extLst>
-          </a:blip>
-          <a:srcRect/>
-          <a:stretch>
-            <a:fillRect/>
-          </a:stretch>
-        </p:blipFill>
-        <p:spPr bwMode="auto">
-          <a:xfrm rot="20930783">
-            <a:off x="550779" y="3868323"/>
-            <a:ext cx="2425452" cy="1616968"/>
-          </a:xfrm>
-          <a:prstGeom prst="rect">
-            <a:avLst/>
-          </a:prstGeom>
-          <a:noFill/>
-          <a:ln>
-            <a:noFill/>
-          </a:ln>
-          <a:extLst>
-            <a:ext uri="{909E8E84-426E-40DD-AFC4-6F175D3DCCD1}">
-              <a14:hiddenFill xmlns:a14="http://schemas.microsoft.com/office/drawing/2010/main">
-                <a:solidFill>
-                  <a:schemeClr val="accent1"/>
-                </a:solidFill>
-              </a14:hiddenFill>
-            </a:ext>
-            <a:ext uri="{91240B29-F687-4F45-9708-019B960494DF}">
-              <a14:hiddenLine xmlns:a14="http://schemas.microsoft.com/office/drawing/2010/main" w="9525">
-                <a:solidFill>
-                  <a:schemeClr val="tx1"/>
-                </a:solidFill>
-                <a:miter lim="800000"/>
-                <a:headEnd/>
-                <a:tailEnd/>
-              </a14:hiddenLine>
-            </a:ext>
-          </a:extLst>
-        </p:spPr>
-      </p:pic>
-      <p:pic>
-        <p:nvPicPr>
-          <p:cNvPr id="1027" name="Picture 3"/>
-          <p:cNvPicPr>
-            <a:picLocks noChangeAspect="1" noChangeArrowheads="1"/>
-          </p:cNvPicPr>
-          <p:nvPr/>
-        </p:nvPicPr>
-        <p:blipFill>
-          <a:blip r:embed="rId3">
-            <a:extLst>
-              <a:ext uri="{28A0092B-C50C-407E-A947-70E740481C1C}">
-                <a14:useLocalDpi xmlns:a14="http://schemas.microsoft.com/office/drawing/2010/main" val="0"/>
-              </a:ext>
-            </a:extLst>
-          </a:blip>
-          <a:srcRect/>
-          <a:stretch>
-            <a:fillRect/>
-          </a:stretch>
-        </p:blipFill>
-        <p:spPr bwMode="auto">
-          <a:xfrm rot="638652">
-            <a:off x="3017926" y="5074764"/>
-            <a:ext cx="1219200" cy="1219200"/>
-          </a:xfrm>
-          <a:prstGeom prst="rect">
-            <a:avLst/>
-          </a:prstGeom>
-          <a:noFill/>
-          <a:ln>
-            <a:noFill/>
-          </a:ln>
-          <a:extLst>
-            <a:ext uri="{909E8E84-426E-40DD-AFC4-6F175D3DCCD1}">
-              <a14:hiddenFill xmlns:a14="http://schemas.microsoft.com/office/drawing/2010/main">
-                <a:solidFill>
-                  <a:schemeClr val="accent1"/>
-                </a:solidFill>
-              </a14:hiddenFill>
-            </a:ext>
-            <a:ext uri="{91240B29-F687-4F45-9708-019B960494DF}">
-              <a14:hiddenLine xmlns:a14="http://schemas.microsoft.com/office/drawing/2010/main" w="9525">
-                <a:solidFill>
-                  <a:schemeClr val="tx1"/>
-                </a:solidFill>
-                <a:miter lim="800000"/>
-                <a:headEnd/>
-                <a:tailEnd/>
-              </a14:hiddenLine>
-            </a:ext>
-          </a:extLst>
-        </p:spPr>
-      </p:pic>
-      <p:pic>
-        <p:nvPicPr>
-          <p:cNvPr id="1028" name="Picture 4"/>
-          <p:cNvPicPr>
-            <a:picLocks noChangeAspect="1" noChangeArrowheads="1"/>
-          </p:cNvPicPr>
-          <p:nvPr/>
-        </p:nvPicPr>
-        <p:blipFill>
-          <a:blip r:embed="rId4">
-            <a:extLst>
-              <a:ext uri="{28A0092B-C50C-407E-A947-70E740481C1C}">
-                <a14:useLocalDpi xmlns:a14="http://schemas.microsoft.com/office/drawing/2010/main" val="0"/>
-              </a:ext>
-            </a:extLst>
-          </a:blip>
-          <a:srcRect/>
-          <a:stretch>
-            <a:fillRect/>
-          </a:stretch>
-        </p:blipFill>
-        <p:spPr bwMode="auto">
-          <a:xfrm rot="21182784">
-            <a:off x="4730655" y="4073715"/>
-            <a:ext cx="1524000" cy="1524000"/>
-          </a:xfrm>
-          <a:prstGeom prst="rect">
-            <a:avLst/>
-          </a:prstGeom>
-          <a:noFill/>
-          <a:ln>
-            <a:noFill/>
-          </a:ln>
-          <a:extLst>
-            <a:ext uri="{909E8E84-426E-40DD-AFC4-6F175D3DCCD1}">
-              <a14:hiddenFill xmlns:a14="http://schemas.microsoft.com/office/drawing/2010/main">
-                <a:solidFill>
-                  <a:schemeClr val="accent1"/>
-                </a:solidFill>
-              </a14:hiddenFill>
-            </a:ext>
-            <a:ext uri="{91240B29-F687-4F45-9708-019B960494DF}">
-              <a14:hiddenLine xmlns:a14="http://schemas.microsoft.com/office/drawing/2010/main" w="9525">
-                <a:solidFill>
-                  <a:schemeClr val="tx1"/>
-                </a:solidFill>
-                <a:miter lim="800000"/>
-                <a:headEnd/>
-                <a:tailEnd/>
-              </a14:hiddenLine>
-            </a:ext>
-          </a:extLst>
-        </p:spPr>
-      </p:pic>
-      <p:pic>
-        <p:nvPicPr>
-          <p:cNvPr id="1029" name="Picture 5"/>
-          <p:cNvPicPr>
-            <a:picLocks noChangeAspect="1" noChangeArrowheads="1"/>
-          </p:cNvPicPr>
-          <p:nvPr/>
-        </p:nvPicPr>
-        <p:blipFill>
-          <a:blip r:embed="rId5">
+          <a:blip r:embed="rId2">
             <a:extLst>
               <a:ext uri="{28A0092B-C50C-407E-A947-70E740481C1C}">
                 <a14:useLocalDpi xmlns:a14="http://schemas.microsoft.com/office/drawing/2010/main" val="0"/>
@@ -6134,8 +5790,8 @@
         </p:blipFill>
         <p:spPr bwMode="auto">
           <a:xfrm>
-            <a:off x="6732240" y="4389603"/>
-            <a:ext cx="1441698" cy="1618510"/>
+            <a:off x="971600" y="1052736"/>
+            <a:ext cx="7632848" cy="4824536"/>
           </a:xfrm>
           <a:prstGeom prst="rect">
             <a:avLst/>
@@ -6144,31 +5800,12 @@
           <a:ln>
             <a:noFill/>
           </a:ln>
-          <a:extLst>
-            <a:ext uri="{909E8E84-426E-40DD-AFC4-6F175D3DCCD1}">
-              <a14:hiddenFill xmlns:a14="http://schemas.microsoft.com/office/drawing/2010/main">
-                <a:solidFill>
-                  <a:schemeClr val="accent1"/>
-                </a:solidFill>
-              </a14:hiddenFill>
-            </a:ext>
-            <a:ext uri="{91240B29-F687-4F45-9708-019B960494DF}">
-              <a14:hiddenLine xmlns:a14="http://schemas.microsoft.com/office/drawing/2010/main" w="9525">
-                <a:solidFill>
-                  <a:schemeClr val="tx1"/>
-                </a:solidFill>
-                <a:miter lim="800000"/>
-                <a:headEnd/>
-                <a:tailEnd/>
-              </a14:hiddenLine>
-            </a:ext>
-          </a:extLst>
         </p:spPr>
       </p:pic>
     </p:spTree>
     <p:extLst>
       <p:ext uri="{BB962C8B-B14F-4D97-AF65-F5344CB8AC3E}">
-        <p14:creationId xmlns:p14="http://schemas.microsoft.com/office/powerpoint/2010/main" val="716299305"/>
+        <p14:creationId xmlns:p14="http://schemas.microsoft.com/office/powerpoint/2010/main" val="399025501"/>
       </p:ext>
     </p:extLst>
   </p:cSld>
@@ -6215,32 +5852,105 @@
             <p:ph type="title"/>
           </p:nvPr>
         </p:nvSpPr>
+        <p:spPr>
+          <a:xfrm>
+            <a:off x="467544" y="476672"/>
+            <a:ext cx="8229600" cy="1143000"/>
+          </a:xfrm>
+        </p:spPr>
+        <p:txBody>
+          <a:bodyPr>
+            <a:normAutofit fontScale="90000"/>
+          </a:bodyPr>
+          <a:lstStyle/>
+          <a:p>
+            <a:pPr algn="ctr"/>
+            <a:r>
+              <a:rPr lang="es-ES" b="1" dirty="0" smtClean="0"/>
+              <a:t>HERRAMIENTAS COLABORATIVAS</a:t>
+            </a:r>
+            <a:endParaRPr lang="es-ES" b="1" dirty="0"/>
+          </a:p>
+        </p:txBody>
+      </p:sp>
+      <p:sp>
+        <p:nvSpPr>
+          <p:cNvPr id="3" name="2 Marcador de contenido"/>
+          <p:cNvSpPr>
+            <a:spLocks noGrp="1"/>
+          </p:cNvSpPr>
+          <p:nvPr>
+            <p:ph idx="1"/>
+          </p:nvPr>
+        </p:nvSpPr>
         <p:spPr/>
         <p:txBody>
           <a:bodyPr/>
           <a:lstStyle/>
           <a:p>
-            <a:pPr algn="ctr"/>
-            <a:r>
-              <a:rPr lang="es-ES" b="1" dirty="0" smtClean="0"/>
-              <a:t>ENTORNO DE DESARROLLO</a:t>
-            </a:r>
-            <a:endParaRPr lang="es-ES" b="1" dirty="0"/>
+            <a:pPr marL="0" indent="0" algn="ctr">
+              <a:buNone/>
+            </a:pPr>
+            <a:r>
+              <a:rPr lang="es-ES" dirty="0"/>
+              <a:t>Durante el proceso de gestión de configuración se </a:t>
+            </a:r>
+            <a:r>
+              <a:rPr lang="es-ES" dirty="0" smtClean="0"/>
+              <a:t>utilizo </a:t>
+            </a:r>
+            <a:r>
+              <a:rPr lang="es-ES" dirty="0"/>
+              <a:t>la herramienta </a:t>
+            </a:r>
+            <a:r>
+              <a:rPr lang="es-ES" dirty="0" err="1"/>
+              <a:t>Github</a:t>
+            </a:r>
+            <a:r>
+              <a:rPr lang="es-ES" dirty="0"/>
+              <a:t> para el  control de versiones del proyecto. Esta gestión se </a:t>
+            </a:r>
+            <a:r>
+              <a:rPr lang="es-ES" dirty="0" smtClean="0"/>
+              <a:t>hizo </a:t>
+            </a:r>
+            <a:r>
+              <a:rPr lang="es-ES" dirty="0"/>
+              <a:t>mediante la herramienta </a:t>
+            </a:r>
+            <a:r>
+              <a:rPr lang="es-ES" dirty="0" err="1"/>
+              <a:t>Zenhub</a:t>
+            </a:r>
+            <a:r>
+              <a:rPr lang="es-ES" dirty="0"/>
+              <a:t> para los documentos y  Sublime para el código </a:t>
+            </a:r>
+            <a:r>
+              <a:rPr lang="es-ES" dirty="0" smtClean="0"/>
+              <a:t>fuente.</a:t>
+            </a:r>
+            <a:endParaRPr lang="es-ES" dirty="0"/>
+          </a:p>
+          <a:p>
+            <a:pPr marL="0" indent="0">
+              <a:buNone/>
+            </a:pPr>
+            <a:endParaRPr lang="es-ES" dirty="0"/>
           </a:p>
         </p:txBody>
       </p:sp>
       <p:pic>
         <p:nvPicPr>
-          <p:cNvPr id="3074" name="Picture 2" descr="D:\alas\Downloads\visual_studio_purple-930x462.png"/>
+          <p:cNvPr id="1026" name="Picture 2"/>
           <p:cNvPicPr>
-            <a:picLocks noGrp="1" noChangeAspect="1" noChangeArrowheads="1"/>
+            <a:picLocks noChangeAspect="1" noChangeArrowheads="1"/>
           </p:cNvPicPr>
-          <p:nvPr>
-            <p:ph idx="1"/>
-          </p:nvPr>
+          <p:nvPr/>
         </p:nvPicPr>
         <p:blipFill>
-          <a:blip r:embed="rId2">
+          <a:blip r:embed="rId2" cstate="print">
             <a:extLst>
               <a:ext uri="{28A0092B-C50C-407E-A947-70E740481C1C}">
                 <a14:useLocalDpi xmlns:a14="http://schemas.microsoft.com/office/drawing/2010/main" val="0"/>
@@ -6253,67 +5963,41 @@
           </a:stretch>
         </p:blipFill>
         <p:spPr bwMode="auto">
-          <a:xfrm rot="20609922">
-            <a:off x="-85682" y="1997463"/>
-            <a:ext cx="4576718" cy="2273595"/>
+          <a:xfrm rot="20930783">
+            <a:off x="550779" y="3868323"/>
+            <a:ext cx="2425452" cy="1616968"/>
           </a:xfrm>
           <a:prstGeom prst="rect">
             <a:avLst/>
           </a:prstGeom>
           <a:noFill/>
+          <a:ln>
+            <a:noFill/>
+          </a:ln>
           <a:extLst>
             <a:ext uri="{909E8E84-426E-40DD-AFC4-6F175D3DCCD1}">
               <a14:hiddenFill xmlns:a14="http://schemas.microsoft.com/office/drawing/2010/main">
                 <a:solidFill>
-                  <a:srgbClr val="FFFFFF"/>
+                  <a:schemeClr val="accent1"/>
                 </a:solidFill>
               </a14:hiddenFill>
             </a:ext>
-          </a:extLst>
-        </p:spPr>
-      </p:pic>
-      <p:sp>
-        <p:nvSpPr>
-          <p:cNvPr id="4" name="AutoShape 4" descr="Resultado de imagen de entity framework logo"/>
-          <p:cNvSpPr>
-            <a:spLocks noChangeAspect="1" noChangeArrowheads="1"/>
-          </p:cNvSpPr>
-          <p:nvPr/>
-        </p:nvSpPr>
-        <p:spPr bwMode="auto">
-          <a:xfrm>
-            <a:off x="155575" y="-144463"/>
-            <a:ext cx="304800" cy="304801"/>
-          </a:xfrm>
-          <a:prstGeom prst="rect">
-            <a:avLst/>
-          </a:prstGeom>
-          <a:noFill/>
-          <a:extLst>
-            <a:ext uri="{909E8E84-426E-40DD-AFC4-6F175D3DCCD1}">
-              <a14:hiddenFill xmlns:a14="http://schemas.microsoft.com/office/drawing/2010/main">
+            <a:ext uri="{91240B29-F687-4F45-9708-019B960494DF}">
+              <a14:hiddenLine xmlns:a14="http://schemas.microsoft.com/office/drawing/2010/main" w="9525">
                 <a:solidFill>
-                  <a:srgbClr val="FFFFFF"/>
+                  <a:schemeClr val="tx1"/>
                 </a:solidFill>
-              </a14:hiddenFill>
+                <a:miter lim="800000"/>
+                <a:headEnd/>
+                <a:tailEnd/>
+              </a14:hiddenLine>
             </a:ext>
           </a:extLst>
         </p:spPr>
-        <p:txBody>
-          <a:bodyPr vert="horz" wrap="square" lIns="91440" tIns="45720" rIns="91440" bIns="45720" numCol="1" anchor="t" anchorCtr="0" compatLnSpc="1">
-            <a:prstTxWarp prst="textNoShape">
-              <a:avLst/>
-            </a:prstTxWarp>
-          </a:bodyPr>
-          <a:lstStyle/>
-          <a:p>
-            <a:endParaRPr lang="es-ES"/>
-          </a:p>
-        </p:txBody>
-      </p:sp>
+      </p:pic>
       <p:pic>
         <p:nvPicPr>
-          <p:cNvPr id="3077" name="Picture 5" descr="D:\alas\Downloads\entity-framework-logo-750x281.jpg"/>
+          <p:cNvPr id="1027" name="Picture 3"/>
           <p:cNvPicPr>
             <a:picLocks noChangeAspect="1" noChangeArrowheads="1"/>
           </p:cNvPicPr>
@@ -6333,28 +6017,41 @@
           </a:stretch>
         </p:blipFill>
         <p:spPr bwMode="auto">
-          <a:xfrm rot="676186">
-            <a:off x="4491035" y="2436510"/>
-            <a:ext cx="3992077" cy="1495698"/>
+          <a:xfrm rot="638652">
+            <a:off x="3017926" y="5074764"/>
+            <a:ext cx="1219200" cy="1219200"/>
           </a:xfrm>
           <a:prstGeom prst="rect">
             <a:avLst/>
           </a:prstGeom>
           <a:noFill/>
+          <a:ln>
+            <a:noFill/>
+          </a:ln>
           <a:extLst>
             <a:ext uri="{909E8E84-426E-40DD-AFC4-6F175D3DCCD1}">
               <a14:hiddenFill xmlns:a14="http://schemas.microsoft.com/office/drawing/2010/main">
                 <a:solidFill>
-                  <a:srgbClr val="FFFFFF"/>
+                  <a:schemeClr val="accent1"/>
                 </a:solidFill>
               </a14:hiddenFill>
             </a:ext>
+            <a:ext uri="{91240B29-F687-4F45-9708-019B960494DF}">
+              <a14:hiddenLine xmlns:a14="http://schemas.microsoft.com/office/drawing/2010/main" w="9525">
+                <a:solidFill>
+                  <a:schemeClr val="tx1"/>
+                </a:solidFill>
+                <a:miter lim="800000"/>
+                <a:headEnd/>
+                <a:tailEnd/>
+              </a14:hiddenLine>
+            </a:ext>
           </a:extLst>
         </p:spPr>
       </p:pic>
       <p:pic>
         <p:nvPicPr>
-          <p:cNvPr id="3079" name="Picture 7" descr="http://programacion.net/files/article/20160104050126_aspnet.jpg"/>
+          <p:cNvPr id="1028" name="Picture 4"/>
           <p:cNvPicPr>
             <a:picLocks noChangeAspect="1" noChangeArrowheads="1"/>
           </p:cNvPicPr>
@@ -6374,21 +6071,88 @@
           </a:stretch>
         </p:blipFill>
         <p:spPr bwMode="auto">
-          <a:xfrm rot="288563">
-            <a:off x="2429554" y="4025453"/>
-            <a:ext cx="4005935" cy="2002968"/>
+          <a:xfrm rot="21182784">
+            <a:off x="4730655" y="4073715"/>
+            <a:ext cx="1524000" cy="1524000"/>
           </a:xfrm>
           <a:prstGeom prst="rect">
             <a:avLst/>
           </a:prstGeom>
           <a:noFill/>
+          <a:ln>
+            <a:noFill/>
+          </a:ln>
           <a:extLst>
             <a:ext uri="{909E8E84-426E-40DD-AFC4-6F175D3DCCD1}">
               <a14:hiddenFill xmlns:a14="http://schemas.microsoft.com/office/drawing/2010/main">
                 <a:solidFill>
-                  <a:srgbClr val="FFFFFF"/>
+                  <a:schemeClr val="accent1"/>
                 </a:solidFill>
               </a14:hiddenFill>
+            </a:ext>
+            <a:ext uri="{91240B29-F687-4F45-9708-019B960494DF}">
+              <a14:hiddenLine xmlns:a14="http://schemas.microsoft.com/office/drawing/2010/main" w="9525">
+                <a:solidFill>
+                  <a:schemeClr val="tx1"/>
+                </a:solidFill>
+                <a:miter lim="800000"/>
+                <a:headEnd/>
+                <a:tailEnd/>
+              </a14:hiddenLine>
+            </a:ext>
+          </a:extLst>
+        </p:spPr>
+      </p:pic>
+      <p:pic>
+        <p:nvPicPr>
+          <p:cNvPr id="1029" name="Picture 5"/>
+          <p:cNvPicPr>
+            <a:picLocks noChangeAspect="1" noChangeArrowheads="1"/>
+          </p:cNvPicPr>
+          <p:nvPr/>
+        </p:nvPicPr>
+        <p:blipFill>
+          <a:blip r:embed="rId5">
+            <a:extLst>
+              <a:ext uri="{28A0092B-C50C-407E-A947-70E740481C1C}">
+                <a14:useLocalDpi xmlns:a14="http://schemas.microsoft.com/office/drawing/2010/main" val="0"/>
+              </a:ext>
+            </a:extLst>
+          </a:blip>
+          <a:srcRect/>
+          <a:stretch>
+            <a:fillRect/>
+          </a:stretch>
+        </p:blipFill>
+        <p:spPr bwMode="auto">
+          <a:xfrm>
+            <a:off x="6732240" y="4389603"/>
+            <a:ext cx="1441698" cy="1618510"/>
+          </a:xfrm>
+          <a:prstGeom prst="rect">
+            <a:avLst/>
+          </a:prstGeom>
+          <a:noFill/>
+          <a:ln>
+            <a:noFill/>
+          </a:ln>
+          <a:extLst>
+            <a:ext uri="{909E8E84-426E-40DD-AFC4-6F175D3DCCD1}">
+              <a14:hiddenFill xmlns:a14="http://schemas.microsoft.com/office/drawing/2010/main">
+                <a:solidFill>
+                  <a:schemeClr val="accent1"/>
+                </a:solidFill>
+              </a14:hiddenFill>
+            </a:ext>
+            <a:ext uri="{91240B29-F687-4F45-9708-019B960494DF}">
+              <a14:hiddenLine xmlns:a14="http://schemas.microsoft.com/office/drawing/2010/main" w="9525">
+                <a:solidFill>
+                  <a:schemeClr val="tx1"/>
+                </a:solidFill>
+                <a:miter lim="800000"/>
+                <a:headEnd/>
+                <a:tailEnd/>
+              </a14:hiddenLine>
             </a:ext>
           </a:extLst>
         </p:spPr>
@@ -6396,7 +6160,7 @@
     </p:spTree>
     <p:extLst>
       <p:ext uri="{BB962C8B-B14F-4D97-AF65-F5344CB8AC3E}">
-        <p14:creationId xmlns:p14="http://schemas.microsoft.com/office/powerpoint/2010/main" val="775879315"/>
+        <p14:creationId xmlns:p14="http://schemas.microsoft.com/office/powerpoint/2010/main" val="716299305"/>
       </p:ext>
     </p:extLst>
   </p:cSld>
@@ -6443,12 +6207,7 @@
             <p:ph type="title"/>
           </p:nvPr>
         </p:nvSpPr>
-        <p:spPr>
-          <a:xfrm>
-            <a:off x="395536" y="764704"/>
-            <a:ext cx="8229600" cy="1143000"/>
-          </a:xfrm>
-        </p:spPr>
+        <p:spPr/>
         <p:txBody>
           <a:bodyPr/>
           <a:lstStyle/>
@@ -6456,86 +6215,180 @@
             <a:pPr algn="ctr"/>
             <a:r>
               <a:rPr lang="es-ES" b="1" dirty="0" smtClean="0"/>
-              <a:t>DIAGRAMAS DE UML</a:t>
+              <a:t>ENTORNO DE DESARROLLO</a:t>
             </a:r>
             <a:endParaRPr lang="es-ES" b="1" dirty="0"/>
           </a:p>
         </p:txBody>
       </p:sp>
-      <p:sp>
-        <p:nvSpPr>
-          <p:cNvPr id="3" name="2 Marcador de contenido"/>
-          <p:cNvSpPr>
-            <a:spLocks noGrp="1"/>
-          </p:cNvSpPr>
+      <p:pic>
+        <p:nvPicPr>
+          <p:cNvPr id="3074" name="Picture 2" descr="D:\alas\Downloads\visual_studio_purple-930x462.png"/>
+          <p:cNvPicPr>
+            <a:picLocks noGrp="1" noChangeAspect="1" noChangeArrowheads="1"/>
+          </p:cNvPicPr>
           <p:nvPr>
             <p:ph idx="1"/>
           </p:nvPr>
-        </p:nvSpPr>
-        <p:spPr>
+        </p:nvPicPr>
+        <p:blipFill>
+          <a:blip r:embed="rId2">
+            <a:extLst>
+              <a:ext uri="{28A0092B-C50C-407E-A947-70E740481C1C}">
+                <a14:useLocalDpi xmlns:a14="http://schemas.microsoft.com/office/drawing/2010/main" val="0"/>
+              </a:ext>
+            </a:extLst>
+          </a:blip>
+          <a:srcRect/>
+          <a:stretch>
+            <a:fillRect/>
+          </a:stretch>
+        </p:blipFill>
+        <p:spPr bwMode="auto">
+          <a:xfrm rot="20609922">
+            <a:off x="-85682" y="1997463"/>
+            <a:ext cx="4576718" cy="2273595"/>
+          </a:xfrm>
+          <a:prstGeom prst="rect">
+            <a:avLst/>
+          </a:prstGeom>
+          <a:noFill/>
+          <a:extLst>
+            <a:ext uri="{909E8E84-426E-40DD-AFC4-6F175D3DCCD1}">
+              <a14:hiddenFill xmlns:a14="http://schemas.microsoft.com/office/drawing/2010/main">
+                <a:solidFill>
+                  <a:srgbClr val="FFFFFF"/>
+                </a:solidFill>
+              </a14:hiddenFill>
+            </a:ext>
+          </a:extLst>
+        </p:spPr>
+      </p:pic>
+      <p:sp>
+        <p:nvSpPr>
+          <p:cNvPr id="4" name="AutoShape 4" descr="Resultado de imagen de entity framework logo"/>
+          <p:cNvSpPr>
+            <a:spLocks noChangeAspect="1" noChangeArrowheads="1"/>
+          </p:cNvSpPr>
+          <p:nvPr/>
+        </p:nvSpPr>
+        <p:spPr bwMode="auto">
           <a:xfrm>
-            <a:off x="539552" y="1916832"/>
-            <a:ext cx="8229600" cy="4389120"/>
-          </a:xfrm>
-        </p:spPr>
-        <p:txBody>
-          <a:bodyPr>
-            <a:normAutofit/>
+            <a:off x="155575" y="-144463"/>
+            <a:ext cx="304800" cy="304801"/>
+          </a:xfrm>
+          <a:prstGeom prst="rect">
+            <a:avLst/>
+          </a:prstGeom>
+          <a:noFill/>
+          <a:extLst>
+            <a:ext uri="{909E8E84-426E-40DD-AFC4-6F175D3DCCD1}">
+              <a14:hiddenFill xmlns:a14="http://schemas.microsoft.com/office/drawing/2010/main">
+                <a:solidFill>
+                  <a:srgbClr val="FFFFFF"/>
+                </a:solidFill>
+              </a14:hiddenFill>
+            </a:ext>
+          </a:extLst>
+        </p:spPr>
+        <p:txBody>
+          <a:bodyPr vert="horz" wrap="square" lIns="91440" tIns="45720" rIns="91440" bIns="45720" numCol="1" anchor="t" anchorCtr="0" compatLnSpc="1">
+            <a:prstTxWarp prst="textNoShape">
+              <a:avLst/>
+            </a:prstTxWarp>
           </a:bodyPr>
           <a:lstStyle/>
           <a:p>
-            <a:endParaRPr lang="es-ES" dirty="0" smtClean="0"/>
-          </a:p>
-          <a:p>
-            <a:pPr marL="0" indent="0" algn="ctr">
-              <a:buNone/>
-            </a:pPr>
-            <a:r>
-              <a:rPr lang="es-ES" dirty="0" smtClean="0"/>
-              <a:t>UML </a:t>
-            </a:r>
-            <a:r>
-              <a:rPr lang="es-ES" dirty="0"/>
-              <a:t>(Lenguaje unificado de Modelado) es un conjunto de normas y estándares gráficos respecto a cómo se deben representar los esquemas relativos al software.</a:t>
-            </a:r>
-          </a:p>
-          <a:p>
-            <a:pPr marL="0" indent="0" algn="ctr">
-              <a:buNone/>
-            </a:pPr>
-            <a:r>
-              <a:rPr lang="es-ES" dirty="0" smtClean="0"/>
-              <a:t>Mediante </a:t>
-            </a:r>
-            <a:r>
-              <a:rPr lang="es-ES" dirty="0"/>
-              <a:t>UML se pueden establecer </a:t>
-            </a:r>
-            <a:r>
-              <a:rPr lang="es-ES" dirty="0" smtClean="0"/>
-              <a:t>los       requerimientos </a:t>
-            </a:r>
-            <a:r>
-              <a:rPr lang="es-ES" dirty="0"/>
-              <a:t>y la estructura necesaria para desarrollar un sistema antes de codificarlo (escribirlo).</a:t>
-            </a:r>
-          </a:p>
-          <a:p>
-            <a:pPr marL="0" indent="0">
-              <a:buNone/>
-            </a:pPr>
-            <a:r>
-              <a:rPr lang="es-ES" dirty="0" smtClean="0"/>
-              <a:t> </a:t>
-            </a:r>
-            <a:endParaRPr lang="es-ES" dirty="0"/>
-          </a:p>
-        </p:txBody>
-      </p:sp>
+            <a:endParaRPr lang="es-ES"/>
+          </a:p>
+        </p:txBody>
+      </p:sp>
+      <p:pic>
+        <p:nvPicPr>
+          <p:cNvPr id="3077" name="Picture 5" descr="D:\alas\Downloads\entity-framework-logo-750x281.jpg"/>
+          <p:cNvPicPr>
+            <a:picLocks noChangeAspect="1" noChangeArrowheads="1"/>
+          </p:cNvPicPr>
+          <p:nvPr/>
+        </p:nvPicPr>
+        <p:blipFill>
+          <a:blip r:embed="rId3">
+            <a:extLst>
+              <a:ext uri="{28A0092B-C50C-407E-A947-70E740481C1C}">
+                <a14:useLocalDpi xmlns:a14="http://schemas.microsoft.com/office/drawing/2010/main" val="0"/>
+              </a:ext>
+            </a:extLst>
+          </a:blip>
+          <a:srcRect/>
+          <a:stretch>
+            <a:fillRect/>
+          </a:stretch>
+        </p:blipFill>
+        <p:spPr bwMode="auto">
+          <a:xfrm rot="676186">
+            <a:off x="4491035" y="2436510"/>
+            <a:ext cx="3992077" cy="1495698"/>
+          </a:xfrm>
+          <a:prstGeom prst="rect">
+            <a:avLst/>
+          </a:prstGeom>
+          <a:noFill/>
+          <a:extLst>
+            <a:ext uri="{909E8E84-426E-40DD-AFC4-6F175D3DCCD1}">
+              <a14:hiddenFill xmlns:a14="http://schemas.microsoft.com/office/drawing/2010/main">
+                <a:solidFill>
+                  <a:srgbClr val="FFFFFF"/>
+                </a:solidFill>
+              </a14:hiddenFill>
+            </a:ext>
+          </a:extLst>
+        </p:spPr>
+      </p:pic>
+      <p:pic>
+        <p:nvPicPr>
+          <p:cNvPr id="3079" name="Picture 7" descr="http://programacion.net/files/article/20160104050126_aspnet.jpg"/>
+          <p:cNvPicPr>
+            <a:picLocks noChangeAspect="1" noChangeArrowheads="1"/>
+          </p:cNvPicPr>
+          <p:nvPr/>
+        </p:nvPicPr>
+        <p:blipFill>
+          <a:blip r:embed="rId4">
+            <a:extLst>
+              <a:ext uri="{28A0092B-C50C-407E-A947-70E740481C1C}">
+                <a14:useLocalDpi xmlns:a14="http://schemas.microsoft.com/office/drawing/2010/main" val="0"/>
+              </a:ext>
+            </a:extLst>
+          </a:blip>
+          <a:srcRect/>
+          <a:stretch>
+            <a:fillRect/>
+          </a:stretch>
+        </p:blipFill>
+        <p:spPr bwMode="auto">
+          <a:xfrm rot="288563">
+            <a:off x="2429554" y="4025453"/>
+            <a:ext cx="4005935" cy="2002968"/>
+          </a:xfrm>
+          <a:prstGeom prst="rect">
+            <a:avLst/>
+          </a:prstGeom>
+          <a:noFill/>
+          <a:extLst>
+            <a:ext uri="{909E8E84-426E-40DD-AFC4-6F175D3DCCD1}">
+              <a14:hiddenFill xmlns:a14="http://schemas.microsoft.com/office/drawing/2010/main">
+                <a:solidFill>
+                  <a:srgbClr val="FFFFFF"/>
+                </a:solidFill>
+              </a14:hiddenFill>
+            </a:ext>
+          </a:extLst>
+        </p:spPr>
+      </p:pic>
     </p:spTree>
     <p:extLst>
       <p:ext uri="{BB962C8B-B14F-4D97-AF65-F5344CB8AC3E}">
-        <p14:creationId xmlns:p14="http://schemas.microsoft.com/office/powerpoint/2010/main" val="1824058381"/>
+        <p14:creationId xmlns:p14="http://schemas.microsoft.com/office/powerpoint/2010/main" val="775879315"/>
       </p:ext>
     </p:extLst>
   </p:cSld>
@@ -6584,7 +6437,7 @@
         </p:nvSpPr>
         <p:spPr>
           <a:xfrm>
-            <a:off x="467544" y="548680"/>
+            <a:off x="395536" y="764704"/>
             <a:ext cx="8229600" cy="1143000"/>
           </a:xfrm>
         </p:spPr>
@@ -6595,48 +6448,86 @@
             <a:pPr algn="ctr"/>
             <a:r>
               <a:rPr lang="es-ES" b="1" dirty="0" smtClean="0"/>
-              <a:t>DIAGRAMA DE ESTADO </a:t>
+              <a:t>DIAGRAMAS DE UML</a:t>
             </a:r>
             <a:endParaRPr lang="es-ES" b="1" dirty="0"/>
           </a:p>
         </p:txBody>
       </p:sp>
-      <p:pic>
-        <p:nvPicPr>
-          <p:cNvPr id="4" name="0 Imagen"/>
-          <p:cNvPicPr>
-            <a:picLocks noGrp="1"/>
-          </p:cNvPicPr>
+      <p:sp>
+        <p:nvSpPr>
+          <p:cNvPr id="3" name="2 Marcador de contenido"/>
+          <p:cNvSpPr>
+            <a:spLocks noGrp="1"/>
+          </p:cNvSpPr>
           <p:nvPr>
             <p:ph idx="1"/>
           </p:nvPr>
-        </p:nvPicPr>
-        <p:blipFill>
-          <a:blip r:embed="rId2">
-            <a:extLst>
-              <a:ext uri="{28A0092B-C50C-407E-A947-70E740481C1C}">
-                <a14:useLocalDpi xmlns:a14="http://schemas.microsoft.com/office/drawing/2010/main" val="0"/>
-              </a:ext>
-            </a:extLst>
-          </a:blip>
-          <a:stretch>
-            <a:fillRect/>
-          </a:stretch>
-        </p:blipFill>
+        </p:nvSpPr>
         <p:spPr>
           <a:xfrm>
-            <a:off x="0" y="2132856"/>
-            <a:ext cx="9144000" cy="4824536"/>
-          </a:xfrm>
-          <a:prstGeom prst="rect">
-            <a:avLst/>
-          </a:prstGeom>
-        </p:spPr>
-      </p:pic>
+            <a:off x="539552" y="1916832"/>
+            <a:ext cx="8229600" cy="4389120"/>
+          </a:xfrm>
+        </p:spPr>
+        <p:txBody>
+          <a:bodyPr>
+            <a:normAutofit/>
+          </a:bodyPr>
+          <a:lstStyle/>
+          <a:p>
+            <a:endParaRPr lang="es-ES" dirty="0" smtClean="0"/>
+          </a:p>
+          <a:p>
+            <a:pPr marL="0" indent="0" algn="ctr">
+              <a:buNone/>
+            </a:pPr>
+            <a:r>
+              <a:rPr lang="es-ES" dirty="0" smtClean="0"/>
+              <a:t>UML </a:t>
+            </a:r>
+            <a:r>
+              <a:rPr lang="es-ES" dirty="0"/>
+              <a:t>(Lenguaje unificado de Modelado) es un conjunto de normas y estándares gráficos respecto a cómo se deben representar los esquemas relativos al software.</a:t>
+            </a:r>
+          </a:p>
+          <a:p>
+            <a:pPr marL="0" indent="0" algn="ctr">
+              <a:buNone/>
+            </a:pPr>
+            <a:r>
+              <a:rPr lang="es-ES" dirty="0" smtClean="0"/>
+              <a:t>Mediante </a:t>
+            </a:r>
+            <a:r>
+              <a:rPr lang="es-ES" dirty="0"/>
+              <a:t>UML se pueden establecer </a:t>
+            </a:r>
+            <a:r>
+              <a:rPr lang="es-ES" dirty="0" smtClean="0"/>
+              <a:t>los       requerimientos </a:t>
+            </a:r>
+            <a:r>
+              <a:rPr lang="es-ES" dirty="0"/>
+              <a:t>y la estructura necesaria para desarrollar un sistema antes de codificarlo (escribirlo).</a:t>
+            </a:r>
+          </a:p>
+          <a:p>
+            <a:pPr marL="0" indent="0">
+              <a:buNone/>
+            </a:pPr>
+            <a:r>
+              <a:rPr lang="es-ES" dirty="0" smtClean="0"/>
+              <a:t> </a:t>
+            </a:r>
+            <a:endParaRPr lang="es-ES" dirty="0"/>
+          </a:p>
+        </p:txBody>
+      </p:sp>
     </p:spTree>
     <p:extLst>
       <p:ext uri="{BB962C8B-B14F-4D97-AF65-F5344CB8AC3E}">
-        <p14:creationId xmlns:p14="http://schemas.microsoft.com/office/powerpoint/2010/main" val="2096891796"/>
+        <p14:creationId xmlns:p14="http://schemas.microsoft.com/office/powerpoint/2010/main" val="1824058381"/>
       </p:ext>
     </p:extLst>
   </p:cSld>
@@ -6683,7 +6574,12 @@
             <p:ph type="title"/>
           </p:nvPr>
         </p:nvSpPr>
-        <p:spPr/>
+        <p:spPr>
+          <a:xfrm>
+            <a:off x="467544" y="548680"/>
+            <a:ext cx="8229600" cy="1143000"/>
+          </a:xfrm>
+        </p:spPr>
         <p:txBody>
           <a:bodyPr/>
           <a:lstStyle/>
@@ -6691,7 +6587,7 @@
             <a:pPr algn="ctr"/>
             <a:r>
               <a:rPr lang="es-ES" b="1" dirty="0" smtClean="0"/>
-              <a:t>Diagrama de clases</a:t>
+              <a:t>DIAGRAMA DE ESTADO </a:t>
             </a:r>
             <a:endParaRPr lang="es-ES" b="1" dirty="0"/>
           </a:p>
@@ -6708,7 +6604,7 @@
           </p:nvPr>
         </p:nvPicPr>
         <p:blipFill>
-          <a:blip r:embed="rId2" cstate="print">
+          <a:blip r:embed="rId2">
             <a:extLst>
               <a:ext uri="{28A0092B-C50C-407E-A947-70E740481C1C}">
                 <a14:useLocalDpi xmlns:a14="http://schemas.microsoft.com/office/drawing/2010/main" val="0"/>
@@ -6721,8 +6617,8 @@
         </p:blipFill>
         <p:spPr>
           <a:xfrm>
-            <a:off x="251521" y="1844825"/>
-            <a:ext cx="8413824" cy="4479776"/>
+            <a:off x="0" y="2132856"/>
+            <a:ext cx="9144000" cy="4824536"/>
           </a:xfrm>
           <a:prstGeom prst="rect">
             <a:avLst/>
@@ -6732,7 +6628,7 @@
     </p:spTree>
     <p:extLst>
       <p:ext uri="{BB962C8B-B14F-4D97-AF65-F5344CB8AC3E}">
-        <p14:creationId xmlns:p14="http://schemas.microsoft.com/office/powerpoint/2010/main" val="3535180068"/>
+        <p14:creationId xmlns:p14="http://schemas.microsoft.com/office/powerpoint/2010/main" val="2096891796"/>
       </p:ext>
     </p:extLst>
   </p:cSld>
@@ -6787,7 +6683,7 @@
             <a:pPr algn="ctr"/>
             <a:r>
               <a:rPr lang="es-ES" b="1" dirty="0" smtClean="0"/>
-              <a:t>DIAGRAMA DE PAQUETE</a:t>
+              <a:t>Diagrama de clases</a:t>
             </a:r>
             <a:endParaRPr lang="es-ES" b="1" dirty="0"/>
           </a:p>
@@ -6795,49 +6691,40 @@
       </p:sp>
       <p:pic>
         <p:nvPicPr>
-          <p:cNvPr id="1026" name="Picture 2" descr="C:\proyectoDeliberyApp\Diagramas\DiagramadePaquete.png"/>
+          <p:cNvPr id="4" name="0 Imagen"/>
           <p:cNvPicPr>
-            <a:picLocks noChangeAspect="1" noChangeArrowheads="1"/>
+            <a:picLocks noGrp="1"/>
           </p:cNvPicPr>
-          <p:nvPr/>
+          <p:nvPr>
+            <p:ph idx="1"/>
+          </p:nvPr>
         </p:nvPicPr>
         <p:blipFill>
-          <a:blip r:embed="rId2">
+          <a:blip r:embed="rId2" cstate="print">
             <a:extLst>
               <a:ext uri="{28A0092B-C50C-407E-A947-70E740481C1C}">
                 <a14:useLocalDpi xmlns:a14="http://schemas.microsoft.com/office/drawing/2010/main" val="0"/>
               </a:ext>
             </a:extLst>
           </a:blip>
-          <a:srcRect/>
           <a:stretch>
             <a:fillRect/>
           </a:stretch>
         </p:blipFill>
-        <p:spPr bwMode="auto">
+        <p:spPr>
           <a:xfrm>
-            <a:off x="539552" y="1916832"/>
-            <a:ext cx="8146154" cy="4426818"/>
+            <a:off x="251521" y="1844825"/>
+            <a:ext cx="8413824" cy="4479776"/>
           </a:xfrm>
           <a:prstGeom prst="rect">
             <a:avLst/>
           </a:prstGeom>
-          <a:noFill/>
-          <a:extLst>
-            <a:ext uri="{909E8E84-426E-40DD-AFC4-6F175D3DCCD1}">
-              <a14:hiddenFill xmlns:a14="http://schemas.microsoft.com/office/drawing/2010/main">
-                <a:solidFill>
-                  <a:srgbClr val="FFFFFF"/>
-                </a:solidFill>
-              </a14:hiddenFill>
-            </a:ext>
-          </a:extLst>
         </p:spPr>
       </p:pic>
     </p:spTree>
     <p:extLst>
       <p:ext uri="{BB962C8B-B14F-4D97-AF65-F5344CB8AC3E}">
-        <p14:creationId xmlns:p14="http://schemas.microsoft.com/office/powerpoint/2010/main" val="3334885924"/>
+        <p14:creationId xmlns:p14="http://schemas.microsoft.com/office/powerpoint/2010/main" val="3535180068"/>
       </p:ext>
     </p:extLst>
   </p:cSld>
@@ -6886,8 +6773,37 @@
         </p:nvSpPr>
         <p:spPr>
           <a:xfrm>
-            <a:off x="323528" y="260648"/>
+            <a:off x="251520" y="188640"/>
             <a:ext cx="8229600" cy="1143000"/>
+          </a:xfrm>
+        </p:spPr>
+        <p:txBody>
+          <a:bodyPr/>
+          <a:lstStyle/>
+          <a:p>
+            <a:pPr algn="ctr"/>
+            <a:r>
+              <a:rPr lang="es-ES" b="1" dirty="0" smtClean="0"/>
+              <a:t>OBJETIVOS</a:t>
+            </a:r>
+            <a:endParaRPr lang="es-ES" b="1" dirty="0"/>
+          </a:p>
+        </p:txBody>
+      </p:sp>
+      <p:sp>
+        <p:nvSpPr>
+          <p:cNvPr id="3" name="2 Marcador de contenido"/>
+          <p:cNvSpPr>
+            <a:spLocks noGrp="1"/>
+          </p:cNvSpPr>
+          <p:nvPr>
+            <p:ph idx="1"/>
+          </p:nvPr>
+        </p:nvSpPr>
+        <p:spPr>
+          <a:xfrm>
+            <a:off x="467544" y="1628800"/>
+            <a:ext cx="8229600" cy="4389120"/>
           </a:xfrm>
         </p:spPr>
         <p:txBody>
@@ -6896,41 +6812,56 @@
           </a:bodyPr>
           <a:lstStyle/>
           <a:p>
-            <a:pPr algn="ctr"/>
-            <a:r>
-              <a:rPr lang="es-ES" b="1" dirty="0" smtClean="0"/>
-              <a:t>RECOLECCIÓN DE DATOS</a:t>
-            </a:r>
-            <a:endParaRPr lang="es-ES" b="1" dirty="0"/>
-          </a:p>
-        </p:txBody>
-      </p:sp>
-      <p:sp>
-        <p:nvSpPr>
-          <p:cNvPr id="3" name="2 Marcador de contenido"/>
-          <p:cNvSpPr>
-            <a:spLocks noGrp="1"/>
-          </p:cNvSpPr>
-          <p:nvPr>
-            <p:ph idx="1"/>
-          </p:nvPr>
-        </p:nvSpPr>
-        <p:spPr>
-          <a:xfrm>
-            <a:off x="395536" y="1628800"/>
-            <a:ext cx="8229600" cy="4389120"/>
-          </a:xfrm>
-        </p:spPr>
-        <p:txBody>
-          <a:bodyPr>
-            <a:normAutofit fontScale="85000" lnSpcReduction="20000"/>
-          </a:bodyPr>
-          <a:lstStyle/>
-          <a:p>
-            <a:pPr lvl="0"/>
             <a:r>
               <a:rPr lang="es-ES" dirty="0"/>
-              <a:t>¿De qué forma realizan </a:t>
+              <a:t>M</a:t>
+            </a:r>
+            <a:r>
+              <a:rPr lang="es-ES" dirty="0" smtClean="0"/>
+              <a:t>inimizar </a:t>
+            </a:r>
+            <a:r>
+              <a:rPr lang="es-ES" dirty="0"/>
+              <a:t>los problemas referentes a la gestión de pedidos de parte del </a:t>
+            </a:r>
+            <a:r>
+              <a:rPr lang="es-ES" dirty="0" smtClean="0"/>
+              <a:t>cliente.</a:t>
+            </a:r>
+          </a:p>
+          <a:p>
+            <a:r>
+              <a:rPr lang="es-ES" dirty="0"/>
+              <a:t>O</a:t>
+            </a:r>
+            <a:r>
+              <a:rPr lang="es-ES" dirty="0" smtClean="0"/>
+              <a:t>ptimizar </a:t>
+            </a:r>
+            <a:r>
+              <a:rPr lang="es-ES" dirty="0"/>
+              <a:t>la gestión de ventas del restaurante. </a:t>
+            </a:r>
+            <a:endParaRPr lang="es-ES" dirty="0" smtClean="0"/>
+          </a:p>
+          <a:p>
+            <a:r>
+              <a:rPr lang="es-ES" dirty="0"/>
+              <a:t>El beneficio con que cuenta el sistema es el de agilizar los pedidos de tal forma que no se pierda tiempo con las llamadas. </a:t>
+            </a:r>
+          </a:p>
+          <a:p>
+            <a:r>
+              <a:rPr lang="es-ES" dirty="0"/>
+              <a:t>La meta </a:t>
+            </a:r>
+            <a:r>
+              <a:rPr lang="es-ES" dirty="0" smtClean="0"/>
+              <a:t>es </a:t>
+            </a:r>
+            <a:r>
+              <a:rPr lang="es-ES" dirty="0"/>
+              <a:t>mejorar el servicio de </a:t>
             </a:r>
             <a:r>
               <a:rPr lang="es-ES" dirty="0" err="1"/>
@@ -6938,100 +6869,29 @@
             </a:r>
             <a:r>
               <a:rPr lang="es-ES" dirty="0"/>
-              <a:t>? </a:t>
-            </a:r>
-          </a:p>
-          <a:p>
-            <a:pPr lvl="0"/>
+              <a:t> </a:t>
+            </a:r>
+            <a:r>
+              <a:rPr lang="es-ES" dirty="0" smtClean="0"/>
+              <a:t> y </a:t>
+            </a:r>
             <a:r>
               <a:rPr lang="es-ES" dirty="0"/>
-              <a:t>¿Con cuántos personales cuentan?</a:t>
-            </a:r>
-          </a:p>
-          <a:p>
-            <a:pPr lvl="0"/>
-            <a:r>
-              <a:rPr lang="es-ES" dirty="0"/>
-              <a:t>¿Quién es el encargado de recibir los pedidos?</a:t>
-            </a:r>
-          </a:p>
-          <a:p>
-            <a:pPr lvl="0"/>
-            <a:r>
-              <a:rPr lang="es-ES" dirty="0"/>
-              <a:t>¿Cuáles son los datos que requieren para el pedido?</a:t>
-            </a:r>
-          </a:p>
-          <a:p>
-            <a:pPr lvl="0"/>
-            <a:r>
-              <a:rPr lang="es-ES" dirty="0"/>
-              <a:t>¿Existen algún inconveniente a la hora de recibir las llamadas?</a:t>
-            </a:r>
-          </a:p>
-          <a:p>
-            <a:pPr lvl="0"/>
-            <a:r>
-              <a:rPr lang="es-ES" dirty="0"/>
-              <a:t>¿Qué sucede en caso de que se corte la llamada?</a:t>
-            </a:r>
-          </a:p>
-          <a:p>
-            <a:pPr lvl="0"/>
-            <a:r>
-              <a:rPr lang="es-ES" dirty="0"/>
-              <a:t>¿Qué tipo de menú contiene su carta? ¿Cuáles son los más solicitados?</a:t>
-            </a:r>
-          </a:p>
-          <a:p>
-            <a:pPr lvl="0"/>
-            <a:r>
-              <a:rPr lang="es-ES" dirty="0"/>
-              <a:t>¿Qué tipo de publicidad utiliza para promocionar?</a:t>
-            </a:r>
-          </a:p>
-          <a:p>
-            <a:pPr lvl="0"/>
-            <a:r>
-              <a:rPr lang="es-ES" dirty="0"/>
-              <a:t>¿Realizan informes estadísticos?</a:t>
-            </a:r>
-          </a:p>
-          <a:p>
-            <a:pPr lvl="0"/>
-            <a:r>
-              <a:rPr lang="es-ES" dirty="0"/>
-              <a:t>¿Cuenta con un sistema para agilizar sus pedidos?</a:t>
-            </a:r>
-          </a:p>
-          <a:p>
-            <a:pPr lvl="0"/>
-            <a:r>
-              <a:rPr lang="es-ES" dirty="0"/>
-              <a:t>¿Te gustaría automatizar el proceso de </a:t>
-            </a:r>
-            <a:r>
-              <a:rPr lang="es-ES" dirty="0" err="1"/>
-              <a:t>delivery</a:t>
-            </a:r>
-            <a:r>
-              <a:rPr lang="es-ES" dirty="0"/>
-              <a:t>?</a:t>
-            </a:r>
-          </a:p>
-          <a:p>
-            <a:pPr lvl="0"/>
-            <a:r>
-              <a:rPr lang="es-ES" dirty="0"/>
-              <a:t>¿Qué le gustaría que contenga el sistema?</a:t>
-            </a:r>
+              <a:t>aumentar las ventas.</a:t>
+            </a:r>
+          </a:p>
+          <a:p>
+            <a:endParaRPr lang="es-ES" dirty="0"/>
+          </a:p>
+          <a:p>
+            <a:endParaRPr lang="es-ES" dirty="0"/>
           </a:p>
         </p:txBody>
       </p:sp>
     </p:spTree>
     <p:extLst>
       <p:ext uri="{BB962C8B-B14F-4D97-AF65-F5344CB8AC3E}">
-        <p14:creationId xmlns:p14="http://schemas.microsoft.com/office/powerpoint/2010/main" val="1211251010"/>
+        <p14:creationId xmlns:p14="http://schemas.microsoft.com/office/powerpoint/2010/main" val="2332958742"/>
       </p:ext>
     </p:extLst>
   </p:cSld>
@@ -7078,12 +6938,7 @@
             <p:ph type="title"/>
           </p:nvPr>
         </p:nvSpPr>
-        <p:spPr>
-          <a:xfrm>
-            <a:off x="395536" y="260648"/>
-            <a:ext cx="8229600" cy="1143000"/>
-          </a:xfrm>
-        </p:spPr>
+        <p:spPr/>
         <p:txBody>
           <a:bodyPr/>
           <a:lstStyle/>
@@ -7091,7 +6946,7 @@
             <a:pPr algn="ctr"/>
             <a:r>
               <a:rPr lang="es-ES" b="1" dirty="0" smtClean="0"/>
-              <a:t>Diagrama  de Secuencia</a:t>
+              <a:t>DIAGRAMA DE PAQUETE</a:t>
             </a:r>
             <a:endParaRPr lang="es-ES" b="1" dirty="0"/>
           </a:p>
@@ -7099,15 +6954,13 @@
       </p:sp>
       <p:pic>
         <p:nvPicPr>
-          <p:cNvPr id="4" name="0 Imagen"/>
+          <p:cNvPr id="1026" name="Picture 2" descr="C:\proyectoDeliberyApp\Diagramas\DiagramadePaquete.png"/>
           <p:cNvPicPr>
-            <a:picLocks noGrp="1"/>
+            <a:picLocks noChangeAspect="1" noChangeArrowheads="1"/>
           </p:cNvPicPr>
-          <p:nvPr>
-            <p:ph idx="1"/>
-          </p:nvPr>
+          <p:nvPr/>
         </p:nvPicPr>
-        <p:blipFill rotWithShape="1">
+        <p:blipFill>
           <a:blip r:embed="rId2">
             <a:extLst>
               <a:ext uri="{28A0092B-C50C-407E-A947-70E740481C1C}">
@@ -7115,22 +6968,27 @@
               </a:ext>
             </a:extLst>
           </a:blip>
-          <a:stretch/>
+          <a:srcRect/>
+          <a:stretch>
+            <a:fillRect/>
+          </a:stretch>
         </p:blipFill>
         <p:spPr bwMode="auto">
           <a:xfrm>
-            <a:off x="467544" y="1935163"/>
-            <a:ext cx="8280920" cy="4389437"/>
+            <a:off x="539552" y="1916832"/>
+            <a:ext cx="8146154" cy="4426818"/>
           </a:xfrm>
           <a:prstGeom prst="rect">
             <a:avLst/>
           </a:prstGeom>
-          <a:ln>
-            <a:noFill/>
-          </a:ln>
+          <a:noFill/>
           <a:extLst>
-            <a:ext uri="{53640926-AAD7-44D8-BBD7-CCE9431645EC}">
-              <a14:shadowObscured xmlns:a14="http://schemas.microsoft.com/office/drawing/2010/main"/>
+            <a:ext uri="{909E8E84-426E-40DD-AFC4-6F175D3DCCD1}">
+              <a14:hiddenFill xmlns:a14="http://schemas.microsoft.com/office/drawing/2010/main">
+                <a:solidFill>
+                  <a:srgbClr val="FFFFFF"/>
+                </a:solidFill>
+              </a14:hiddenFill>
             </a:ext>
           </a:extLst>
         </p:spPr>
@@ -7138,7 +6996,7 @@
     </p:spTree>
     <p:extLst>
       <p:ext uri="{BB962C8B-B14F-4D97-AF65-F5344CB8AC3E}">
-        <p14:creationId xmlns:p14="http://schemas.microsoft.com/office/powerpoint/2010/main" val="2581048928"/>
+        <p14:creationId xmlns:p14="http://schemas.microsoft.com/office/powerpoint/2010/main" val="3334885924"/>
       </p:ext>
     </p:extLst>
   </p:cSld>
@@ -7185,22 +7043,28 @@
             <p:ph type="title"/>
           </p:nvPr>
         </p:nvSpPr>
-        <p:spPr/>
+        <p:spPr>
+          <a:xfrm>
+            <a:off x="395536" y="260648"/>
+            <a:ext cx="8229600" cy="1143000"/>
+          </a:xfrm>
+        </p:spPr>
         <p:txBody>
           <a:bodyPr/>
           <a:lstStyle/>
           <a:p>
             <a:pPr algn="ctr"/>
             <a:r>
-              <a:rPr lang="es-ES" b="1" dirty="0"/>
+              <a:rPr lang="es-ES" b="1" dirty="0" smtClean="0"/>
               <a:t>Diagrama  de Secuencia</a:t>
             </a:r>
+            <a:endParaRPr lang="es-ES" b="1" dirty="0"/>
           </a:p>
         </p:txBody>
       </p:sp>
       <p:pic>
         <p:nvPicPr>
-          <p:cNvPr id="4" name="3 Marcador de contenido" descr="C:\Users\Usuario\Documents\Facu2016\Ing. de Software\Diagramas\DS_SistemaR.png"/>
+          <p:cNvPr id="4" name="0 Imagen"/>
           <p:cNvPicPr>
             <a:picLocks noGrp="1"/>
           </p:cNvPicPr>
@@ -7209,7 +7073,7 @@
           </p:nvPr>
         </p:nvPicPr>
         <p:blipFill rotWithShape="1">
-          <a:blip r:embed="rId2" cstate="print">
+          <a:blip r:embed="rId2">
             <a:extLst>
               <a:ext uri="{28A0092B-C50C-407E-A947-70E740481C1C}">
                 <a14:useLocalDpi xmlns:a14="http://schemas.microsoft.com/office/drawing/2010/main" val="0"/>
@@ -7220,13 +7084,12 @@
         </p:blipFill>
         <p:spPr bwMode="auto">
           <a:xfrm>
-            <a:off x="107504" y="1916832"/>
-            <a:ext cx="9505056" cy="6462389"/>
+            <a:off x="467544" y="1935163"/>
+            <a:ext cx="8280920" cy="4389437"/>
           </a:xfrm>
           <a:prstGeom prst="rect">
             <a:avLst/>
           </a:prstGeom>
-          <a:noFill/>
           <a:ln>
             <a:noFill/>
           </a:ln>
@@ -7240,7 +7103,7 @@
     </p:spTree>
     <p:extLst>
       <p:ext uri="{BB962C8B-B14F-4D97-AF65-F5344CB8AC3E}">
-        <p14:creationId xmlns:p14="http://schemas.microsoft.com/office/powerpoint/2010/main" val="1139938800"/>
+        <p14:creationId xmlns:p14="http://schemas.microsoft.com/office/powerpoint/2010/main" val="2581048928"/>
       </p:ext>
     </p:extLst>
   </p:cSld>
@@ -7294,42 +7157,55 @@
           <a:p>
             <a:pPr algn="ctr"/>
             <a:r>
-              <a:rPr lang="es-ES" dirty="0" smtClean="0"/>
-              <a:t>DIAGRAMA COMUNICACIÓN</a:t>
-            </a:r>
-            <a:endParaRPr lang="es-ES" dirty="0"/>
+              <a:rPr lang="es-ES" b="1" dirty="0"/>
+              <a:t>Diagrama  de Secuencia</a:t>
+            </a:r>
           </a:p>
         </p:txBody>
       </p:sp>
       <p:pic>
         <p:nvPicPr>
-          <p:cNvPr id="6" name="Marcador de contenido 5"/>
+          <p:cNvPr id="4" name="3 Marcador de contenido" descr="C:\Users\Usuario\Documents\Facu2016\Ing. de Software\Diagramas\DS_SistemaR.png"/>
           <p:cNvPicPr>
-            <a:picLocks noGrp="1" noChangeAspect="1"/>
+            <a:picLocks noGrp="1"/>
           </p:cNvPicPr>
           <p:nvPr>
             <p:ph idx="1"/>
           </p:nvPr>
         </p:nvPicPr>
         <p:blipFill rotWithShape="1">
-          <a:blip r:embed="rId2"/>
-          <a:srcRect l="30321" t="16542" r="3485" b="40501"/>
+          <a:blip r:embed="rId2" cstate="print">
+            <a:extLst>
+              <a:ext uri="{28A0092B-C50C-407E-A947-70E740481C1C}">
+                <a14:useLocalDpi xmlns:a14="http://schemas.microsoft.com/office/drawing/2010/main" val="0"/>
+              </a:ext>
+            </a:extLst>
+          </a:blip>
           <a:stretch/>
         </p:blipFill>
-        <p:spPr>
+        <p:spPr bwMode="auto">
           <a:xfrm>
-            <a:off x="899592" y="2060848"/>
-            <a:ext cx="7499500" cy="4104456"/>
+            <a:off x="107504" y="1863155"/>
+            <a:ext cx="9505056" cy="6462389"/>
           </a:xfrm>
           <a:prstGeom prst="rect">
             <a:avLst/>
           </a:prstGeom>
+          <a:noFill/>
+          <a:ln>
+            <a:noFill/>
+          </a:ln>
+          <a:extLst>
+            <a:ext uri="{53640926-AAD7-44D8-BBD7-CCE9431645EC}">
+              <a14:shadowObscured xmlns:a14="http://schemas.microsoft.com/office/drawing/2010/main"/>
+            </a:ext>
+          </a:extLst>
         </p:spPr>
       </p:pic>
     </p:spTree>
     <p:extLst>
       <p:ext uri="{BB962C8B-B14F-4D97-AF65-F5344CB8AC3E}">
-        <p14:creationId xmlns:p14="http://schemas.microsoft.com/office/powerpoint/2010/main" val="2993873915"/>
+        <p14:creationId xmlns:p14="http://schemas.microsoft.com/office/powerpoint/2010/main" val="1139938800"/>
       </p:ext>
     </p:extLst>
   </p:cSld>
@@ -7376,68 +7252,49 @@
             <p:ph type="title"/>
           </p:nvPr>
         </p:nvSpPr>
+        <p:spPr/>
+        <p:txBody>
+          <a:bodyPr/>
+          <a:lstStyle/>
+          <a:p>
+            <a:pPr algn="ctr"/>
+            <a:r>
+              <a:rPr lang="es-ES" dirty="0" smtClean="0"/>
+              <a:t>DIAGRAMA COMUNICACIÓN</a:t>
+            </a:r>
+            <a:endParaRPr lang="es-ES" dirty="0"/>
+          </a:p>
+        </p:txBody>
+      </p:sp>
+      <p:pic>
+        <p:nvPicPr>
+          <p:cNvPr id="6" name="Marcador de contenido 5"/>
+          <p:cNvPicPr>
+            <a:picLocks noGrp="1" noChangeAspect="1"/>
+          </p:cNvPicPr>
+          <p:nvPr>
+            <p:ph idx="1"/>
+          </p:nvPr>
+        </p:nvPicPr>
+        <p:blipFill rotWithShape="1">
+          <a:blip r:embed="rId2"/>
+          <a:srcRect l="30321" t="16542" r="3485" b="40501"/>
+          <a:stretch/>
+        </p:blipFill>
         <p:spPr>
           <a:xfrm>
-            <a:off x="395536" y="260648"/>
-            <a:ext cx="8229600" cy="1143000"/>
-          </a:xfrm>
-        </p:spPr>
-        <p:txBody>
-          <a:bodyPr/>
-          <a:lstStyle/>
-          <a:p>
-            <a:pPr algn="ctr"/>
-            <a:r>
-              <a:rPr lang="es-ES" b="1" dirty="0" smtClean="0"/>
-              <a:t>DIAGRAMA DE ACTIVIDAD</a:t>
-            </a:r>
-            <a:endParaRPr lang="es-ES" b="1" dirty="0"/>
-          </a:p>
-        </p:txBody>
-      </p:sp>
-      <p:pic>
-        <p:nvPicPr>
-          <p:cNvPr id="2050" name="Picture 2" descr="C:\proyectoDeliberyApp\caso de uso\CasoUsoSistema\ac2.png"/>
-          <p:cNvPicPr>
-            <a:picLocks noChangeAspect="1" noChangeArrowheads="1"/>
-          </p:cNvPicPr>
-          <p:nvPr/>
-        </p:nvPicPr>
-        <p:blipFill rotWithShape="1">
-          <a:blip r:embed="rId2">
-            <a:extLst>
-              <a:ext uri="{28A0092B-C50C-407E-A947-70E740481C1C}">
-                <a14:useLocalDpi xmlns:a14="http://schemas.microsoft.com/office/drawing/2010/main" val="0"/>
-              </a:ext>
-            </a:extLst>
-          </a:blip>
-          <a:srcRect l="15071" r="12717" b="34267"/>
-          <a:stretch/>
-        </p:blipFill>
-        <p:spPr bwMode="auto">
-          <a:xfrm>
-            <a:off x="971600" y="1472715"/>
-            <a:ext cx="7056784" cy="5359062"/>
+            <a:off x="899592" y="2060848"/>
+            <a:ext cx="7499500" cy="4104456"/>
           </a:xfrm>
           <a:prstGeom prst="rect">
             <a:avLst/>
           </a:prstGeom>
-          <a:noFill/>
-          <a:extLst>
-            <a:ext uri="{909E8E84-426E-40DD-AFC4-6F175D3DCCD1}">
-              <a14:hiddenFill xmlns:a14="http://schemas.microsoft.com/office/drawing/2010/main">
-                <a:solidFill>
-                  <a:srgbClr val="FFFFFF"/>
-                </a:solidFill>
-              </a14:hiddenFill>
-            </a:ext>
-          </a:extLst>
         </p:spPr>
       </p:pic>
     </p:spTree>
     <p:extLst>
       <p:ext uri="{BB962C8B-B14F-4D97-AF65-F5344CB8AC3E}">
-        <p14:creationId xmlns:p14="http://schemas.microsoft.com/office/powerpoint/2010/main" val="2291353528"/>
+        <p14:creationId xmlns:p14="http://schemas.microsoft.com/office/powerpoint/2010/main" val="2993873915"/>
       </p:ext>
     </p:extLst>
   </p:cSld>
@@ -7474,6 +7331,114 @@
           <a:chExt cx="0" cy="0"/>
         </a:xfrm>
       </p:grpSpPr>
+      <p:sp>
+        <p:nvSpPr>
+          <p:cNvPr id="2" name="1 Título"/>
+          <p:cNvSpPr>
+            <a:spLocks noGrp="1"/>
+          </p:cNvSpPr>
+          <p:nvPr>
+            <p:ph type="title"/>
+          </p:nvPr>
+        </p:nvSpPr>
+        <p:spPr>
+          <a:xfrm>
+            <a:off x="395536" y="260648"/>
+            <a:ext cx="8229600" cy="1143000"/>
+          </a:xfrm>
+        </p:spPr>
+        <p:txBody>
+          <a:bodyPr/>
+          <a:lstStyle/>
+          <a:p>
+            <a:pPr algn="ctr"/>
+            <a:r>
+              <a:rPr lang="es-ES" b="1" dirty="0" smtClean="0"/>
+              <a:t>DIAGRAMA DE ACTIVIDAD</a:t>
+            </a:r>
+            <a:endParaRPr lang="es-ES" b="1" dirty="0"/>
+          </a:p>
+        </p:txBody>
+      </p:sp>
+      <p:pic>
+        <p:nvPicPr>
+          <p:cNvPr id="2050" name="Picture 2" descr="C:\proyectoDeliberyApp\caso de uso\CasoUsoSistema\ac2.png"/>
+          <p:cNvPicPr>
+            <a:picLocks noChangeAspect="1" noChangeArrowheads="1"/>
+          </p:cNvPicPr>
+          <p:nvPr/>
+        </p:nvPicPr>
+        <p:blipFill rotWithShape="1">
+          <a:blip r:embed="rId2">
+            <a:extLst>
+              <a:ext uri="{28A0092B-C50C-407E-A947-70E740481C1C}">
+                <a14:useLocalDpi xmlns:a14="http://schemas.microsoft.com/office/drawing/2010/main" val="0"/>
+              </a:ext>
+            </a:extLst>
+          </a:blip>
+          <a:srcRect l="15071" r="12717" b="34267"/>
+          <a:stretch/>
+        </p:blipFill>
+        <p:spPr bwMode="auto">
+          <a:xfrm>
+            <a:off x="971600" y="1472715"/>
+            <a:ext cx="7056784" cy="5359062"/>
+          </a:xfrm>
+          <a:prstGeom prst="rect">
+            <a:avLst/>
+          </a:prstGeom>
+          <a:noFill/>
+          <a:extLst>
+            <a:ext uri="{909E8E84-426E-40DD-AFC4-6F175D3DCCD1}">
+              <a14:hiddenFill xmlns:a14="http://schemas.microsoft.com/office/drawing/2010/main">
+                <a:solidFill>
+                  <a:srgbClr val="FFFFFF"/>
+                </a:solidFill>
+              </a14:hiddenFill>
+            </a:ext>
+          </a:extLst>
+        </p:spPr>
+      </p:pic>
+    </p:spTree>
+    <p:extLst>
+      <p:ext uri="{BB962C8B-B14F-4D97-AF65-F5344CB8AC3E}">
+        <p14:creationId xmlns:p14="http://schemas.microsoft.com/office/powerpoint/2010/main" val="2291353528"/>
+      </p:ext>
+    </p:extLst>
+  </p:cSld>
+  <p:clrMapOvr>
+    <a:masterClrMapping/>
+  </p:clrMapOvr>
+  <p:transition spd="slow">
+    <p:wipe/>
+  </p:transition>
+  <p:timing>
+    <p:tnLst>
+      <p:par>
+        <p:cTn id="1" dur="indefinite" restart="never" nodeType="tmRoot"/>
+      </p:par>
+    </p:tnLst>
+  </p:timing>
+</p:sld>
+</file>
+
+<file path=ppt/slides/slide35.xml><?xml version="1.0" encoding="utf-8"?>
+<p:sld xmlns:a="http://schemas.openxmlformats.org/drawingml/2006/main" xmlns:r="http://schemas.openxmlformats.org/officeDocument/2006/relationships" xmlns:p="http://schemas.openxmlformats.org/presentationml/2006/main">
+  <p:cSld>
+    <p:spTree>
+      <p:nvGrpSpPr>
+        <p:cNvPr id="1" name=""/>
+        <p:cNvGrpSpPr/>
+        <p:nvPr/>
+      </p:nvGrpSpPr>
+      <p:grpSpPr>
+        <a:xfrm>
+          <a:off x="0" y="0"/>
+          <a:ext cx="0" cy="0"/>
+          <a:chOff x="0" y="0"/>
+          <a:chExt cx="0" cy="0"/>
+        </a:xfrm>
+      </p:grpSpPr>
       <p:pic>
         <p:nvPicPr>
           <p:cNvPr id="4" name="Picture 3" descr="C:\proyectoDeliberyApp\caso de uso\CasoUsoSistema\ac.png"/>
@@ -7572,7 +7537,7 @@
 </p:sld>
 </file>
 
-<file path=ppt/slides/slide35.xml><?xml version="1.0" encoding="utf-8"?>
+<file path=ppt/slides/slide36.xml><?xml version="1.0" encoding="utf-8"?>
 <p:sld xmlns:a="http://schemas.openxmlformats.org/drawingml/2006/main" xmlns:r="http://schemas.openxmlformats.org/officeDocument/2006/relationships" xmlns:p="http://schemas.openxmlformats.org/presentationml/2006/main">
   <p:cSld>
     <p:spTree>
@@ -7705,37 +7670,8 @@
         </p:nvSpPr>
         <p:spPr>
           <a:xfrm>
-            <a:off x="467544" y="188640"/>
+            <a:off x="323528" y="260648"/>
             <a:ext cx="8229600" cy="1143000"/>
-          </a:xfrm>
-        </p:spPr>
-        <p:txBody>
-          <a:bodyPr/>
-          <a:lstStyle/>
-          <a:p>
-            <a:pPr algn="ctr"/>
-            <a:r>
-              <a:rPr lang="es-ES" b="1" dirty="0" smtClean="0"/>
-              <a:t>ALCANCE</a:t>
-            </a:r>
-            <a:endParaRPr lang="es-ES" b="1" dirty="0"/>
-          </a:p>
-        </p:txBody>
-      </p:sp>
-      <p:sp>
-        <p:nvSpPr>
-          <p:cNvPr id="3" name="2 Marcador de contenido"/>
-          <p:cNvSpPr>
-            <a:spLocks noGrp="1"/>
-          </p:cNvSpPr>
-          <p:nvPr>
-            <p:ph idx="1"/>
-          </p:nvPr>
-        </p:nvSpPr>
-        <p:spPr>
-          <a:xfrm>
-            <a:off x="467544" y="1628800"/>
-            <a:ext cx="8229600" cy="4389120"/>
           </a:xfrm>
         </p:spPr>
         <p:txBody>
@@ -7744,20 +7680,41 @@
           </a:bodyPr>
           <a:lstStyle/>
           <a:p>
-            <a:pPr marL="0" indent="0" algn="ctr">
-              <a:buNone/>
-            </a:pPr>
-            <a:r>
-              <a:rPr lang="es-ES" dirty="0" err="1" smtClean="0"/>
-              <a:t>DeliverYApp</a:t>
-            </a:r>
-            <a:r>
-              <a:rPr lang="es-ES" dirty="0" smtClean="0"/>
-              <a:t> </a:t>
-            </a:r>
+            <a:pPr algn="ctr"/>
+            <a:r>
+              <a:rPr lang="es-ES" b="1" dirty="0" smtClean="0"/>
+              <a:t>RECOLECCIÓN DE DATOS</a:t>
+            </a:r>
+            <a:endParaRPr lang="es-ES" b="1" dirty="0"/>
+          </a:p>
+        </p:txBody>
+      </p:sp>
+      <p:sp>
+        <p:nvSpPr>
+          <p:cNvPr id="3" name="2 Marcador de contenido"/>
+          <p:cNvSpPr>
+            <a:spLocks noGrp="1"/>
+          </p:cNvSpPr>
+          <p:nvPr>
+            <p:ph idx="1"/>
+          </p:nvPr>
+        </p:nvSpPr>
+        <p:spPr>
+          <a:xfrm>
+            <a:off x="395536" y="1628800"/>
+            <a:ext cx="8229600" cy="4389120"/>
+          </a:xfrm>
+        </p:spPr>
+        <p:txBody>
+          <a:bodyPr>
+            <a:normAutofit fontScale="85000" lnSpcReduction="20000"/>
+          </a:bodyPr>
+          <a:lstStyle/>
+          <a:p>
+            <a:pPr lvl="0"/>
             <a:r>
               <a:rPr lang="es-ES" dirty="0"/>
-              <a:t>será un entorno web en el que se podrán registrar las empresas gastronómicas y así de esa forma poder ofrecer el servicio de </a:t>
+              <a:t>¿De qué forma realizan </a:t>
             </a:r>
             <a:r>
               <a:rPr lang="es-ES" dirty="0" err="1"/>
@@ -7765,18 +7722,100 @@
             </a:r>
             <a:r>
               <a:rPr lang="es-ES" dirty="0"/>
-              <a:t>, dicho sistema permitirá efectuar pedidos  del menú seleccionado por el cliente, una vez confirmado el pedido, la recepcionista recibe las notificaciones y se genera un nuevo pedido con estado pendiente, una vez que el menú se encuentra listo para su entrega, se efectuara el envió del pedido y este pasa a estado enviado, y por ultimo una vez cobrado se finaliza el pedido y este pasa a estado pagado.  </a:t>
-            </a:r>
-          </a:p>
-          <a:p>
-            <a:endParaRPr lang="es-ES" dirty="0"/>
+              <a:t>? </a:t>
+            </a:r>
+          </a:p>
+          <a:p>
+            <a:pPr lvl="0"/>
+            <a:r>
+              <a:rPr lang="es-ES" dirty="0"/>
+              <a:t>¿Con cuántos personales cuentan?</a:t>
+            </a:r>
+          </a:p>
+          <a:p>
+            <a:pPr lvl="0"/>
+            <a:r>
+              <a:rPr lang="es-ES" dirty="0"/>
+              <a:t>¿Quién es el encargado de recibir los pedidos?</a:t>
+            </a:r>
+          </a:p>
+          <a:p>
+            <a:pPr lvl="0"/>
+            <a:r>
+              <a:rPr lang="es-ES" dirty="0"/>
+              <a:t>¿Cuáles son los datos que requieren para el pedido?</a:t>
+            </a:r>
+          </a:p>
+          <a:p>
+            <a:pPr lvl="0"/>
+            <a:r>
+              <a:rPr lang="es-ES" dirty="0"/>
+              <a:t>¿Existen algún inconveniente a la hora de recibir las llamadas?</a:t>
+            </a:r>
+          </a:p>
+          <a:p>
+            <a:pPr lvl="0"/>
+            <a:r>
+              <a:rPr lang="es-ES" dirty="0"/>
+              <a:t>¿Qué sucede en caso de que se corte la llamada?</a:t>
+            </a:r>
+          </a:p>
+          <a:p>
+            <a:pPr lvl="0"/>
+            <a:r>
+              <a:rPr lang="es-ES" dirty="0"/>
+              <a:t>¿Qué tipo de menú contiene su carta? ¿Cuáles son los más solicitados?</a:t>
+            </a:r>
+          </a:p>
+          <a:p>
+            <a:pPr lvl="0"/>
+            <a:r>
+              <a:rPr lang="es-ES" dirty="0"/>
+              <a:t>¿Qué tipo de publicidad utiliza para promocionar?</a:t>
+            </a:r>
+          </a:p>
+          <a:p>
+            <a:pPr lvl="0"/>
+            <a:r>
+              <a:rPr lang="es-ES" dirty="0"/>
+              <a:t>¿Realizan informes estadísticos?</a:t>
+            </a:r>
+          </a:p>
+          <a:p>
+            <a:pPr lvl="0"/>
+            <a:r>
+              <a:rPr lang="es-ES" dirty="0"/>
+              <a:t>¿Cuenta con un sistema para agilizar sus pedidos?</a:t>
+            </a:r>
+          </a:p>
+          <a:p>
+            <a:pPr lvl="0"/>
+            <a:r>
+              <a:rPr lang="es-ES" dirty="0"/>
+              <a:t>¿Te gustaría automatizar el proceso de </a:t>
+            </a:r>
+            <a:r>
+              <a:rPr lang="es-ES" dirty="0" err="1"/>
+              <a:t>delivery</a:t>
+            </a:r>
+            <a:r>
+              <a:rPr lang="es-ES" dirty="0"/>
+              <a:t>?</a:t>
+            </a:r>
+          </a:p>
+          <a:p>
+            <a:pPr lvl="0"/>
+            <a:r>
+              <a:rPr lang="es-ES" dirty="0"/>
+              <a:t>¿Qué le gustaría que contenga el sistema?</a:t>
+            </a:r>
           </a:p>
         </p:txBody>
       </p:sp>
     </p:spTree>
     <p:extLst>
       <p:ext uri="{BB962C8B-B14F-4D97-AF65-F5344CB8AC3E}">
-        <p14:creationId xmlns:p14="http://schemas.microsoft.com/office/powerpoint/2010/main" val="2863240113"/>
+        <p14:creationId xmlns:p14="http://schemas.microsoft.com/office/powerpoint/2010/main" val="1211251010"/>
       </p:ext>
     </p:extLst>
   </p:cSld>
@@ -7825,7 +7864,7 @@
         </p:nvSpPr>
         <p:spPr>
           <a:xfrm>
-            <a:off x="467544" y="332656"/>
+            <a:off x="467544" y="188640"/>
             <a:ext cx="8229600" cy="1143000"/>
           </a:xfrm>
         </p:spPr>
@@ -7836,7 +7875,7 @@
             <a:pPr algn="ctr"/>
             <a:r>
               <a:rPr lang="es-ES" b="1" dirty="0" smtClean="0"/>
-              <a:t>DELIMITACIÓN</a:t>
+              <a:t>ALCANCE</a:t>
             </a:r>
             <a:endParaRPr lang="es-ES" b="1" dirty="0"/>
           </a:p>
@@ -7854,28 +7893,49 @@
         </p:nvSpPr>
         <p:spPr>
           <a:xfrm>
-            <a:off x="395536" y="2348880"/>
-            <a:ext cx="8229600" cy="2357616"/>
-          </a:xfrm>
-        </p:spPr>
-        <p:txBody>
-          <a:bodyPr/>
+            <a:off x="467544" y="1628800"/>
+            <a:ext cx="8229600" cy="4389120"/>
+          </a:xfrm>
+        </p:spPr>
+        <p:txBody>
+          <a:bodyPr>
+            <a:normAutofit/>
+          </a:bodyPr>
           <a:lstStyle/>
           <a:p>
             <a:pPr marL="0" indent="0" algn="ctr">
               <a:buNone/>
             </a:pPr>
             <a:r>
+              <a:rPr lang="es-ES" dirty="0" err="1" smtClean="0"/>
+              <a:t>DeliverYApp</a:t>
+            </a:r>
+            <a:r>
+              <a:rPr lang="es-ES" dirty="0" smtClean="0"/>
+              <a:t> </a:t>
+            </a:r>
+            <a:r>
               <a:rPr lang="es-ES" dirty="0"/>
-              <a:t>No contará con la funcionalidad de facturación y contabilidad.</a:t>
-            </a:r>
+              <a:t>será un entorno web en el que se podrán registrar las empresas gastronómicas y así de esa forma poder ofrecer el servicio de </a:t>
+            </a:r>
+            <a:r>
+              <a:rPr lang="es-ES" dirty="0" err="1"/>
+              <a:t>delivery</a:t>
+            </a:r>
+            <a:r>
+              <a:rPr lang="es-ES" dirty="0"/>
+              <a:t>, dicho sistema permitirá efectuar pedidos  del menú seleccionado por el cliente, una vez confirmado el pedido, la recepcionista recibe las notificaciones y se genera un nuevo pedido con estado pendiente, una vez que el menú se encuentra listo para su entrega, se efectuara el envió del pedido y este pasa a estado enviado, y por ultimo una vez cobrado se finaliza el pedido y este pasa a estado pagado.  </a:t>
+            </a:r>
+          </a:p>
+          <a:p>
+            <a:endParaRPr lang="es-ES" dirty="0"/>
           </a:p>
         </p:txBody>
       </p:sp>
     </p:spTree>
     <p:extLst>
       <p:ext uri="{BB962C8B-B14F-4D97-AF65-F5344CB8AC3E}">
-        <p14:creationId xmlns:p14="http://schemas.microsoft.com/office/powerpoint/2010/main" val="3236578636"/>
+        <p14:creationId xmlns:p14="http://schemas.microsoft.com/office/powerpoint/2010/main" val="2863240113"/>
       </p:ext>
     </p:extLst>
   </p:cSld>
@@ -7914,176 +7974,67 @@
       </p:grpSpPr>
       <p:sp>
         <p:nvSpPr>
-          <p:cNvPr id="3" name="2 Marcador de contenido"/>
-          <p:cNvSpPr>
-            <a:spLocks noGrp="1"/>
-          </p:cNvSpPr>
-          <p:nvPr>
-            <p:ph idx="1"/>
+          <p:cNvPr id="2" name="1 Título"/>
+          <p:cNvSpPr>
+            <a:spLocks noGrp="1"/>
+          </p:cNvSpPr>
+          <p:nvPr>
+            <p:ph type="title"/>
           </p:nvPr>
         </p:nvSpPr>
         <p:spPr>
           <a:xfrm>
-            <a:off x="428475" y="4142264"/>
-            <a:ext cx="8229600" cy="1728192"/>
-          </a:xfrm>
-        </p:spPr>
-        <p:txBody>
-          <a:bodyPr>
-            <a:noAutofit/>
-          </a:bodyPr>
+            <a:off x="467544" y="332656"/>
+            <a:ext cx="8229600" cy="1143000"/>
+          </a:xfrm>
+        </p:spPr>
+        <p:txBody>
+          <a:bodyPr/>
+          <a:lstStyle/>
+          <a:p>
+            <a:pPr algn="ctr"/>
+            <a:r>
+              <a:rPr lang="es-ES" b="1" dirty="0" smtClean="0"/>
+              <a:t>DELIMITACIÓN</a:t>
+            </a:r>
+            <a:endParaRPr lang="es-ES" b="1" dirty="0"/>
+          </a:p>
+        </p:txBody>
+      </p:sp>
+      <p:sp>
+        <p:nvSpPr>
+          <p:cNvPr id="3" name="2 Marcador de contenido"/>
+          <p:cNvSpPr>
+            <a:spLocks noGrp="1"/>
+          </p:cNvSpPr>
+          <p:nvPr>
+            <p:ph idx="1"/>
+          </p:nvPr>
+        </p:nvSpPr>
+        <p:spPr>
+          <a:xfrm>
+            <a:off x="395536" y="2348880"/>
+            <a:ext cx="8229600" cy="2357616"/>
+          </a:xfrm>
+        </p:spPr>
+        <p:txBody>
+          <a:bodyPr/>
           <a:lstStyle/>
           <a:p>
             <a:pPr marL="0" indent="0" algn="ctr">
               <a:buNone/>
             </a:pPr>
             <a:r>
-              <a:rPr lang="es-ES" sz="2400" b="1" dirty="0"/>
-              <a:t> </a:t>
-            </a:r>
-            <a:r>
-              <a:rPr lang="es-ES" sz="2400" b="1" dirty="0" err="1" smtClean="0"/>
-              <a:t>Rup</a:t>
-            </a:r>
-            <a:r>
-              <a:rPr lang="es-ES" sz="2400" b="1" dirty="0" smtClean="0"/>
-              <a:t>: </a:t>
-            </a:r>
-            <a:r>
-              <a:rPr lang="es-ES" sz="2400" dirty="0" smtClean="0"/>
-              <a:t>Es </a:t>
-            </a:r>
-            <a:r>
-              <a:rPr lang="es-ES" sz="2400" dirty="0"/>
-              <a:t>un proceso de ingeniería de software que suministra un enfoque para asignar tareas y responsabilidades dentro de una organización de desarrollo. </a:t>
-            </a:r>
-            <a:endParaRPr lang="es-ES" sz="2400" dirty="0">
-              <a:solidFill>
-                <a:srgbClr val="FF0000"/>
-              </a:solidFill>
-            </a:endParaRPr>
-          </a:p>
-        </p:txBody>
-      </p:sp>
-      <p:sp>
-        <p:nvSpPr>
-          <p:cNvPr id="4" name="3 Rectángulo"/>
-          <p:cNvSpPr/>
-          <p:nvPr/>
-        </p:nvSpPr>
-        <p:spPr>
-          <a:xfrm>
-            <a:off x="2257275" y="2348880"/>
-            <a:ext cx="4572000" cy="369332"/>
-          </a:xfrm>
-          <a:prstGeom prst="rect">
-            <a:avLst/>
-          </a:prstGeom>
-        </p:spPr>
-        <p:txBody>
-          <a:bodyPr>
-            <a:spAutoFit/>
-          </a:bodyPr>
-          <a:lstStyle/>
-          <a:p>
-            <a:pPr lvl="0"/>
-            <a:endParaRPr lang="es-ES" dirty="0"/>
-          </a:p>
-        </p:txBody>
-      </p:sp>
-      <p:pic>
-        <p:nvPicPr>
-          <p:cNvPr id="5" name="4 Imagen" descr="http://3.bp.blogspot.com/-LOTkmId64iw/T-zkt6BHoaI/AAAAAAAAAAk/EavFyWr7spA/s1600/20090309-RUP.png">
-            <a:hlinkClick r:id="rId2"/>
-          </p:cNvPr>
-          <p:cNvPicPr/>
-          <p:nvPr/>
-        </p:nvPicPr>
-        <p:blipFill>
-          <a:blip r:embed="rId3">
-            <a:extLst>
-              <a:ext uri="{28A0092B-C50C-407E-A947-70E740481C1C}">
-                <a14:useLocalDpi xmlns:a14="http://schemas.microsoft.com/office/drawing/2010/main" val="0"/>
-              </a:ext>
-            </a:extLst>
-          </a:blip>
-          <a:srcRect/>
-          <a:stretch>
-            <a:fillRect/>
-          </a:stretch>
-        </p:blipFill>
-        <p:spPr bwMode="auto">
-          <a:xfrm rot="20173433">
-            <a:off x="3510225" y="1594684"/>
-            <a:ext cx="2376264" cy="2160240"/>
-          </a:xfrm>
-          <a:prstGeom prst="rect">
-            <a:avLst/>
-          </a:prstGeom>
-          <a:noFill/>
-          <a:ln>
-            <a:noFill/>
-          </a:ln>
-        </p:spPr>
-      </p:pic>
-      <p:sp>
-        <p:nvSpPr>
-          <p:cNvPr id="6" name="1 Título"/>
-          <p:cNvSpPr txBox="1">
-            <a:spLocks/>
-          </p:cNvSpPr>
-          <p:nvPr/>
-        </p:nvSpPr>
-        <p:spPr>
-          <a:xfrm>
-            <a:off x="583557" y="476672"/>
-            <a:ext cx="8229600" cy="1143000"/>
-          </a:xfrm>
-          <a:prstGeom prst="rect">
-            <a:avLst/>
-          </a:prstGeom>
-        </p:spPr>
-        <p:txBody>
-          <a:bodyPr vert="horz" lIns="91440" tIns="45720" rIns="91440" bIns="45720" rtlCol="0" anchor="ctr">
-            <a:normAutofit fontScale="92500"/>
-          </a:bodyPr>
-          <a:lstStyle>
-            <a:lvl1pPr algn="ctr" defTabSz="914400" rtl="0" eaLnBrk="1" latinLnBrk="0" hangingPunct="1">
-              <a:spcBef>
-                <a:spcPct val="0"/>
-              </a:spcBef>
-              <a:buNone/>
-              <a:defRPr sz="4400" kern="1200">
-                <a:solidFill>
-                  <a:schemeClr val="tx1"/>
-                </a:solidFill>
-                <a:latin typeface="+mj-lt"/>
-                <a:ea typeface="+mj-ea"/>
-                <a:cs typeface="+mj-cs"/>
-              </a:defRPr>
-            </a:lvl1pPr>
-          </a:lstStyle>
-          <a:p>
-            <a:r>
-              <a:rPr lang="es-ES" sz="5000" b="1" dirty="0" smtClean="0">
-                <a:solidFill>
-                  <a:schemeClr val="tx2"/>
-                </a:solidFill>
-              </a:rPr>
-              <a:t>METODOLOGÍA DE DESARROLLO</a:t>
-            </a:r>
-            <a:endParaRPr lang="es-ES" sz="5000" b="1" dirty="0">
-              <a:solidFill>
-                <a:schemeClr val="tx2"/>
-              </a:solidFill>
-            </a:endParaRPr>
+              <a:rPr lang="es-ES" dirty="0"/>
+              <a:t>No contará con la funcionalidad de facturación y contabilidad.</a:t>
+            </a:r>
           </a:p>
         </p:txBody>
       </p:sp>
     </p:spTree>
     <p:extLst>
       <p:ext uri="{BB962C8B-B14F-4D97-AF65-F5344CB8AC3E}">
-        <p14:creationId xmlns:p14="http://schemas.microsoft.com/office/powerpoint/2010/main" val="1597276559"/>
+        <p14:creationId xmlns:p14="http://schemas.microsoft.com/office/powerpoint/2010/main" val="3236578636"/>
       </p:ext>
     </p:extLst>
   </p:cSld>
@@ -8122,73 +8073,176 @@
       </p:grpSpPr>
       <p:sp>
         <p:nvSpPr>
-          <p:cNvPr id="2" name="1 Título"/>
-          <p:cNvSpPr>
-            <a:spLocks noGrp="1"/>
-          </p:cNvSpPr>
-          <p:nvPr>
-            <p:ph type="title"/>
-          </p:nvPr>
-        </p:nvSpPr>
-        <p:spPr/>
+          <p:cNvPr id="3" name="2 Marcador de contenido"/>
+          <p:cNvSpPr>
+            <a:spLocks noGrp="1"/>
+          </p:cNvSpPr>
+          <p:nvPr>
+            <p:ph idx="1"/>
+          </p:nvPr>
+        </p:nvSpPr>
+        <p:spPr>
+          <a:xfrm>
+            <a:off x="428475" y="4142264"/>
+            <a:ext cx="8229600" cy="1728192"/>
+          </a:xfrm>
+        </p:spPr>
         <p:txBody>
           <a:bodyPr>
-            <a:normAutofit fontScale="90000"/>
+            <a:noAutofit/>
           </a:bodyPr>
           <a:lstStyle/>
           <a:p>
-            <a:pPr algn="ctr"/>
-            <a:r>
-              <a:rPr lang="es-ES" b="1" dirty="0" smtClean="0"/>
-              <a:t>TIPO DE PROCESO</a:t>
-            </a:r>
-            <a:br>
-              <a:rPr lang="es-ES" b="1" dirty="0" smtClean="0"/>
-            </a:br>
-            <a:r>
-              <a:rPr lang="es-ES" b="1" i="1" u="sng" dirty="0" smtClean="0"/>
-              <a:t>Espiral</a:t>
-            </a:r>
-            <a:endParaRPr lang="es-ES" b="1" i="1" u="sng" dirty="0"/>
+            <a:pPr marL="0" indent="0" algn="ctr">
+              <a:buNone/>
+            </a:pPr>
+            <a:r>
+              <a:rPr lang="es-ES" sz="2400" b="1" dirty="0"/>
+              <a:t> </a:t>
+            </a:r>
+            <a:r>
+              <a:rPr lang="es-ES" sz="2400" b="1" dirty="0" err="1" smtClean="0"/>
+              <a:t>Rup</a:t>
+            </a:r>
+            <a:r>
+              <a:rPr lang="es-ES" sz="2400" b="1" dirty="0" smtClean="0"/>
+              <a:t>: </a:t>
+            </a:r>
+            <a:r>
+              <a:rPr lang="es-ES" sz="2400" dirty="0" smtClean="0"/>
+              <a:t>Es </a:t>
+            </a:r>
+            <a:r>
+              <a:rPr lang="es-ES" sz="2400" dirty="0"/>
+              <a:t>un proceso de ingeniería de software que suministra un enfoque para asignar tareas y responsabilidades dentro de una organización de desarrollo. </a:t>
+            </a:r>
+            <a:endParaRPr lang="es-ES" sz="2400" dirty="0">
+              <a:solidFill>
+                <a:srgbClr val="FF0000"/>
+              </a:solidFill>
+            </a:endParaRPr>
+          </a:p>
+        </p:txBody>
+      </p:sp>
+      <p:sp>
+        <p:nvSpPr>
+          <p:cNvPr id="4" name="3 Rectángulo"/>
+          <p:cNvSpPr/>
+          <p:nvPr/>
+        </p:nvSpPr>
+        <p:spPr>
+          <a:xfrm>
+            <a:off x="2257275" y="2348880"/>
+            <a:ext cx="4572000" cy="369332"/>
+          </a:xfrm>
+          <a:prstGeom prst="rect">
+            <a:avLst/>
+          </a:prstGeom>
+        </p:spPr>
+        <p:txBody>
+          <a:bodyPr>
+            <a:spAutoFit/>
+          </a:bodyPr>
+          <a:lstStyle/>
+          <a:p>
+            <a:pPr lvl="0"/>
+            <a:endParaRPr lang="es-ES" dirty="0"/>
           </a:p>
         </p:txBody>
       </p:sp>
       <p:pic>
         <p:nvPicPr>
-          <p:cNvPr id="4" name="Marcador de contenido 3"/>
-          <p:cNvPicPr>
-            <a:picLocks noGrp="1" noChangeAspect="1"/>
-          </p:cNvPicPr>
-          <p:nvPr>
-            <p:ph idx="1"/>
-          </p:nvPr>
+          <p:cNvPr id="5" name="4 Imagen" descr="http://3.bp.blogspot.com/-LOTkmId64iw/T-zkt6BHoaI/AAAAAAAAAAk/EavFyWr7spA/s1600/20090309-RUP.png">
+            <a:hlinkClick r:id="rId2"/>
+          </p:cNvPr>
+          <p:cNvPicPr/>
+          <p:nvPr/>
         </p:nvPicPr>
         <p:blipFill>
-          <a:blip r:embed="rId2"/>
+          <a:blip r:embed="rId3">
+            <a:extLst>
+              <a:ext uri="{28A0092B-C50C-407E-A947-70E740481C1C}">
+                <a14:useLocalDpi xmlns:a14="http://schemas.microsoft.com/office/drawing/2010/main" val="0"/>
+              </a:ext>
+            </a:extLst>
+          </a:blip>
+          <a:srcRect/>
           <a:stretch>
             <a:fillRect/>
           </a:stretch>
         </p:blipFill>
-        <p:spPr>
-          <a:xfrm>
-            <a:off x="479523" y="1935163"/>
-            <a:ext cx="8184954" cy="4389437"/>
+        <p:spPr bwMode="auto">
+          <a:xfrm rot="20173433">
+            <a:off x="3510225" y="1594684"/>
+            <a:ext cx="2376264" cy="2160240"/>
           </a:xfrm>
           <a:prstGeom prst="rect">
             <a:avLst/>
           </a:prstGeom>
+          <a:noFill/>
           <a:ln>
             <a:noFill/>
           </a:ln>
-          <a:effectLst>
-            <a:softEdge rad="112500"/>
-          </a:effectLst>
         </p:spPr>
       </p:pic>
+      <p:sp>
+        <p:nvSpPr>
+          <p:cNvPr id="6" name="1 Título"/>
+          <p:cNvSpPr txBox="1">
+            <a:spLocks/>
+          </p:cNvSpPr>
+          <p:nvPr/>
+        </p:nvSpPr>
+        <p:spPr>
+          <a:xfrm>
+            <a:off x="583557" y="476672"/>
+            <a:ext cx="8229600" cy="1143000"/>
+          </a:xfrm>
+          <a:prstGeom prst="rect">
+            <a:avLst/>
+          </a:prstGeom>
+        </p:spPr>
+        <p:txBody>
+          <a:bodyPr vert="horz" lIns="91440" tIns="45720" rIns="91440" bIns="45720" rtlCol="0" anchor="ctr">
+            <a:normAutofit fontScale="92500"/>
+          </a:bodyPr>
+          <a:lstStyle>
+            <a:lvl1pPr algn="ctr" defTabSz="914400" rtl="0" eaLnBrk="1" latinLnBrk="0" hangingPunct="1">
+              <a:spcBef>
+                <a:spcPct val="0"/>
+              </a:spcBef>
+              <a:buNone/>
+              <a:defRPr sz="4400" kern="1200">
+                <a:solidFill>
+                  <a:schemeClr val="tx1"/>
+                </a:solidFill>
+                <a:latin typeface="+mj-lt"/>
+                <a:ea typeface="+mj-ea"/>
+                <a:cs typeface="+mj-cs"/>
+              </a:defRPr>
+            </a:lvl1pPr>
+          </a:lstStyle>
+          <a:p>
+            <a:r>
+              <a:rPr lang="es-ES" sz="5000" b="1" dirty="0" smtClean="0">
+                <a:solidFill>
+                  <a:schemeClr val="tx2"/>
+                </a:solidFill>
+              </a:rPr>
+              <a:t>METODOLOGÍA DE DESARROLLO</a:t>
+            </a:r>
+            <a:endParaRPr lang="es-ES" sz="5000" b="1" dirty="0">
+              <a:solidFill>
+                <a:schemeClr val="tx2"/>
+              </a:solidFill>
+            </a:endParaRPr>
+          </a:p>
+        </p:txBody>
+      </p:sp>
     </p:spTree>
     <p:extLst>
       <p:ext uri="{BB962C8B-B14F-4D97-AF65-F5344CB8AC3E}">
-        <p14:creationId xmlns:p14="http://schemas.microsoft.com/office/powerpoint/2010/main" val="3247909255"/>
+        <p14:creationId xmlns:p14="http://schemas.microsoft.com/office/powerpoint/2010/main" val="1597276559"/>
       </p:ext>
     </p:extLst>
   </p:cSld>
@@ -8235,67 +8289,65 @@
             <p:ph type="title"/>
           </p:nvPr>
         </p:nvSpPr>
+        <p:spPr/>
+        <p:txBody>
+          <a:bodyPr>
+            <a:normAutofit fontScale="90000"/>
+          </a:bodyPr>
+          <a:lstStyle/>
+          <a:p>
+            <a:pPr algn="ctr"/>
+            <a:r>
+              <a:rPr lang="es-ES" b="1" dirty="0" smtClean="0"/>
+              <a:t>TIPO DE PROCESO</a:t>
+            </a:r>
+            <a:br>
+              <a:rPr lang="es-ES" b="1" dirty="0" smtClean="0"/>
+            </a:br>
+            <a:r>
+              <a:rPr lang="es-ES" b="1" i="1" u="sng" dirty="0" smtClean="0"/>
+              <a:t>Espiral</a:t>
+            </a:r>
+            <a:endParaRPr lang="es-ES" b="1" i="1" u="sng" dirty="0"/>
+          </a:p>
+        </p:txBody>
+      </p:sp>
+      <p:pic>
+        <p:nvPicPr>
+          <p:cNvPr id="4" name="Marcador de contenido 3"/>
+          <p:cNvPicPr>
+            <a:picLocks noGrp="1" noChangeAspect="1"/>
+          </p:cNvPicPr>
+          <p:nvPr>
+            <p:ph idx="1"/>
+          </p:nvPr>
+        </p:nvPicPr>
+        <p:blipFill>
+          <a:blip r:embed="rId2"/>
+          <a:stretch>
+            <a:fillRect/>
+          </a:stretch>
+        </p:blipFill>
         <p:spPr>
           <a:xfrm>
-            <a:off x="0" y="836712"/>
-            <a:ext cx="9144000" cy="566936"/>
-          </a:xfrm>
-        </p:spPr>
-        <p:txBody>
-          <a:bodyPr>
-            <a:noAutofit/>
-          </a:bodyPr>
-          <a:lstStyle/>
-          <a:p>
-            <a:pPr algn="ctr"/>
-            <a:r>
-              <a:rPr lang="es-ES" sz="3600" b="1" dirty="0" smtClean="0"/>
-              <a:t>MODELADO DE REQUERIMIENTO DE NEGOCIO</a:t>
-            </a:r>
-            <a:endParaRPr lang="es-ES" sz="3600" b="1" dirty="0"/>
-          </a:p>
-        </p:txBody>
-      </p:sp>
-      <p:sp>
-        <p:nvSpPr>
-          <p:cNvPr id="3" name="2 Marcador de contenido"/>
-          <p:cNvSpPr>
-            <a:spLocks noGrp="1"/>
-          </p:cNvSpPr>
-          <p:nvPr>
-            <p:ph idx="1"/>
-          </p:nvPr>
-        </p:nvSpPr>
-        <p:spPr>
-          <a:xfrm>
-            <a:off x="467544" y="1772816"/>
-            <a:ext cx="8229600" cy="4389120"/>
-          </a:xfrm>
-        </p:spPr>
-        <p:txBody>
-          <a:bodyPr>
-            <a:normAutofit fontScale="85000" lnSpcReduction="10000"/>
-          </a:bodyPr>
-          <a:lstStyle/>
-          <a:p>
-            <a:pPr marL="0" indent="0" algn="ctr">
-              <a:buNone/>
-            </a:pPr>
-            <a:r>
-              <a:rPr lang="es-ES" dirty="0" smtClean="0"/>
-              <a:t>El </a:t>
-            </a:r>
-            <a:r>
-              <a:rPr lang="es-ES" dirty="0"/>
-              <a:t>cliente llama al negocio, la  recepcionista atiende la llamada y le consulta sobre su necesidad, el cliente si no conoce el menú o lo que le gustaría consumir pregunta sobre el menú vigente, la  recepcionista le dicta el menú, posteriormente el cliente elige según su preferencia, la  recepcionista pregunta si está satisfecho con su pedido o si le gustaría agregar algo más, el cliente pide algo mas o solo confirma el pedido, la  recepcionista solicita los datos personales del cliente como: nombre, número de teléfono y dirección, una vez obtenido los datos la  recepcionista le comunica el monto total y pregunta si tiene cambio, el cliente le contesta y finaliza la llamada, el pedido es pasado de la recepción a la cocina en donde se prepara, luego de elaborar completamente el pedido, se le entrega al repartidor para enviarle al cliente su pedido y cobrar.</a:t>
-            </a:r>
-          </a:p>
-        </p:txBody>
-      </p:sp>
+            <a:off x="479523" y="1935163"/>
+            <a:ext cx="8184954" cy="4389437"/>
+          </a:xfrm>
+          <a:prstGeom prst="rect">
+            <a:avLst/>
+          </a:prstGeom>
+          <a:ln>
+            <a:noFill/>
+          </a:ln>
+          <a:effectLst>
+            <a:softEdge rad="112500"/>
+          </a:effectLst>
+        </p:spPr>
+      </p:pic>
     </p:spTree>
     <p:extLst>
       <p:ext uri="{BB962C8B-B14F-4D97-AF65-F5344CB8AC3E}">
-        <p14:creationId xmlns:p14="http://schemas.microsoft.com/office/powerpoint/2010/main" val="1583529480"/>
+        <p14:creationId xmlns:p14="http://schemas.microsoft.com/office/powerpoint/2010/main" val="3247909255"/>
       </p:ext>
     </p:extLst>
   </p:cSld>
@@ -8332,49 +8384,77 @@
           <a:chExt cx="0" cy="0"/>
         </a:xfrm>
       </p:grpSpPr>
-      <p:pic>
-        <p:nvPicPr>
-          <p:cNvPr id="4" name="0 Imagen"/>
-          <p:cNvPicPr>
-            <a:picLocks noGrp="1"/>
-          </p:cNvPicPr>
-          <p:nvPr>
-            <p:ph idx="1"/>
-          </p:nvPr>
-        </p:nvPicPr>
-        <p:blipFill rotWithShape="1">
-          <a:blip r:embed="rId2">
-            <a:extLst>
-              <a:ext uri="{28A0092B-C50C-407E-A947-70E740481C1C}">
-                <a14:useLocalDpi xmlns:a14="http://schemas.microsoft.com/office/drawing/2010/main" val="0"/>
-              </a:ext>
-            </a:extLst>
-          </a:blip>
-          <a:srcRect r="2149" b="44641"/>
-          <a:stretch/>
-        </p:blipFill>
-        <p:spPr bwMode="auto">
+      <p:sp>
+        <p:nvSpPr>
+          <p:cNvPr id="2" name="1 Título"/>
+          <p:cNvSpPr>
+            <a:spLocks noGrp="1"/>
+          </p:cNvSpPr>
+          <p:nvPr>
+            <p:ph type="title"/>
+          </p:nvPr>
+        </p:nvSpPr>
+        <p:spPr>
           <a:xfrm>
             <a:off x="0" y="836712"/>
-            <a:ext cx="9144000" cy="5904656"/>
-          </a:xfrm>
-          <a:prstGeom prst="rect">
-            <a:avLst/>
-          </a:prstGeom>
-          <a:ln>
-            <a:noFill/>
-          </a:ln>
-          <a:extLst>
-            <a:ext uri="{53640926-AAD7-44D8-BBD7-CCE9431645EC}">
-              <a14:shadowObscured xmlns:a14="http://schemas.microsoft.com/office/drawing/2010/main"/>
-            </a:ext>
-          </a:extLst>
-        </p:spPr>
-      </p:pic>
+            <a:ext cx="9144000" cy="566936"/>
+          </a:xfrm>
+        </p:spPr>
+        <p:txBody>
+          <a:bodyPr>
+            <a:noAutofit/>
+          </a:bodyPr>
+          <a:lstStyle/>
+          <a:p>
+            <a:pPr algn="ctr"/>
+            <a:r>
+              <a:rPr lang="es-ES" sz="3600" b="1" dirty="0" smtClean="0"/>
+              <a:t>MODELADO DE REQUERIMIENTO DE NEGOCIO</a:t>
+            </a:r>
+            <a:endParaRPr lang="es-ES" sz="3600" b="1" dirty="0"/>
+          </a:p>
+        </p:txBody>
+      </p:sp>
+      <p:sp>
+        <p:nvSpPr>
+          <p:cNvPr id="3" name="2 Marcador de contenido"/>
+          <p:cNvSpPr>
+            <a:spLocks noGrp="1"/>
+          </p:cNvSpPr>
+          <p:nvPr>
+            <p:ph idx="1"/>
+          </p:nvPr>
+        </p:nvSpPr>
+        <p:spPr>
+          <a:xfrm>
+            <a:off x="467544" y="1772816"/>
+            <a:ext cx="8229600" cy="4389120"/>
+          </a:xfrm>
+        </p:spPr>
+        <p:txBody>
+          <a:bodyPr>
+            <a:normAutofit fontScale="85000" lnSpcReduction="10000"/>
+          </a:bodyPr>
+          <a:lstStyle/>
+          <a:p>
+            <a:pPr marL="0" indent="0" algn="ctr">
+              <a:buNone/>
+            </a:pPr>
+            <a:r>
+              <a:rPr lang="es-ES" dirty="0" smtClean="0"/>
+              <a:t>El </a:t>
+            </a:r>
+            <a:r>
+              <a:rPr lang="es-ES" dirty="0"/>
+              <a:t>cliente llama al negocio, la  recepcionista atiende la llamada y le consulta sobre su necesidad, el cliente si no conoce el menú o lo que le gustaría consumir pregunta sobre el menú vigente, la  recepcionista le dicta el menú, posteriormente el cliente elige según su preferencia, la  recepcionista pregunta si está satisfecho con su pedido o si le gustaría agregar algo más, el cliente pide algo mas o solo confirma el pedido, la  recepcionista solicita los datos personales del cliente como: nombre, número de teléfono y dirección, una vez obtenido los datos la  recepcionista le comunica el monto total y pregunta si tiene cambio, el cliente le contesta y finaliza la llamada, el pedido es pasado de la recepción a la cocina en donde se prepara, luego de elaborar completamente el pedido, se le entrega al repartidor para enviarle al cliente su pedido y cobrar.</a:t>
+            </a:r>
+          </a:p>
+        </p:txBody>
+      </p:sp>
     </p:spTree>
     <p:extLst>
       <p:ext uri="{BB962C8B-B14F-4D97-AF65-F5344CB8AC3E}">
-        <p14:creationId xmlns:p14="http://schemas.microsoft.com/office/powerpoint/2010/main" val="1027070222"/>
+        <p14:creationId xmlns:p14="http://schemas.microsoft.com/office/powerpoint/2010/main" val="1583529480"/>
       </p:ext>
     </p:extLst>
   </p:cSld>

</xml_diff>